<commit_message>
Apresentação com algumas alterações
</commit_message>
<xml_diff>
--- a/SuperVisorPower.pptx
+++ b/SuperVisorPower.pptx
@@ -20,9 +20,9 @@
     <p:sldId id="265" r:id="rId11"/>
     <p:sldId id="266" r:id="rId12"/>
     <p:sldId id="267" r:id="rId13"/>
-    <p:sldId id="268" r:id="rId14"/>
-    <p:sldId id="276" r:id="rId15"/>
-    <p:sldId id="277" r:id="rId16"/>
+    <p:sldId id="278" r:id="rId14"/>
+    <p:sldId id="268" r:id="rId15"/>
+    <p:sldId id="279" r:id="rId16"/>
     <p:sldId id="269" r:id="rId17"/>
     <p:sldId id="274" r:id="rId18"/>
     <p:sldId id="275" r:id="rId19"/>
@@ -32,28 +32,28 @@
   <p:notesSz cx="6858000" cy="9144000"/>
   <p:embeddedFontLst>
     <p:embeddedFont>
-      <p:font typeface="Malgun Gothic" panose="020B0503020000020004" pitchFamily="34" charset="-127"/>
+      <p:font typeface="Antonio Bold" panose="020B0604020202020204" charset="0"/>
       <p:regular r:id="rId22"/>
-      <p:bold r:id="rId23"/>
     </p:embeddedFont>
     <p:embeddedFont>
-      <p:font typeface="Antonio Bold" panose="020B0604020202020204" charset="0"/>
+      <p:font typeface="Antonio Bold Bold" panose="020B0604020202020204" charset="0"/>
+      <p:regular r:id="rId23"/>
+    </p:embeddedFont>
+    <p:embeddedFont>
+      <p:font typeface="Assistant Regular Bold" panose="020B0604020202020204" charset="-79"/>
       <p:regular r:id="rId24"/>
     </p:embeddedFont>
     <p:embeddedFont>
-      <p:font typeface="Antonio Bold Bold" panose="020B0604020202020204" charset="0"/>
+      <p:font typeface="Calibri" panose="020F0502020204030204" pitchFamily="34" charset="0"/>
       <p:regular r:id="rId25"/>
+      <p:bold r:id="rId26"/>
+      <p:italic r:id="rId27"/>
+      <p:boldItalic r:id="rId28"/>
     </p:embeddedFont>
     <p:embeddedFont>
-      <p:font typeface="Assistant Regular Bold" panose="020B0604020202020204" charset="-79"/>
-      <p:regular r:id="rId26"/>
-    </p:embeddedFont>
-    <p:embeddedFont>
-      <p:font typeface="Calibri" panose="020F0502020204030204" pitchFamily="34" charset="0"/>
-      <p:regular r:id="rId27"/>
-      <p:bold r:id="rId28"/>
-      <p:italic r:id="rId29"/>
-      <p:boldItalic r:id="rId30"/>
+      <p:font typeface="Malgun Gothic" panose="020B0503020000020004" pitchFamily="34" charset="-127"/>
+      <p:regular r:id="rId29"/>
+      <p:bold r:id="rId30"/>
     </p:embeddedFont>
   </p:embeddedFontLst>
   <p:defaultTextStyle>
@@ -252,7 +252,7 @@
           <a:p>
             <a:fld id="{EE9BF587-14B9-4D0C-B295-2FEABB789AE5}" type="datetimeFigureOut">
               <a:rPr lang="pt-BR" smtClean="0"/>
-              <a:t>27/10/2020</a:t>
+              <a:t>28/10/2020</a:t>
             </a:fld>
             <a:endParaRPr lang="pt-BR"/>
           </a:p>
@@ -411,7 +411,7 @@
           <a:p>
             <a:fld id="{3B312FA6-4337-4BD9-AFAC-785525BE7400}" type="slidenum">
               <a:rPr lang="pt-BR" smtClean="0"/>
-              <a:t>‹#›</a:t>
+              <a:t>‹nº›</a:t>
             </a:fld>
             <a:endParaRPr lang="pt-BR"/>
           </a:p>
@@ -594,7 +594,7 @@
     </p:spTree>
     <p:extLst>
       <p:ext uri="{BB962C8B-B14F-4D97-AF65-F5344CB8AC3E}">
-        <p14:creationId xmlns:p14="http://schemas.microsoft.com/office/powerpoint/2010/main" val="1313849095"/>
+        <p14:creationId xmlns:p14="http://schemas.microsoft.com/office/powerpoint/2010/main" val="3344244506"/>
       </p:ext>
     </p:extLst>
   </p:cSld>
@@ -678,7 +678,7 @@
     </p:spTree>
     <p:extLst>
       <p:ext uri="{BB962C8B-B14F-4D97-AF65-F5344CB8AC3E}">
-        <p14:creationId xmlns:p14="http://schemas.microsoft.com/office/powerpoint/2010/main" val="87218948"/>
+        <p14:creationId xmlns:p14="http://schemas.microsoft.com/office/powerpoint/2010/main" val="1313849095"/>
       </p:ext>
     </p:extLst>
   </p:cSld>
@@ -762,7 +762,7 @@
     </p:spTree>
     <p:extLst>
       <p:ext uri="{BB962C8B-B14F-4D97-AF65-F5344CB8AC3E}">
-        <p14:creationId xmlns:p14="http://schemas.microsoft.com/office/powerpoint/2010/main" val="3299454093"/>
+        <p14:creationId xmlns:p14="http://schemas.microsoft.com/office/powerpoint/2010/main" val="3782439411"/>
       </p:ext>
     </p:extLst>
   </p:cSld>
@@ -952,7 +952,7 @@
             <a:fld id="{1D8BD707-D9CF-40AE-B4C6-C98DA3205C09}" type="datetimeFigureOut">
               <a:rPr lang="en-US" smtClean="0"/>
               <a:pPr/>
-              <a:t>10/27/2020</a:t>
+              <a:t>10/28/2020</a:t>
             </a:fld>
             <a:endParaRPr lang="en-US"/>
           </a:p>
@@ -995,7 +995,7 @@
             <a:fld id="{B6F15528-21DE-4FAA-801E-634DDDAF4B2B}" type="slidenum">
               <a:rPr lang="en-US" smtClean="0"/>
               <a:pPr/>
-              <a:t>‹#›</a:t>
+              <a:t>‹nº›</a:t>
             </a:fld>
             <a:endParaRPr lang="en-US"/>
           </a:p>
@@ -1117,7 +1117,7 @@
             <a:fld id="{1D8BD707-D9CF-40AE-B4C6-C98DA3205C09}" type="datetimeFigureOut">
               <a:rPr lang="en-US" smtClean="0"/>
               <a:pPr/>
-              <a:t>10/27/2020</a:t>
+              <a:t>10/28/2020</a:t>
             </a:fld>
             <a:endParaRPr lang="en-US"/>
           </a:p>
@@ -1160,7 +1160,7 @@
             <a:fld id="{B6F15528-21DE-4FAA-801E-634DDDAF4B2B}" type="slidenum">
               <a:rPr lang="en-US" smtClean="0"/>
               <a:pPr/>
-              <a:t>‹#›</a:t>
+              <a:t>‹nº›</a:t>
             </a:fld>
             <a:endParaRPr lang="en-US"/>
           </a:p>
@@ -1292,7 +1292,7 @@
             <a:fld id="{1D8BD707-D9CF-40AE-B4C6-C98DA3205C09}" type="datetimeFigureOut">
               <a:rPr lang="en-US" smtClean="0"/>
               <a:pPr/>
-              <a:t>10/27/2020</a:t>
+              <a:t>10/28/2020</a:t>
             </a:fld>
             <a:endParaRPr lang="en-US"/>
           </a:p>
@@ -1335,7 +1335,7 @@
             <a:fld id="{B6F15528-21DE-4FAA-801E-634DDDAF4B2B}" type="slidenum">
               <a:rPr lang="en-US" smtClean="0"/>
               <a:pPr/>
-              <a:t>‹#›</a:t>
+              <a:t>‹nº›</a:t>
             </a:fld>
             <a:endParaRPr lang="en-US"/>
           </a:p>
@@ -1457,7 +1457,7 @@
             <a:fld id="{1D8BD707-D9CF-40AE-B4C6-C98DA3205C09}" type="datetimeFigureOut">
               <a:rPr lang="en-US" smtClean="0"/>
               <a:pPr/>
-              <a:t>10/27/2020</a:t>
+              <a:t>10/28/2020</a:t>
             </a:fld>
             <a:endParaRPr lang="en-US"/>
           </a:p>
@@ -1500,7 +1500,7 @@
             <a:fld id="{B6F15528-21DE-4FAA-801E-634DDDAF4B2B}" type="slidenum">
               <a:rPr lang="en-US" smtClean="0"/>
               <a:pPr/>
-              <a:t>‹#›</a:t>
+              <a:t>‹nº›</a:t>
             </a:fld>
             <a:endParaRPr lang="en-US"/>
           </a:p>
@@ -1699,7 +1699,7 @@
             <a:fld id="{1D8BD707-D9CF-40AE-B4C6-C98DA3205C09}" type="datetimeFigureOut">
               <a:rPr lang="en-US" smtClean="0"/>
               <a:pPr/>
-              <a:t>10/27/2020</a:t>
+              <a:t>10/28/2020</a:t>
             </a:fld>
             <a:endParaRPr lang="en-US"/>
           </a:p>
@@ -1742,7 +1742,7 @@
             <a:fld id="{B6F15528-21DE-4FAA-801E-634DDDAF4B2B}" type="slidenum">
               <a:rPr lang="en-US" smtClean="0"/>
               <a:pPr/>
-              <a:t>‹#›</a:t>
+              <a:t>‹nº›</a:t>
             </a:fld>
             <a:endParaRPr lang="en-US"/>
           </a:p>
@@ -1981,7 +1981,7 @@
             <a:fld id="{1D8BD707-D9CF-40AE-B4C6-C98DA3205C09}" type="datetimeFigureOut">
               <a:rPr lang="en-US" smtClean="0"/>
               <a:pPr/>
-              <a:t>10/27/2020</a:t>
+              <a:t>10/28/2020</a:t>
             </a:fld>
             <a:endParaRPr lang="en-US"/>
           </a:p>
@@ -2024,7 +2024,7 @@
             <a:fld id="{B6F15528-21DE-4FAA-801E-634DDDAF4B2B}" type="slidenum">
               <a:rPr lang="en-US" smtClean="0"/>
               <a:pPr/>
-              <a:t>‹#›</a:t>
+              <a:t>‹nº›</a:t>
             </a:fld>
             <a:endParaRPr lang="en-US"/>
           </a:p>
@@ -2397,7 +2397,7 @@
             <a:fld id="{1D8BD707-D9CF-40AE-B4C6-C98DA3205C09}" type="datetimeFigureOut">
               <a:rPr lang="en-US" smtClean="0"/>
               <a:pPr/>
-              <a:t>10/27/2020</a:t>
+              <a:t>10/28/2020</a:t>
             </a:fld>
             <a:endParaRPr lang="en-US"/>
           </a:p>
@@ -2440,7 +2440,7 @@
             <a:fld id="{B6F15528-21DE-4FAA-801E-634DDDAF4B2B}" type="slidenum">
               <a:rPr lang="en-US" smtClean="0"/>
               <a:pPr/>
-              <a:t>‹#›</a:t>
+              <a:t>‹nº›</a:t>
             </a:fld>
             <a:endParaRPr lang="en-US"/>
           </a:p>
@@ -2511,7 +2511,7 @@
             <a:fld id="{1D8BD707-D9CF-40AE-B4C6-C98DA3205C09}" type="datetimeFigureOut">
               <a:rPr lang="en-US" smtClean="0"/>
               <a:pPr/>
-              <a:t>10/27/2020</a:t>
+              <a:t>10/28/2020</a:t>
             </a:fld>
             <a:endParaRPr lang="en-US"/>
           </a:p>
@@ -2554,7 +2554,7 @@
             <a:fld id="{B6F15528-21DE-4FAA-801E-634DDDAF4B2B}" type="slidenum">
               <a:rPr lang="en-US" smtClean="0"/>
               <a:pPr/>
-              <a:t>‹#›</a:t>
+              <a:t>‹nº›</a:t>
             </a:fld>
             <a:endParaRPr lang="en-US"/>
           </a:p>
@@ -2603,7 +2603,7 @@
             <a:fld id="{1D8BD707-D9CF-40AE-B4C6-C98DA3205C09}" type="datetimeFigureOut">
               <a:rPr lang="en-US" smtClean="0"/>
               <a:pPr/>
-              <a:t>10/27/2020</a:t>
+              <a:t>10/28/2020</a:t>
             </a:fld>
             <a:endParaRPr lang="en-US"/>
           </a:p>
@@ -2646,7 +2646,7 @@
             <a:fld id="{B6F15528-21DE-4FAA-801E-634DDDAF4B2B}" type="slidenum">
               <a:rPr lang="en-US" smtClean="0"/>
               <a:pPr/>
-              <a:t>‹#›</a:t>
+              <a:t>‹nº›</a:t>
             </a:fld>
             <a:endParaRPr lang="en-US"/>
           </a:p>
@@ -2875,7 +2875,7 @@
             <a:fld id="{1D8BD707-D9CF-40AE-B4C6-C98DA3205C09}" type="datetimeFigureOut">
               <a:rPr lang="en-US" smtClean="0"/>
               <a:pPr/>
-              <a:t>10/27/2020</a:t>
+              <a:t>10/28/2020</a:t>
             </a:fld>
             <a:endParaRPr lang="en-US"/>
           </a:p>
@@ -2918,7 +2918,7 @@
             <a:fld id="{B6F15528-21DE-4FAA-801E-634DDDAF4B2B}" type="slidenum">
               <a:rPr lang="en-US" smtClean="0"/>
               <a:pPr/>
-              <a:t>‹#›</a:t>
+              <a:t>‹nº›</a:t>
             </a:fld>
             <a:endParaRPr lang="en-US"/>
           </a:p>
@@ -3124,7 +3124,7 @@
             <a:fld id="{1D8BD707-D9CF-40AE-B4C6-C98DA3205C09}" type="datetimeFigureOut">
               <a:rPr lang="en-US" smtClean="0"/>
               <a:pPr/>
-              <a:t>10/27/2020</a:t>
+              <a:t>10/28/2020</a:t>
             </a:fld>
             <a:endParaRPr lang="en-US"/>
           </a:p>
@@ -3167,7 +3167,7 @@
             <a:fld id="{B6F15528-21DE-4FAA-801E-634DDDAF4B2B}" type="slidenum">
               <a:rPr lang="en-US" smtClean="0"/>
               <a:pPr/>
-              <a:t>‹#›</a:t>
+              <a:t>‹nº›</a:t>
             </a:fld>
             <a:endParaRPr lang="en-US"/>
           </a:p>
@@ -3332,7 +3332,7 @@
             <a:fld id="{1D8BD707-D9CF-40AE-B4C6-C98DA3205C09}" type="datetimeFigureOut">
               <a:rPr lang="en-US" smtClean="0"/>
               <a:pPr/>
-              <a:t>10/27/2020</a:t>
+              <a:t>10/28/2020</a:t>
             </a:fld>
             <a:endParaRPr lang="en-US"/>
           </a:p>
@@ -3411,7 +3411,7 @@
             <a:fld id="{B6F15528-21DE-4FAA-801E-634DDDAF4B2B}" type="slidenum">
               <a:rPr lang="en-US" smtClean="0"/>
               <a:pPr/>
-              <a:t>‹#›</a:t>
+              <a:t>‹nº›</a:t>
             </a:fld>
             <a:endParaRPr lang="en-US"/>
           </a:p>
@@ -4565,9 +4565,141 @@
           <a:chExt cx="0" cy="0"/>
         </a:xfrm>
       </p:grpSpPr>
+      <p:sp>
+        <p:nvSpPr>
+          <p:cNvPr id="9" name="AutoShape 3">
+            <a:extLst>
+              <a:ext uri="{FF2B5EF4-FFF2-40B4-BE49-F238E27FC236}">
+                <a16:creationId xmlns:a16="http://schemas.microsoft.com/office/drawing/2014/main" id="{C73DA589-2BB9-4EA1-ADE4-D065828C6D58}"/>
+              </a:ext>
+            </a:extLst>
+          </p:cNvPr>
+          <p:cNvSpPr/>
+          <p:nvPr/>
+        </p:nvSpPr>
+        <p:spPr>
+          <a:xfrm>
+            <a:off x="0" y="9715500"/>
+            <a:ext cx="18288000" cy="571500"/>
+          </a:xfrm>
+          <a:prstGeom prst="rect">
+            <a:avLst/>
+          </a:prstGeom>
+          <a:solidFill>
+            <a:schemeClr val="tx2">
+              <a:lumMod val="75000"/>
+            </a:schemeClr>
+          </a:solidFill>
+        </p:spPr>
+      </p:sp>
+      <p:sp>
+        <p:nvSpPr>
+          <p:cNvPr id="11" name="AutoShape 3">
+            <a:extLst>
+              <a:ext uri="{FF2B5EF4-FFF2-40B4-BE49-F238E27FC236}">
+                <a16:creationId xmlns:a16="http://schemas.microsoft.com/office/drawing/2014/main" id="{93E7570B-D013-4061-A379-043CDD058284}"/>
+              </a:ext>
+            </a:extLst>
+          </p:cNvPr>
+          <p:cNvSpPr/>
+          <p:nvPr/>
+        </p:nvSpPr>
+        <p:spPr>
+          <a:xfrm>
+            <a:off x="0" y="9639300"/>
+            <a:ext cx="18288000" cy="152400"/>
+          </a:xfrm>
+          <a:prstGeom prst="rect">
+            <a:avLst/>
+          </a:prstGeom>
+          <a:solidFill>
+            <a:schemeClr val="tx2">
+              <a:lumMod val="50000"/>
+            </a:schemeClr>
+          </a:solidFill>
+        </p:spPr>
+      </p:sp>
+      <p:sp>
+        <p:nvSpPr>
+          <p:cNvPr id="8" name="AutoShape 4">
+            <a:extLst>
+              <a:ext uri="{FF2B5EF4-FFF2-40B4-BE49-F238E27FC236}">
+                <a16:creationId xmlns:a16="http://schemas.microsoft.com/office/drawing/2014/main" id="{B8A950B4-893E-4704-85A5-F180560F09E6}"/>
+              </a:ext>
+            </a:extLst>
+          </p:cNvPr>
+          <p:cNvSpPr/>
+          <p:nvPr/>
+        </p:nvSpPr>
+        <p:spPr>
+          <a:xfrm>
+            <a:off x="0" y="0"/>
+            <a:ext cx="18288000" cy="1560280"/>
+          </a:xfrm>
+          <a:prstGeom prst="rect">
+            <a:avLst/>
+          </a:prstGeom>
+          <a:solidFill>
+            <a:srgbClr val="102842"/>
+          </a:solidFill>
+        </p:spPr>
+      </p:sp>
+      <p:sp>
+        <p:nvSpPr>
+          <p:cNvPr id="13" name="TextBox 3">
+            <a:extLst>
+              <a:ext uri="{FF2B5EF4-FFF2-40B4-BE49-F238E27FC236}">
+                <a16:creationId xmlns:a16="http://schemas.microsoft.com/office/drawing/2014/main" id="{76E28CEC-684E-448A-A0E1-440DEB5D33B2}"/>
+              </a:ext>
+            </a:extLst>
+          </p:cNvPr>
+          <p:cNvSpPr txBox="1"/>
+          <p:nvPr/>
+        </p:nvSpPr>
+        <p:spPr>
+          <a:xfrm>
+            <a:off x="3918973" y="147370"/>
+            <a:ext cx="10450053" cy="1243225"/>
+          </a:xfrm>
+          <a:prstGeom prst="rect">
+            <a:avLst/>
+          </a:prstGeom>
+        </p:spPr>
+        <p:txBody>
+          <a:bodyPr wrap="square" lIns="0" tIns="0" rIns="0" bIns="0" rtlCol="0" anchor="t">
+            <a:spAutoFit/>
+          </a:bodyPr>
+          <a:lstStyle/>
+          <a:p>
+            <a:pPr algn="ctr">
+              <a:lnSpc>
+                <a:spcPts val="10559"/>
+              </a:lnSpc>
+            </a:pPr>
+            <a:r>
+              <a:rPr lang="en-US" sz="8000" b="1" dirty="0">
+                <a:solidFill>
+                  <a:schemeClr val="bg1">
+                    <a:lumMod val="95000"/>
+                  </a:schemeClr>
+                </a:solidFill>
+                <a:latin typeface="Malgun Gothic" panose="020B0503020000020004" pitchFamily="34" charset="-127"/>
+                <a:ea typeface="Malgun Gothic" panose="020B0503020000020004" pitchFamily="34" charset="-127"/>
+              </a:rPr>
+              <a:t>PROTÓTIPO DE TELA</a:t>
+            </a:r>
+          </a:p>
+        </p:txBody>
+      </p:sp>
       <p:pic>
         <p:nvPicPr>
-          <p:cNvPr id="2" name="Picture 2"/>
+          <p:cNvPr id="3" name="Picture 3">
+            <a:extLst>
+              <a:ext uri="{FF2B5EF4-FFF2-40B4-BE49-F238E27FC236}">
+                <a16:creationId xmlns:a16="http://schemas.microsoft.com/office/drawing/2014/main" id="{EE5FE67B-14BF-4994-9621-8237DB9C9980}"/>
+              </a:ext>
+            </a:extLst>
+          </p:cNvPr>
           <p:cNvPicPr>
             <a:picLocks noChangeAspect="1"/>
           </p:cNvPicPr>
@@ -4582,144 +4714,20 @@
         </p:blipFill>
         <p:spPr>
           <a:xfrm>
-            <a:off x="457200" y="317044"/>
-            <a:ext cx="8542481" cy="6109612"/>
+            <a:off x="3953609" y="1707650"/>
+            <a:ext cx="11016227" cy="7827320"/>
           </a:xfrm>
           <a:prstGeom prst="rect">
             <a:avLst/>
           </a:prstGeom>
         </p:spPr>
       </p:pic>
-      <p:pic>
-        <p:nvPicPr>
-          <p:cNvPr id="3" name="Picture 3"/>
-          <p:cNvPicPr>
-            <a:picLocks noChangeAspect="1"/>
-          </p:cNvPicPr>
-          <p:nvPr/>
-        </p:nvPicPr>
-        <p:blipFill>
-          <a:blip r:embed="rId4"/>
-          <a:srcRect/>
-          <a:stretch>
-            <a:fillRect/>
-          </a:stretch>
-        </p:blipFill>
-        <p:spPr>
-          <a:xfrm>
-            <a:off x="9509743" y="3407596"/>
-            <a:ext cx="8542400" cy="6069600"/>
-          </a:xfrm>
-          <a:prstGeom prst="rect">
-            <a:avLst/>
-          </a:prstGeom>
-        </p:spPr>
-      </p:pic>
-      <p:sp>
-        <p:nvSpPr>
-          <p:cNvPr id="4" name="TextBox 4"/>
-          <p:cNvSpPr txBox="1"/>
-          <p:nvPr/>
-        </p:nvSpPr>
-        <p:spPr>
-          <a:xfrm>
-            <a:off x="10679816" y="654843"/>
-            <a:ext cx="7357813" cy="2462213"/>
-          </a:xfrm>
-          <a:prstGeom prst="rect">
-            <a:avLst/>
-          </a:prstGeom>
-        </p:spPr>
-        <p:txBody>
-          <a:bodyPr lIns="0" tIns="0" rIns="0" bIns="0" rtlCol="0" anchor="t">
-            <a:spAutoFit/>
-          </a:bodyPr>
-          <a:lstStyle/>
-          <a:p>
-            <a:pPr algn="just"/>
-            <a:r>
-              <a:rPr lang="en-US" sz="8000" b="1" dirty="0">
-                <a:solidFill>
-                  <a:srgbClr val="EF441D"/>
-                </a:solidFill>
-                <a:latin typeface="Malgun Gothic" panose="020B0503020000020004" pitchFamily="34" charset="-127"/>
-                <a:ea typeface="Malgun Gothic" panose="020B0503020000020004" pitchFamily="34" charset="-127"/>
-              </a:rPr>
-              <a:t>PROTÓTIPO DE TELA</a:t>
-            </a:r>
-          </a:p>
-        </p:txBody>
-      </p:sp>
-      <p:grpSp>
-        <p:nvGrpSpPr>
-          <p:cNvPr id="5" name="Group 5"/>
-          <p:cNvGrpSpPr/>
-          <p:nvPr/>
-        </p:nvGrpSpPr>
-        <p:grpSpPr>
-          <a:xfrm>
-            <a:off x="10259505" y="738197"/>
-            <a:ext cx="315503" cy="2295506"/>
-            <a:chOff x="0" y="0"/>
-            <a:chExt cx="420671" cy="3060674"/>
-          </a:xfrm>
-        </p:grpSpPr>
-        <p:sp>
-          <p:nvSpPr>
-            <p:cNvPr id="6" name="AutoShape 6"/>
-            <p:cNvSpPr/>
-            <p:nvPr/>
-          </p:nvSpPr>
-          <p:spPr>
-            <a:xfrm>
-              <a:off x="0" y="0"/>
-              <a:ext cx="420671" cy="3060674"/>
-            </a:xfrm>
-            <a:prstGeom prst="rect">
-              <a:avLst/>
-            </a:prstGeom>
-            <a:solidFill>
-              <a:srgbClr val="102842"/>
-            </a:solidFill>
-          </p:spPr>
-        </p:sp>
-        <p:sp>
-          <p:nvSpPr>
-            <p:cNvPr id="7" name="TextBox 7"/>
-            <p:cNvSpPr txBox="1"/>
-            <p:nvPr/>
-          </p:nvSpPr>
-          <p:spPr>
-            <a:xfrm>
-              <a:off x="72806" y="183544"/>
-              <a:ext cx="275058" cy="2364174"/>
-            </a:xfrm>
-            <a:prstGeom prst="rect">
-              <a:avLst/>
-            </a:prstGeom>
-          </p:spPr>
-          <p:txBody>
-            <a:bodyPr lIns="0" tIns="0" rIns="0" bIns="0" rtlCol="0" anchor="t">
-              <a:spAutoFit/>
-            </a:bodyPr>
-            <a:lstStyle/>
-            <a:p>
-              <a:pPr algn="ctr">
-                <a:lnSpc>
-                  <a:spcPts val="14091"/>
-                </a:lnSpc>
-              </a:pPr>
-              <a:endParaRPr/>
-            </a:p>
-          </p:txBody>
-        </p:sp>
-      </p:grpSp>
-      <p:sp>
-        <p:nvSpPr>
-          <p:cNvPr id="9" name="AutoShape 3">
+      <p:sp>
+        <p:nvSpPr>
+          <p:cNvPr id="2" name="AutoShape 4">
             <a:extLst>
               <a:ext uri="{FF2B5EF4-FFF2-40B4-BE49-F238E27FC236}">
-                <a16:creationId xmlns:a16="http://schemas.microsoft.com/office/drawing/2014/main" id="{C73DA589-2BB9-4EA1-ADE4-D065828C6D58}"/>
+                <a16:creationId xmlns:a16="http://schemas.microsoft.com/office/drawing/2014/main" id="{C3FEE2A6-92DE-49BA-9167-75FECDA4FF21}"/>
               </a:ext>
             </a:extLst>
           </p:cNvPr>
@@ -4728,47 +4736,66 @@
         </p:nvSpPr>
         <p:spPr>
           <a:xfrm>
-            <a:off x="0" y="9715500"/>
-            <a:ext cx="18288000" cy="571500"/>
+            <a:off x="-21771" y="1753572"/>
+            <a:ext cx="3581400" cy="759214"/>
           </a:xfrm>
           <a:prstGeom prst="rect">
             <a:avLst/>
           </a:prstGeom>
           <a:solidFill>
-            <a:schemeClr val="tx2">
-              <a:lumMod val="75000"/>
-            </a:schemeClr>
+            <a:srgbClr val="102842"/>
           </a:solidFill>
         </p:spPr>
       </p:sp>
       <p:sp>
         <p:nvSpPr>
-          <p:cNvPr id="11" name="AutoShape 3">
+          <p:cNvPr id="4" name="TextBox 16">
             <a:extLst>
               <a:ext uri="{FF2B5EF4-FFF2-40B4-BE49-F238E27FC236}">
-                <a16:creationId xmlns:a16="http://schemas.microsoft.com/office/drawing/2014/main" id="{93E7570B-D013-4061-A379-043CDD058284}"/>
+                <a16:creationId xmlns:a16="http://schemas.microsoft.com/office/drawing/2014/main" id="{48DDF553-41D4-4A19-BA00-1B8858610034}"/>
               </a:ext>
             </a:extLst>
           </p:cNvPr>
-          <p:cNvSpPr/>
+          <p:cNvSpPr txBox="1"/>
           <p:nvPr/>
         </p:nvSpPr>
         <p:spPr>
           <a:xfrm>
-            <a:off x="0" y="9639300"/>
-            <a:ext cx="18288000" cy="152400"/>
+            <a:off x="717295" y="1871569"/>
+            <a:ext cx="2103268" cy="523220"/>
           </a:xfrm>
           <a:prstGeom prst="rect">
             <a:avLst/>
           </a:prstGeom>
-          <a:solidFill>
-            <a:schemeClr val="tx2">
-              <a:lumMod val="50000"/>
-            </a:schemeClr>
-          </a:solidFill>
+          <a:noFill/>
         </p:spPr>
+        <p:txBody>
+          <a:bodyPr wrap="none" rtlCol="0">
+            <a:spAutoFit/>
+          </a:bodyPr>
+          <a:lstStyle/>
+          <a:p>
+            <a:r>
+              <a:rPr lang="pt-BR" sz="2800" b="1" dirty="0">
+                <a:solidFill>
+                  <a:schemeClr val="bg1">
+                    <a:lumMod val="95000"/>
+                  </a:schemeClr>
+                </a:solidFill>
+                <a:latin typeface="Malgun Gothic" panose="020B0503020000020004" pitchFamily="34" charset="-127"/>
+                <a:ea typeface="Malgun Gothic" panose="020B0503020000020004" pitchFamily="34" charset="-127"/>
+              </a:rPr>
+              <a:t>CADASTRO</a:t>
+            </a:r>
+          </a:p>
+        </p:txBody>
       </p:sp>
     </p:spTree>
+    <p:extLst>
+      <p:ext uri="{BB962C8B-B14F-4D97-AF65-F5344CB8AC3E}">
+        <p14:creationId xmlns:p14="http://schemas.microsoft.com/office/powerpoint/2010/main" val="1127543623"/>
+      </p:ext>
+    </p:extLst>
   </p:cSld>
   <p:clrMapOvr>
     <a:masterClrMapping/>
@@ -4810,138 +4837,14 @@
         </p:blipFill>
         <p:spPr>
           <a:xfrm>
-            <a:off x="457200" y="317044"/>
-            <a:ext cx="8542481" cy="6109612"/>
+            <a:off x="3548743" y="1679054"/>
+            <a:ext cx="11125200" cy="7956782"/>
           </a:xfrm>
           <a:prstGeom prst="rect">
             <a:avLst/>
           </a:prstGeom>
         </p:spPr>
       </p:pic>
-      <p:pic>
-        <p:nvPicPr>
-          <p:cNvPr id="3" name="Picture 3"/>
-          <p:cNvPicPr>
-            <a:picLocks noChangeAspect="1"/>
-          </p:cNvPicPr>
-          <p:nvPr/>
-        </p:nvPicPr>
-        <p:blipFill>
-          <a:blip r:embed="rId4"/>
-          <a:srcRect/>
-          <a:stretch>
-            <a:fillRect/>
-          </a:stretch>
-        </p:blipFill>
-        <p:spPr>
-          <a:xfrm>
-            <a:off x="9509743" y="3407596"/>
-            <a:ext cx="8542400" cy="6069600"/>
-          </a:xfrm>
-          <a:prstGeom prst="rect">
-            <a:avLst/>
-          </a:prstGeom>
-        </p:spPr>
-      </p:pic>
-      <p:sp>
-        <p:nvSpPr>
-          <p:cNvPr id="4" name="TextBox 4"/>
-          <p:cNvSpPr txBox="1"/>
-          <p:nvPr/>
-        </p:nvSpPr>
-        <p:spPr>
-          <a:xfrm>
-            <a:off x="10679816" y="654843"/>
-            <a:ext cx="7357813" cy="2462213"/>
-          </a:xfrm>
-          <a:prstGeom prst="rect">
-            <a:avLst/>
-          </a:prstGeom>
-        </p:spPr>
-        <p:txBody>
-          <a:bodyPr lIns="0" tIns="0" rIns="0" bIns="0" rtlCol="0" anchor="t">
-            <a:spAutoFit/>
-          </a:bodyPr>
-          <a:lstStyle/>
-          <a:p>
-            <a:pPr algn="just"/>
-            <a:r>
-              <a:rPr lang="en-US" sz="8000" b="1" dirty="0">
-                <a:solidFill>
-                  <a:srgbClr val="EF441D"/>
-                </a:solidFill>
-                <a:latin typeface="Malgun Gothic" panose="020B0503020000020004" pitchFamily="34" charset="-127"/>
-                <a:ea typeface="Malgun Gothic" panose="020B0503020000020004" pitchFamily="34" charset="-127"/>
-              </a:rPr>
-              <a:t>PROTÓTIPO DE TELA</a:t>
-            </a:r>
-          </a:p>
-        </p:txBody>
-      </p:sp>
-      <p:grpSp>
-        <p:nvGrpSpPr>
-          <p:cNvPr id="5" name="Group 5"/>
-          <p:cNvGrpSpPr/>
-          <p:nvPr/>
-        </p:nvGrpSpPr>
-        <p:grpSpPr>
-          <a:xfrm>
-            <a:off x="10259505" y="738197"/>
-            <a:ext cx="315503" cy="2295506"/>
-            <a:chOff x="0" y="0"/>
-            <a:chExt cx="420671" cy="3060674"/>
-          </a:xfrm>
-        </p:grpSpPr>
-        <p:sp>
-          <p:nvSpPr>
-            <p:cNvPr id="6" name="AutoShape 6"/>
-            <p:cNvSpPr/>
-            <p:nvPr/>
-          </p:nvSpPr>
-          <p:spPr>
-            <a:xfrm>
-              <a:off x="0" y="0"/>
-              <a:ext cx="420671" cy="3060674"/>
-            </a:xfrm>
-            <a:prstGeom prst="rect">
-              <a:avLst/>
-            </a:prstGeom>
-            <a:solidFill>
-              <a:srgbClr val="102842"/>
-            </a:solidFill>
-          </p:spPr>
-        </p:sp>
-        <p:sp>
-          <p:nvSpPr>
-            <p:cNvPr id="7" name="TextBox 7"/>
-            <p:cNvSpPr txBox="1"/>
-            <p:nvPr/>
-          </p:nvSpPr>
-          <p:spPr>
-            <a:xfrm>
-              <a:off x="72806" y="183544"/>
-              <a:ext cx="275058" cy="2364174"/>
-            </a:xfrm>
-            <a:prstGeom prst="rect">
-              <a:avLst/>
-            </a:prstGeom>
-          </p:spPr>
-          <p:txBody>
-            <a:bodyPr lIns="0" tIns="0" rIns="0" bIns="0" rtlCol="0" anchor="t">
-              <a:spAutoFit/>
-            </a:bodyPr>
-            <a:lstStyle/>
-            <a:p>
-              <a:pPr algn="ctr">
-                <a:lnSpc>
-                  <a:spcPts val="14091"/>
-                </a:lnSpc>
-              </a:pPr>
-              <a:endParaRPr/>
-            </a:p>
-          </p:txBody>
-        </p:sp>
-      </p:grpSp>
       <p:sp>
         <p:nvSpPr>
           <p:cNvPr id="9" name="AutoShape 3">
@@ -4996,12 +4899,75 @@
           </a:solidFill>
         </p:spPr>
       </p:sp>
+      <p:sp>
+        <p:nvSpPr>
+          <p:cNvPr id="3" name="AutoShape 4">
+            <a:extLst>
+              <a:ext uri="{FF2B5EF4-FFF2-40B4-BE49-F238E27FC236}">
+                <a16:creationId xmlns:a16="http://schemas.microsoft.com/office/drawing/2014/main" id="{0279BC99-95CC-407F-907C-1694964963CD}"/>
+              </a:ext>
+            </a:extLst>
+          </p:cNvPr>
+          <p:cNvSpPr/>
+          <p:nvPr/>
+        </p:nvSpPr>
+        <p:spPr>
+          <a:xfrm>
+            <a:off x="-32657" y="873040"/>
+            <a:ext cx="3581400" cy="759214"/>
+          </a:xfrm>
+          <a:prstGeom prst="rect">
+            <a:avLst/>
+          </a:prstGeom>
+          <a:solidFill>
+            <a:srgbClr val="102842"/>
+          </a:solidFill>
+        </p:spPr>
+      </p:sp>
+      <p:sp>
+        <p:nvSpPr>
+          <p:cNvPr id="4" name="TextBox 10">
+            <a:extLst>
+              <a:ext uri="{FF2B5EF4-FFF2-40B4-BE49-F238E27FC236}">
+                <a16:creationId xmlns:a16="http://schemas.microsoft.com/office/drawing/2014/main" id="{B33210D0-4D74-46DC-B256-CB69B45FE0C7}"/>
+              </a:ext>
+            </a:extLst>
+          </p:cNvPr>
+          <p:cNvSpPr txBox="1"/>
+          <p:nvPr/>
+        </p:nvSpPr>
+        <p:spPr>
+          <a:xfrm>
+            <a:off x="1110461" y="991037"/>
+            <a:ext cx="1295163" cy="523220"/>
+          </a:xfrm>
+          <a:prstGeom prst="rect">
+            <a:avLst/>
+          </a:prstGeom>
+          <a:noFill/>
+        </p:spPr>
+        <p:txBody>
+          <a:bodyPr wrap="none" rtlCol="0">
+            <a:spAutoFit/>
+          </a:bodyPr>
+          <a:lstStyle/>
+          <a:p>
+            <a:r>
+              <a:rPr lang="pt-BR" sz="2800" b="1" dirty="0">
+                <a:solidFill>
+                  <a:schemeClr val="bg1">
+                    <a:lumMod val="95000"/>
+                  </a:schemeClr>
+                </a:solidFill>
+                <a:latin typeface="Malgun Gothic" panose="020B0503020000020004" pitchFamily="34" charset="-127"/>
+                <a:ea typeface="Malgun Gothic" panose="020B0503020000020004" pitchFamily="34" charset="-127"/>
+              </a:rPr>
+              <a:t>LOGIN</a:t>
+            </a:r>
+          </a:p>
+        </p:txBody>
+      </p:sp>
     </p:spTree>
-    <p:extLst>
-      <p:ext uri="{BB962C8B-B14F-4D97-AF65-F5344CB8AC3E}">
-        <p14:creationId xmlns:p14="http://schemas.microsoft.com/office/powerpoint/2010/main" val="2292082300"/>
-      </p:ext>
-    </p:extLst>
   </p:cSld>
   <p:clrMapOvr>
     <a:masterClrMapping/>
@@ -5026,155 +4992,6 @@
           <a:chExt cx="0" cy="0"/>
         </a:xfrm>
       </p:grpSpPr>
-      <p:pic>
-        <p:nvPicPr>
-          <p:cNvPr id="2" name="Picture 2"/>
-          <p:cNvPicPr>
-            <a:picLocks noChangeAspect="1"/>
-          </p:cNvPicPr>
-          <p:nvPr/>
-        </p:nvPicPr>
-        <p:blipFill>
-          <a:blip r:embed="rId3"/>
-          <a:srcRect/>
-          <a:stretch>
-            <a:fillRect/>
-          </a:stretch>
-        </p:blipFill>
-        <p:spPr>
-          <a:xfrm>
-            <a:off x="457200" y="317044"/>
-            <a:ext cx="8542481" cy="6109612"/>
-          </a:xfrm>
-          <a:prstGeom prst="rect">
-            <a:avLst/>
-          </a:prstGeom>
-        </p:spPr>
-      </p:pic>
-      <p:pic>
-        <p:nvPicPr>
-          <p:cNvPr id="3" name="Picture 3"/>
-          <p:cNvPicPr>
-            <a:picLocks noChangeAspect="1"/>
-          </p:cNvPicPr>
-          <p:nvPr/>
-        </p:nvPicPr>
-        <p:blipFill>
-          <a:blip r:embed="rId4"/>
-          <a:srcRect/>
-          <a:stretch>
-            <a:fillRect/>
-          </a:stretch>
-        </p:blipFill>
-        <p:spPr>
-          <a:xfrm>
-            <a:off x="9509743" y="3407596"/>
-            <a:ext cx="8542400" cy="6069600"/>
-          </a:xfrm>
-          <a:prstGeom prst="rect">
-            <a:avLst/>
-          </a:prstGeom>
-        </p:spPr>
-      </p:pic>
-      <p:sp>
-        <p:nvSpPr>
-          <p:cNvPr id="4" name="TextBox 4"/>
-          <p:cNvSpPr txBox="1"/>
-          <p:nvPr/>
-        </p:nvSpPr>
-        <p:spPr>
-          <a:xfrm>
-            <a:off x="10679816" y="654843"/>
-            <a:ext cx="7357813" cy="2462213"/>
-          </a:xfrm>
-          <a:prstGeom prst="rect">
-            <a:avLst/>
-          </a:prstGeom>
-        </p:spPr>
-        <p:txBody>
-          <a:bodyPr lIns="0" tIns="0" rIns="0" bIns="0" rtlCol="0" anchor="t">
-            <a:spAutoFit/>
-          </a:bodyPr>
-          <a:lstStyle/>
-          <a:p>
-            <a:pPr algn="just"/>
-            <a:r>
-              <a:rPr lang="en-US" sz="8000" b="1" dirty="0">
-                <a:solidFill>
-                  <a:srgbClr val="EF441D"/>
-                </a:solidFill>
-                <a:latin typeface="Malgun Gothic" panose="020B0503020000020004" pitchFamily="34" charset="-127"/>
-                <a:ea typeface="Malgun Gothic" panose="020B0503020000020004" pitchFamily="34" charset="-127"/>
-              </a:rPr>
-              <a:t>PROTÓTIPO DE TELA</a:t>
-            </a:r>
-          </a:p>
-        </p:txBody>
-      </p:sp>
-      <p:grpSp>
-        <p:nvGrpSpPr>
-          <p:cNvPr id="5" name="Group 5"/>
-          <p:cNvGrpSpPr/>
-          <p:nvPr/>
-        </p:nvGrpSpPr>
-        <p:grpSpPr>
-          <a:xfrm>
-            <a:off x="10259505" y="738197"/>
-            <a:ext cx="315503" cy="2295506"/>
-            <a:chOff x="0" y="0"/>
-            <a:chExt cx="420671" cy="3060674"/>
-          </a:xfrm>
-        </p:grpSpPr>
-        <p:sp>
-          <p:nvSpPr>
-            <p:cNvPr id="6" name="AutoShape 6"/>
-            <p:cNvSpPr/>
-            <p:nvPr/>
-          </p:nvSpPr>
-          <p:spPr>
-            <a:xfrm>
-              <a:off x="0" y="0"/>
-              <a:ext cx="420671" cy="3060674"/>
-            </a:xfrm>
-            <a:prstGeom prst="rect">
-              <a:avLst/>
-            </a:prstGeom>
-            <a:solidFill>
-              <a:srgbClr val="102842"/>
-            </a:solidFill>
-          </p:spPr>
-        </p:sp>
-        <p:sp>
-          <p:nvSpPr>
-            <p:cNvPr id="7" name="TextBox 7"/>
-            <p:cNvSpPr txBox="1"/>
-            <p:nvPr/>
-          </p:nvSpPr>
-          <p:spPr>
-            <a:xfrm>
-              <a:off x="72806" y="183544"/>
-              <a:ext cx="275058" cy="2364174"/>
-            </a:xfrm>
-            <a:prstGeom prst="rect">
-              <a:avLst/>
-            </a:prstGeom>
-          </p:spPr>
-          <p:txBody>
-            <a:bodyPr lIns="0" tIns="0" rIns="0" bIns="0" rtlCol="0" anchor="t">
-              <a:spAutoFit/>
-            </a:bodyPr>
-            <a:lstStyle/>
-            <a:p>
-              <a:pPr algn="ctr">
-                <a:lnSpc>
-                  <a:spcPts val="14091"/>
-                </a:lnSpc>
-              </a:pPr>
-              <a:endParaRPr/>
-            </a:p>
-          </p:txBody>
-        </p:sp>
-      </p:grpSp>
       <p:sp>
         <p:nvSpPr>
           <p:cNvPr id="9" name="AutoShape 3">
@@ -5229,10 +5046,78 @@
           </a:solidFill>
         </p:spPr>
       </p:sp>
+      <p:sp>
+        <p:nvSpPr>
+          <p:cNvPr id="2" name="AutoShape 4">
+            <a:extLst>
+              <a:ext uri="{FF2B5EF4-FFF2-40B4-BE49-F238E27FC236}">
+                <a16:creationId xmlns:a16="http://schemas.microsoft.com/office/drawing/2014/main" id="{6833F97D-81FA-4CB3-8016-212D95C63EEF}"/>
+              </a:ext>
+            </a:extLst>
+          </p:cNvPr>
+          <p:cNvSpPr/>
+          <p:nvPr/>
+        </p:nvSpPr>
+        <p:spPr>
+          <a:xfrm>
+            <a:off x="0" y="555255"/>
+            <a:ext cx="3581400" cy="759214"/>
+          </a:xfrm>
+          <a:prstGeom prst="rect">
+            <a:avLst/>
+          </a:prstGeom>
+          <a:solidFill>
+            <a:srgbClr val="102842"/>
+          </a:solidFill>
+        </p:spPr>
+      </p:sp>
+      <p:sp>
+        <p:nvSpPr>
+          <p:cNvPr id="3" name="TextBox 10">
+            <a:extLst>
+              <a:ext uri="{FF2B5EF4-FFF2-40B4-BE49-F238E27FC236}">
+                <a16:creationId xmlns:a16="http://schemas.microsoft.com/office/drawing/2014/main" id="{D9B9BC11-7B29-41FF-8A6F-66A464CE1524}"/>
+              </a:ext>
+            </a:extLst>
+          </p:cNvPr>
+          <p:cNvSpPr txBox="1"/>
+          <p:nvPr/>
+        </p:nvSpPr>
+        <p:spPr>
+          <a:xfrm>
+            <a:off x="609600" y="673252"/>
+            <a:ext cx="2436564" cy="523220"/>
+          </a:xfrm>
+          <a:prstGeom prst="rect">
+            <a:avLst/>
+          </a:prstGeom>
+          <a:noFill/>
+        </p:spPr>
+        <p:txBody>
+          <a:bodyPr wrap="none" rtlCol="0">
+            <a:spAutoFit/>
+          </a:bodyPr>
+          <a:lstStyle/>
+          <a:p>
+            <a:r>
+              <a:rPr lang="pt-BR" sz="2800" b="1" dirty="0">
+                <a:solidFill>
+                  <a:schemeClr val="bg1">
+                    <a:lumMod val="95000"/>
+                  </a:schemeClr>
+                </a:solidFill>
+                <a:latin typeface="Malgun Gothic" panose="020B0503020000020004" pitchFamily="34" charset="-127"/>
+                <a:ea typeface="Malgun Gothic" panose="020B0503020000020004" pitchFamily="34" charset="-127"/>
+              </a:rPr>
+              <a:t>DASHBOARD</a:t>
+            </a:r>
+          </a:p>
+        </p:txBody>
+      </p:sp>
     </p:spTree>
     <p:extLst>
       <p:ext uri="{BB962C8B-B14F-4D97-AF65-F5344CB8AC3E}">
-        <p14:creationId xmlns:p14="http://schemas.microsoft.com/office/powerpoint/2010/main" val="1837896584"/>
+        <p14:creationId xmlns:p14="http://schemas.microsoft.com/office/powerpoint/2010/main" val="21672361"/>
       </p:ext>
     </p:extLst>
   </p:cSld>
@@ -6150,651 +6035,116 @@
           <a:p>
             <a:pPr algn="just"/>
             <a:r>
-              <a:rPr lang="en-US" sz="2800" dirty="0" err="1">
+              <a:rPr lang="en-US" dirty="0" err="1">
                 <a:cs typeface="Calibri"/>
               </a:rPr>
               <a:t>Ao</a:t>
             </a:r>
             <a:r>
-              <a:rPr lang="en-US" sz="2800" dirty="0">
+              <a:rPr lang="en-US" dirty="0">
                 <a:cs typeface="Calibri"/>
               </a:rPr>
               <a:t> final </a:t>
             </a:r>
             <a:r>
-              <a:rPr lang="en-US" sz="2800" dirty="0" err="1">
+              <a:rPr lang="en-US" dirty="0" err="1">
                 <a:cs typeface="Calibri"/>
               </a:rPr>
               <a:t>desta</a:t>
             </a:r>
             <a:r>
-              <a:rPr lang="en-US" sz="2800" dirty="0">
+              <a:rPr lang="en-US" dirty="0">
                 <a:cs typeface="Calibri"/>
               </a:rPr>
               <a:t> sprint, </a:t>
             </a:r>
             <a:r>
-              <a:rPr lang="en-US" sz="2800" dirty="0" err="1">
+              <a:rPr lang="en-US" dirty="0" err="1">
                 <a:cs typeface="Calibri"/>
               </a:rPr>
               <a:t>concluímos</a:t>
             </a:r>
             <a:r>
-              <a:rPr lang="en-US" sz="2800" dirty="0">
+              <a:rPr lang="en-US" dirty="0">
                 <a:cs typeface="Calibri"/>
               </a:rPr>
-              <a:t> que o </a:t>
-            </a:r>
-            <a:r>
-              <a:rPr lang="en-US" sz="2800" dirty="0" err="1">
+              <a:t> que a </a:t>
+            </a:r>
+            <a:r>
+              <a:rPr lang="en-US" dirty="0" err="1">
                 <a:cs typeface="Calibri"/>
               </a:rPr>
-              <a:t>meio</a:t>
-            </a:r>
-            <a:r>
-              <a:rPr lang="en-US" sz="2800" dirty="0">
+              <a:t>nossa</a:t>
+            </a:r>
+            <a:r>
+              <a:rPr lang="en-US" dirty="0">
                 <a:cs typeface="Calibri"/>
               </a:rPr>
               <a:t> </a:t>
             </a:r>
             <a:r>
-              <a:rPr lang="en-US" sz="2800" dirty="0" err="1">
+              <a:rPr lang="en-US" dirty="0" err="1">
                 <a:cs typeface="Calibri"/>
               </a:rPr>
-              <a:t>acadêmico</a:t>
-            </a:r>
-            <a:r>
-              <a:rPr lang="en-US" sz="2800" dirty="0">
+              <a:t>solução</a:t>
+            </a:r>
+            <a:r>
+              <a:rPr lang="en-US" dirty="0">
                 <a:cs typeface="Calibri"/>
               </a:rPr>
+              <a:t> de </a:t>
+            </a:r>
+            <a:r>
+              <a:rPr lang="en-US" dirty="0" err="1">
+                <a:cs typeface="Calibri"/>
+              </a:rPr>
+              <a:t>monitoramento</a:t>
+            </a:r>
+            <a:r>
+              <a:rPr lang="en-US" dirty="0">
+                <a:cs typeface="Calibri"/>
+              </a:rPr>
               <a:t> </a:t>
             </a:r>
             <a:r>
-              <a:rPr lang="en-US" sz="2800" dirty="0" err="1">
+              <a:rPr lang="en-US" dirty="0" err="1">
                 <a:cs typeface="Calibri"/>
               </a:rPr>
-              <a:t>necessita</a:t>
-            </a:r>
-            <a:r>
-              <a:rPr lang="en-US" sz="2800" dirty="0">
+              <a:t>tem</a:t>
+            </a:r>
+            <a:r>
+              <a:rPr lang="en-US" dirty="0">
                 <a:cs typeface="Calibri"/>
               </a:rPr>
               <a:t> </a:t>
             </a:r>
             <a:r>
-              <a:rPr lang="en-US" sz="2800" dirty="0" err="1">
+              <a:rPr lang="en-US" dirty="0" err="1">
                 <a:cs typeface="Calibri"/>
               </a:rPr>
-              <a:t>cada</a:t>
-            </a:r>
-            <a:r>
-              <a:rPr lang="en-US" sz="2800" dirty="0">
+              <a:t>como</a:t>
+            </a:r>
+            <a:r>
+              <a:rPr lang="en-US" dirty="0">
                 <a:cs typeface="Calibri"/>
               </a:rPr>
               <a:t> </a:t>
             </a:r>
             <a:r>
-              <a:rPr lang="en-US" sz="2800" dirty="0" err="1">
+              <a:rPr lang="pt-BR" dirty="0">
                 <a:cs typeface="Calibri"/>
               </a:rPr>
-              <a:t>vez</a:t>
-            </a:r>
-            <a:r>
-              <a:rPr lang="en-US" sz="2800" dirty="0">
+              <a:t>objetivo  facilitar a rotina do professor e fazer com que as atividades acadêmicas sejam realizadas com mais praticidade e eficiência.</a:t>
+            </a:r>
+            <a:r>
+              <a:rPr lang="en-US" dirty="0">
                 <a:cs typeface="Calibri"/>
               </a:rPr>
               <a:t> </a:t>
             </a:r>
-            <a:r>
-              <a:rPr lang="en-US" sz="2800" dirty="0" err="1">
-                <a:cs typeface="Calibri"/>
-              </a:rPr>
-              <a:t>mais</a:t>
-            </a:r>
-            <a:r>
-              <a:rPr lang="en-US" sz="2800" dirty="0">
-                <a:cs typeface="Calibri"/>
-              </a:rPr>
-              <a:t> da </a:t>
-            </a:r>
-            <a:r>
-              <a:rPr lang="en-US" sz="2800" dirty="0" err="1">
-                <a:cs typeface="Calibri"/>
-              </a:rPr>
-              <a:t>tecnologia</a:t>
-            </a:r>
-            <a:r>
-              <a:rPr lang="en-US" sz="2800" dirty="0">
-                <a:cs typeface="Calibri"/>
-              </a:rPr>
-              <a:t> </a:t>
-            </a:r>
-            <a:r>
-              <a:rPr lang="en-US" sz="2800" dirty="0" err="1">
-                <a:cs typeface="Calibri"/>
-              </a:rPr>
-              <a:t>nas</a:t>
-            </a:r>
-            <a:r>
-              <a:rPr lang="en-US" sz="2800" dirty="0">
-                <a:cs typeface="Calibri"/>
-              </a:rPr>
-              <a:t> </a:t>
-            </a:r>
-            <a:r>
-              <a:rPr lang="en-US" sz="2800" dirty="0" err="1">
-                <a:cs typeface="Calibri"/>
-              </a:rPr>
-              <a:t>salas</a:t>
-            </a:r>
-            <a:r>
-              <a:rPr lang="en-US" sz="2800" dirty="0">
-                <a:cs typeface="Calibri"/>
-              </a:rPr>
-              <a:t> de aula, no </a:t>
-            </a:r>
-            <a:r>
-              <a:rPr lang="en-US" sz="2800" dirty="0" err="1">
-                <a:cs typeface="Calibri"/>
-              </a:rPr>
-              <a:t>entanto</a:t>
-            </a:r>
-            <a:r>
-              <a:rPr lang="en-US" sz="2800" dirty="0">
-                <a:cs typeface="Calibri"/>
-              </a:rPr>
-              <a:t>, o </a:t>
-            </a:r>
-            <a:r>
-              <a:rPr lang="en-US" sz="2800" dirty="0" err="1">
-                <a:cs typeface="Calibri"/>
-              </a:rPr>
-              <a:t>suporte</a:t>
-            </a:r>
-            <a:r>
-              <a:rPr lang="en-US" sz="2800" dirty="0">
-                <a:cs typeface="Calibri"/>
-              </a:rPr>
-              <a:t> de T.I </a:t>
-            </a:r>
-            <a:r>
-              <a:rPr lang="en-US" sz="2800" dirty="0" err="1">
-                <a:cs typeface="Calibri"/>
-              </a:rPr>
-              <a:t>aos</a:t>
-            </a:r>
-            <a:r>
-              <a:rPr lang="en-US" sz="2800" dirty="0">
-                <a:cs typeface="Calibri"/>
-              </a:rPr>
-              <a:t> </a:t>
-            </a:r>
-            <a:r>
-              <a:rPr lang="en-US" sz="2800" dirty="0" err="1">
-                <a:cs typeface="Calibri"/>
-              </a:rPr>
-              <a:t>professores</a:t>
-            </a:r>
-            <a:r>
-              <a:rPr lang="en-US" sz="2800" dirty="0">
-                <a:cs typeface="Calibri"/>
-              </a:rPr>
-              <a:t> é </a:t>
-            </a:r>
-            <a:r>
-              <a:rPr lang="en-US" sz="2800" dirty="0" err="1">
-                <a:cs typeface="Calibri"/>
-              </a:rPr>
-              <a:t>tão</a:t>
-            </a:r>
-            <a:r>
-              <a:rPr lang="en-US" sz="2800" dirty="0">
-                <a:cs typeface="Calibri"/>
-              </a:rPr>
-              <a:t> </a:t>
-            </a:r>
-            <a:r>
-              <a:rPr lang="en-US" sz="2800" dirty="0" err="1">
-                <a:cs typeface="Calibri"/>
-              </a:rPr>
-              <a:t>fraco</a:t>
-            </a:r>
-            <a:r>
-              <a:rPr lang="en-US" sz="2800" dirty="0">
-                <a:cs typeface="Calibri"/>
-              </a:rPr>
-              <a:t> que </a:t>
-            </a:r>
-            <a:r>
-              <a:rPr lang="en-US" sz="2800" dirty="0" err="1">
-                <a:cs typeface="Calibri"/>
-              </a:rPr>
-              <a:t>gera</a:t>
-            </a:r>
-            <a:r>
-              <a:rPr lang="en-US" sz="2800" dirty="0">
-                <a:cs typeface="Calibri"/>
-              </a:rPr>
-              <a:t> </a:t>
-            </a:r>
-            <a:r>
-              <a:rPr lang="en-US" sz="2800" dirty="0" err="1">
-                <a:cs typeface="Calibri"/>
-              </a:rPr>
-              <a:t>insegurança</a:t>
-            </a:r>
-            <a:r>
-              <a:rPr lang="en-US" sz="2800" dirty="0">
-                <a:cs typeface="Calibri"/>
-              </a:rPr>
-              <a:t> </a:t>
-            </a:r>
-            <a:r>
-              <a:rPr lang="en-US" sz="2800" dirty="0" err="1">
-                <a:cs typeface="Calibri"/>
-              </a:rPr>
-              <a:t>nos</a:t>
-            </a:r>
-            <a:r>
-              <a:rPr lang="en-US" sz="2800" dirty="0">
-                <a:cs typeface="Calibri"/>
-              </a:rPr>
-              <a:t> </a:t>
-            </a:r>
-            <a:r>
-              <a:rPr lang="en-US" sz="2800" dirty="0" err="1">
-                <a:cs typeface="Calibri"/>
-              </a:rPr>
-              <a:t>mesmos</a:t>
-            </a:r>
-            <a:r>
-              <a:rPr lang="en-US" sz="2800" dirty="0">
-                <a:cs typeface="Calibri"/>
-              </a:rPr>
-              <a:t>. </a:t>
-            </a:r>
-            <a:endParaRPr lang="en-US" sz="2800" dirty="0"/>
           </a:p>
           <a:p>
             <a:pPr algn="just"/>
-            <a:r>
-              <a:rPr lang="en-US" sz="2800" dirty="0">
-                <a:cs typeface="Calibri"/>
-              </a:rPr>
-              <a:t>A </a:t>
-            </a:r>
-            <a:r>
-              <a:rPr lang="en-US" sz="2800" dirty="0" err="1">
-                <a:cs typeface="Calibri"/>
-              </a:rPr>
-              <a:t>nossa</a:t>
-            </a:r>
-            <a:r>
-              <a:rPr lang="en-US" sz="2800" dirty="0">
-                <a:cs typeface="Calibri"/>
-              </a:rPr>
-              <a:t> </a:t>
-            </a:r>
-            <a:r>
-              <a:rPr lang="en-US" sz="2800" dirty="0" err="1">
-                <a:cs typeface="Calibri"/>
-              </a:rPr>
-              <a:t>solução</a:t>
-            </a:r>
-            <a:r>
-              <a:rPr lang="en-US" sz="2800" dirty="0">
-                <a:cs typeface="Calibri"/>
-              </a:rPr>
-              <a:t> </a:t>
-            </a:r>
-            <a:r>
-              <a:rPr lang="en-US" sz="2800" dirty="0" err="1">
-                <a:cs typeface="Calibri"/>
-              </a:rPr>
-              <a:t>foi</a:t>
-            </a:r>
-            <a:r>
-              <a:rPr lang="en-US" sz="2800" dirty="0">
-                <a:cs typeface="Calibri"/>
-              </a:rPr>
-              <a:t> </a:t>
-            </a:r>
-            <a:r>
-              <a:rPr lang="en-US" sz="2800" dirty="0" err="1">
-                <a:cs typeface="Calibri"/>
-              </a:rPr>
-              <a:t>apreciada</a:t>
-            </a:r>
-            <a:r>
-              <a:rPr lang="en-US" sz="2800" dirty="0">
-                <a:cs typeface="Calibri"/>
-              </a:rPr>
-              <a:t> e </a:t>
-            </a:r>
-            <a:r>
-              <a:rPr lang="en-US" sz="2800" dirty="0" err="1">
-                <a:cs typeface="Calibri"/>
-              </a:rPr>
-              <a:t>aprovada</a:t>
-            </a:r>
-            <a:r>
-              <a:rPr lang="en-US" sz="2800" dirty="0">
-                <a:cs typeface="Calibri"/>
-              </a:rPr>
-              <a:t> </a:t>
-            </a:r>
-            <a:r>
-              <a:rPr lang="en-US" sz="2800" dirty="0" err="1">
-                <a:cs typeface="Calibri"/>
-              </a:rPr>
-              <a:t>pelos</a:t>
-            </a:r>
-            <a:r>
-              <a:rPr lang="en-US" sz="2800" dirty="0">
-                <a:cs typeface="Calibri"/>
-              </a:rPr>
-              <a:t> </a:t>
-            </a:r>
-            <a:r>
-              <a:rPr lang="en-US" sz="2800" dirty="0" err="1">
-                <a:cs typeface="Calibri"/>
-              </a:rPr>
-              <a:t>envolvidos</a:t>
-            </a:r>
-            <a:r>
-              <a:rPr lang="en-US" sz="2800" dirty="0">
-                <a:cs typeface="Calibri"/>
-              </a:rPr>
-              <a:t>, que </a:t>
-            </a:r>
-            <a:r>
-              <a:rPr lang="en-US" sz="2800" dirty="0" err="1">
-                <a:cs typeface="Calibri"/>
-              </a:rPr>
-              <a:t>ficaram</a:t>
-            </a:r>
-            <a:r>
-              <a:rPr lang="en-US" sz="2800" dirty="0">
-                <a:cs typeface="Calibri"/>
-              </a:rPr>
-              <a:t> </a:t>
-            </a:r>
-            <a:r>
-              <a:rPr lang="en-US" sz="2800" dirty="0" err="1">
-                <a:cs typeface="Calibri"/>
-              </a:rPr>
-              <a:t>entusiasmados</a:t>
-            </a:r>
-            <a:r>
-              <a:rPr lang="en-US" sz="2800" dirty="0">
-                <a:cs typeface="Calibri"/>
-              </a:rPr>
-              <a:t> </a:t>
-            </a:r>
-            <a:r>
-              <a:rPr lang="en-US" sz="2800" dirty="0" err="1">
-                <a:cs typeface="Calibri"/>
-              </a:rPr>
-              <a:t>sobre</a:t>
-            </a:r>
-            <a:r>
-              <a:rPr lang="en-US" sz="2800" dirty="0">
-                <a:cs typeface="Calibri"/>
-              </a:rPr>
-              <a:t> </a:t>
-            </a:r>
-            <a:r>
-              <a:rPr lang="en-US" sz="2800" dirty="0" err="1">
-                <a:cs typeface="Calibri"/>
-              </a:rPr>
-              <a:t>como</a:t>
-            </a:r>
-            <a:r>
-              <a:rPr lang="en-US" sz="2800" dirty="0">
-                <a:cs typeface="Calibri"/>
-              </a:rPr>
-              <a:t> o </a:t>
-            </a:r>
-            <a:r>
-              <a:rPr lang="en-US" sz="2800" dirty="0" err="1">
-                <a:cs typeface="Calibri"/>
-              </a:rPr>
-              <a:t>sistema</a:t>
-            </a:r>
-            <a:r>
-              <a:rPr lang="en-US" sz="2800" dirty="0">
-                <a:cs typeface="Calibri"/>
-              </a:rPr>
-              <a:t> de </a:t>
-            </a:r>
-            <a:r>
-              <a:rPr lang="en-US" sz="2800" dirty="0" err="1">
-                <a:cs typeface="Calibri"/>
-              </a:rPr>
-              <a:t>monitoramento</a:t>
-            </a:r>
-            <a:r>
-              <a:rPr lang="en-US" sz="2800" dirty="0">
-                <a:cs typeface="Calibri"/>
-              </a:rPr>
-              <a:t> e </a:t>
-            </a:r>
-            <a:r>
-              <a:rPr lang="en-US" sz="2800" dirty="0" err="1">
-                <a:cs typeface="Calibri"/>
-              </a:rPr>
-              <a:t>atendimento</a:t>
-            </a:r>
-            <a:r>
-              <a:rPr lang="en-US" sz="2800" dirty="0">
-                <a:cs typeface="Calibri"/>
-              </a:rPr>
-              <a:t> </a:t>
-            </a:r>
-            <a:r>
-              <a:rPr lang="en-US" sz="2800" dirty="0" err="1">
-                <a:cs typeface="Calibri"/>
-              </a:rPr>
-              <a:t>remoto</a:t>
-            </a:r>
-            <a:r>
-              <a:rPr lang="en-US" sz="2800" dirty="0">
-                <a:cs typeface="Calibri"/>
-              </a:rPr>
-              <a:t> </a:t>
-            </a:r>
-            <a:r>
-              <a:rPr lang="en-US" sz="2800" dirty="0" err="1">
-                <a:cs typeface="Calibri"/>
-              </a:rPr>
-              <a:t>pode</a:t>
-            </a:r>
-            <a:r>
-              <a:rPr lang="en-US" sz="2800" dirty="0">
-                <a:cs typeface="Calibri"/>
-              </a:rPr>
-              <a:t> </a:t>
-            </a:r>
-            <a:r>
-              <a:rPr lang="en-US" sz="2800" dirty="0" err="1">
-                <a:cs typeface="Calibri"/>
-              </a:rPr>
-              <a:t>facilitar</a:t>
-            </a:r>
-            <a:r>
-              <a:rPr lang="en-US" sz="2800" dirty="0">
-                <a:cs typeface="Calibri"/>
-              </a:rPr>
-              <a:t>, </a:t>
-            </a:r>
-            <a:r>
-              <a:rPr lang="en-US" sz="2800" dirty="0" err="1">
-                <a:cs typeface="Calibri"/>
-              </a:rPr>
-              <a:t>agilizar</a:t>
-            </a:r>
-            <a:r>
-              <a:rPr lang="en-US" sz="2800" dirty="0">
-                <a:cs typeface="Calibri"/>
-              </a:rPr>
-              <a:t> e </a:t>
-            </a:r>
-            <a:r>
-              <a:rPr lang="en-US" sz="2800" dirty="0" err="1">
-                <a:cs typeface="Calibri"/>
-              </a:rPr>
-              <a:t>minimizar</a:t>
-            </a:r>
-            <a:r>
-              <a:rPr lang="en-US" sz="2800" dirty="0">
-                <a:cs typeface="Calibri"/>
-              </a:rPr>
-              <a:t> </a:t>
-            </a:r>
-            <a:r>
-              <a:rPr lang="en-US" sz="2800" dirty="0" err="1">
-                <a:cs typeface="Calibri"/>
-              </a:rPr>
-              <a:t>os</a:t>
-            </a:r>
-            <a:r>
-              <a:rPr lang="en-US" sz="2800" dirty="0">
-                <a:cs typeface="Calibri"/>
-              </a:rPr>
-              <a:t> </a:t>
-            </a:r>
-            <a:r>
-              <a:rPr lang="en-US" sz="2800" dirty="0" err="1">
-                <a:cs typeface="Calibri"/>
-              </a:rPr>
-              <a:t>problemas</a:t>
-            </a:r>
-            <a:r>
-              <a:rPr lang="en-US" sz="2800" dirty="0">
-                <a:cs typeface="Calibri"/>
-              </a:rPr>
-              <a:t> que as </a:t>
-            </a:r>
-            <a:r>
-              <a:rPr lang="en-US" sz="2800" dirty="0" err="1">
-                <a:cs typeface="Calibri"/>
-              </a:rPr>
-              <a:t>falhas</a:t>
-            </a:r>
-            <a:r>
-              <a:rPr lang="en-US" sz="2800" dirty="0">
-                <a:cs typeface="Calibri"/>
-              </a:rPr>
-              <a:t> da </a:t>
-            </a:r>
-            <a:r>
-              <a:rPr lang="en-US" sz="2800" dirty="0" err="1">
-                <a:cs typeface="Calibri"/>
-              </a:rPr>
-              <a:t>tecnologia</a:t>
-            </a:r>
-            <a:r>
-              <a:rPr lang="en-US" sz="2800" dirty="0">
-                <a:cs typeface="Calibri"/>
-              </a:rPr>
-              <a:t> </a:t>
-            </a:r>
-            <a:r>
-              <a:rPr lang="en-US" sz="2800" dirty="0" err="1">
-                <a:cs typeface="Calibri"/>
-              </a:rPr>
-              <a:t>causam</a:t>
-            </a:r>
-            <a:r>
-              <a:rPr lang="en-US" sz="2800" dirty="0">
-                <a:cs typeface="Calibri"/>
-              </a:rPr>
-              <a:t> </a:t>
-            </a:r>
-            <a:r>
-              <a:rPr lang="en-US" sz="2800" dirty="0" err="1">
-                <a:cs typeface="Calibri"/>
-              </a:rPr>
-              <a:t>ao</a:t>
-            </a:r>
-            <a:r>
-              <a:rPr lang="en-US" sz="2800" dirty="0">
-                <a:cs typeface="Calibri"/>
-              </a:rPr>
-              <a:t> </a:t>
-            </a:r>
-            <a:r>
-              <a:rPr lang="en-US" sz="2800" dirty="0" err="1">
-                <a:cs typeface="Calibri"/>
-              </a:rPr>
-              <a:t>rendimento</a:t>
-            </a:r>
-            <a:r>
-              <a:rPr lang="en-US" sz="2800" dirty="0">
-                <a:cs typeface="Calibri"/>
-              </a:rPr>
-              <a:t> das aulas e dos </a:t>
-            </a:r>
-            <a:r>
-              <a:rPr lang="en-US" sz="2800" dirty="0" err="1">
-                <a:cs typeface="Calibri"/>
-              </a:rPr>
-              <a:t>seus</a:t>
-            </a:r>
-            <a:r>
-              <a:rPr lang="en-US" sz="2800" dirty="0">
-                <a:cs typeface="Calibri"/>
-              </a:rPr>
-              <a:t> </a:t>
-            </a:r>
-            <a:r>
-              <a:rPr lang="en-US" sz="2800" dirty="0" err="1">
-                <a:cs typeface="Calibri"/>
-              </a:rPr>
-              <a:t>principais</a:t>
-            </a:r>
-            <a:r>
-              <a:rPr lang="en-US" sz="2800" dirty="0">
-                <a:cs typeface="Calibri"/>
-              </a:rPr>
-              <a:t> </a:t>
-            </a:r>
-            <a:r>
-              <a:rPr lang="en-US" sz="2800" dirty="0" err="1">
-                <a:cs typeface="Calibri"/>
-              </a:rPr>
-              <a:t>integrantes</a:t>
-            </a:r>
-            <a:r>
-              <a:rPr lang="en-US" sz="2800" dirty="0">
-                <a:cs typeface="Calibri"/>
-              </a:rPr>
-              <a:t>, </a:t>
-            </a:r>
-            <a:r>
-              <a:rPr lang="en-US" sz="2800" dirty="0" err="1">
-                <a:cs typeface="Calibri"/>
-              </a:rPr>
-              <a:t>os</a:t>
-            </a:r>
-            <a:r>
-              <a:rPr lang="en-US" sz="2800" dirty="0">
-                <a:cs typeface="Calibri"/>
-              </a:rPr>
-              <a:t> </a:t>
-            </a:r>
-            <a:r>
-              <a:rPr lang="en-US" sz="2800" dirty="0" err="1">
-                <a:cs typeface="Calibri"/>
-              </a:rPr>
-              <a:t>alunos</a:t>
-            </a:r>
-            <a:r>
-              <a:rPr lang="en-US" sz="2800" dirty="0">
-                <a:cs typeface="Calibri"/>
-              </a:rPr>
-              <a:t>.</a:t>
-            </a:r>
             <a:endParaRPr lang="en-US" sz="2800" dirty="0"/>
           </a:p>
         </p:txBody>
@@ -6928,89 +6278,6 @@
           </a:p>
         </p:txBody>
       </p:sp>
-      <p:grpSp>
-        <p:nvGrpSpPr>
-          <p:cNvPr id="23" name="Group 5">
-            <a:extLst>
-              <a:ext uri="{FF2B5EF4-FFF2-40B4-BE49-F238E27FC236}">
-                <a16:creationId xmlns:a16="http://schemas.microsoft.com/office/drawing/2014/main" id="{BD55DDC9-6F3A-4B4C-B0D5-48DE1C65B16B}"/>
-              </a:ext>
-            </a:extLst>
-          </p:cNvPr>
-          <p:cNvGrpSpPr>
-            <a:grpSpLocks noChangeAspect="1"/>
-          </p:cNvGrpSpPr>
-          <p:nvPr/>
-        </p:nvGrpSpPr>
-        <p:grpSpPr>
-          <a:xfrm>
-            <a:off x="2847487" y="4457700"/>
-            <a:ext cx="200513" cy="200512"/>
-            <a:chOff x="0" y="0"/>
-            <a:chExt cx="6350000" cy="6349975"/>
-          </a:xfrm>
-        </p:grpSpPr>
-        <p:sp>
-          <p:nvSpPr>
-            <p:cNvPr id="24" name="Freeform 6">
-              <a:extLst>
-                <a:ext uri="{FF2B5EF4-FFF2-40B4-BE49-F238E27FC236}">
-                  <a16:creationId xmlns:a16="http://schemas.microsoft.com/office/drawing/2014/main" id="{6806FC8D-BA1C-44B9-AA59-1594D8CB42CC}"/>
-                </a:ext>
-              </a:extLst>
-            </p:cNvPr>
-            <p:cNvSpPr/>
-            <p:nvPr/>
-          </p:nvSpPr>
-          <p:spPr>
-            <a:xfrm>
-              <a:off x="0" y="0"/>
-              <a:ext cx="6350000" cy="6349974"/>
-            </a:xfrm>
-            <a:custGeom>
-              <a:avLst/>
-              <a:gdLst/>
-              <a:ahLst/>
-              <a:cxnLst/>
-              <a:rect l="l" t="t" r="r" b="b"/>
-              <a:pathLst>
-                <a:path w="6350000" h="6349974">
-                  <a:moveTo>
-                    <a:pt x="6350000" y="3175025"/>
-                  </a:moveTo>
-                  <a:cubicBezTo>
-                    <a:pt x="6350000" y="4928451"/>
-                    <a:pt x="4928476" y="6349974"/>
-                    <a:pt x="3175000" y="6349974"/>
-                  </a:cubicBezTo>
-                  <a:cubicBezTo>
-                    <a:pt x="1421498" y="6349974"/>
-                    <a:pt x="0" y="4928451"/>
-                    <a:pt x="0" y="3175025"/>
-                  </a:cubicBezTo>
-                  <a:cubicBezTo>
-                    <a:pt x="0" y="1421511"/>
-                    <a:pt x="1421498" y="0"/>
-                    <a:pt x="3175000" y="0"/>
-                  </a:cubicBezTo>
-                  <a:cubicBezTo>
-                    <a:pt x="4928501" y="0"/>
-                    <a:pt x="6350000" y="1421511"/>
-                    <a:pt x="6350000" y="3175025"/>
-                  </a:cubicBezTo>
-                  <a:close/>
-                </a:path>
-              </a:pathLst>
-            </a:custGeom>
-            <a:blipFill>
-              <a:blip r:embed="rId2"/>
-              <a:stretch>
-                <a:fillRect l="-5796" r="-5796"/>
-              </a:stretch>
-            </a:blipFill>
-          </p:spPr>
-        </p:sp>
-      </p:grpSp>
       <p:grpSp>
         <p:nvGrpSpPr>
           <p:cNvPr id="25" name="Group 5">
@@ -7917,8 +7184,8 @@
         </p:nvSpPr>
         <p:spPr>
           <a:xfrm>
-            <a:off x="9448800" y="1996003"/>
-            <a:ext cx="7886700" cy="6294993"/>
+            <a:off x="9144000" y="1996003"/>
+            <a:ext cx="7886700" cy="6299353"/>
           </a:xfrm>
           <a:prstGeom prst="rect">
             <a:avLst/>
@@ -7938,7 +7205,7 @@
               <a:buChar char="•"/>
             </a:pPr>
             <a:r>
-              <a:rPr lang="en-US" sz="2800" dirty="0">
+              <a:rPr lang="en-US" sz="2950" dirty="0">
                 <a:solidFill>
                   <a:srgbClr val="272727"/>
                 </a:solidFill>
@@ -7948,7 +7215,7 @@
               <a:t>Sistema de </a:t>
             </a:r>
             <a:r>
-              <a:rPr lang="en-US" sz="2800" dirty="0" err="1">
+              <a:rPr lang="en-US" sz="2950" dirty="0" err="1">
                 <a:solidFill>
                   <a:srgbClr val="272727"/>
                 </a:solidFill>
@@ -7958,7 +7225,7 @@
               <a:t>monitoramento</a:t>
             </a:r>
             <a:r>
-              <a:rPr lang="en-US" sz="2800" dirty="0">
+              <a:rPr lang="en-US" sz="2950" dirty="0">
                 <a:solidFill>
                   <a:srgbClr val="272727"/>
                 </a:solidFill>
@@ -7968,7 +7235,7 @@
               <a:t> de </a:t>
             </a:r>
             <a:r>
-              <a:rPr lang="en-US" sz="2800" dirty="0" err="1">
+              <a:rPr lang="en-US" sz="2950" dirty="0" err="1">
                 <a:solidFill>
                   <a:srgbClr val="272727"/>
                 </a:solidFill>
@@ -7978,7 +7245,7 @@
               <a:t>computadores</a:t>
             </a:r>
             <a:r>
-              <a:rPr lang="en-US" sz="2800" dirty="0">
+              <a:rPr lang="en-US" sz="2950" dirty="0">
                 <a:solidFill>
                   <a:srgbClr val="272727"/>
                 </a:solidFill>
@@ -7988,7 +7255,7 @@
               <a:t> </a:t>
             </a:r>
             <a:r>
-              <a:rPr lang="en-US" sz="2800" dirty="0" err="1">
+              <a:rPr lang="en-US" sz="2950" dirty="0" err="1">
                 <a:solidFill>
                   <a:srgbClr val="272727"/>
                 </a:solidFill>
@@ -7998,7 +7265,7 @@
               <a:t>em</a:t>
             </a:r>
             <a:r>
-              <a:rPr lang="en-US" sz="2800" dirty="0">
+              <a:rPr lang="en-US" sz="2950" dirty="0">
                 <a:solidFill>
                   <a:srgbClr val="272727"/>
                 </a:solidFill>
@@ -8008,7 +7275,7 @@
               <a:t> </a:t>
             </a:r>
             <a:r>
-              <a:rPr lang="en-US" sz="2800" dirty="0" err="1">
+              <a:rPr lang="en-US" sz="2950" dirty="0" err="1">
                 <a:solidFill>
                   <a:srgbClr val="272727"/>
                 </a:solidFill>
@@ -8018,7 +7285,7 @@
               <a:t>faculdades</a:t>
             </a:r>
             <a:r>
-              <a:rPr lang="en-US" sz="2800" dirty="0">
+              <a:rPr lang="en-US" sz="2950" dirty="0">
                 <a:solidFill>
                   <a:srgbClr val="272727"/>
                 </a:solidFill>
@@ -8034,7 +7301,7 @@
                 <a:spcPts val="3833"/>
               </a:lnSpc>
             </a:pPr>
-            <a:endParaRPr lang="en-US" sz="2800" dirty="0">
+            <a:endParaRPr lang="en-US" sz="2950" dirty="0">
               <a:solidFill>
                 <a:srgbClr val="272727"/>
               </a:solidFill>
@@ -8051,7 +7318,7 @@
               <a:buChar char="•"/>
             </a:pPr>
             <a:r>
-              <a:rPr lang="en-US" sz="2800" dirty="0">
+              <a:rPr lang="en-US" sz="2950" dirty="0">
                 <a:solidFill>
                   <a:srgbClr val="272727"/>
                 </a:solidFill>
@@ -8061,7 +7328,7 @@
               <a:t>A </a:t>
             </a:r>
             <a:r>
-              <a:rPr lang="en-US" sz="2800" dirty="0" err="1">
+              <a:rPr lang="en-US" sz="2950" dirty="0" err="1">
                 <a:solidFill>
                   <a:srgbClr val="272727"/>
                 </a:solidFill>
@@ -8071,7 +7338,7 @@
               <a:t>equipe</a:t>
             </a:r>
             <a:r>
-              <a:rPr lang="en-US" sz="2800" dirty="0">
+              <a:rPr lang="en-US" sz="2950" dirty="0">
                 <a:solidFill>
                   <a:srgbClr val="272727"/>
                 </a:solidFill>
@@ -8081,7 +7348,7 @@
               <a:t> que </a:t>
             </a:r>
             <a:r>
-              <a:rPr lang="en-US" sz="2800" dirty="0" err="1">
+              <a:rPr lang="en-US" sz="2950" dirty="0" err="1">
                 <a:solidFill>
                   <a:srgbClr val="272727"/>
                 </a:solidFill>
@@ -8091,7 +7358,7 @@
               <a:t>utilizará</a:t>
             </a:r>
             <a:r>
-              <a:rPr lang="en-US" sz="2800" dirty="0">
+              <a:rPr lang="en-US" sz="2950" dirty="0">
                 <a:solidFill>
                   <a:srgbClr val="272727"/>
                 </a:solidFill>
@@ -8101,7 +7368,7 @@
               <a:t> o </a:t>
             </a:r>
             <a:r>
-              <a:rPr lang="en-US" sz="2800" dirty="0" err="1">
+              <a:rPr lang="en-US" sz="2950" dirty="0" err="1">
                 <a:solidFill>
                   <a:srgbClr val="272727"/>
                 </a:solidFill>
@@ -8111,7 +7378,7 @@
               <a:t>sistema</a:t>
             </a:r>
             <a:r>
-              <a:rPr lang="en-US" sz="2800" dirty="0">
+              <a:rPr lang="en-US" sz="2950" dirty="0">
                 <a:solidFill>
                   <a:srgbClr val="272727"/>
                 </a:solidFill>
@@ -8121,7 +7388,7 @@
               <a:t> é o </a:t>
             </a:r>
             <a:r>
-              <a:rPr lang="en-US" sz="2800" dirty="0" err="1">
+              <a:rPr lang="en-US" sz="2950" dirty="0" err="1">
                 <a:solidFill>
                   <a:srgbClr val="272727"/>
                 </a:solidFill>
@@ -8131,7 +7398,7 @@
               <a:t>setor</a:t>
             </a:r>
             <a:r>
-              <a:rPr lang="en-US" sz="2800" dirty="0">
+              <a:rPr lang="en-US" sz="2950" dirty="0">
                 <a:solidFill>
                   <a:srgbClr val="272727"/>
                 </a:solidFill>
@@ -8141,7 +7408,7 @@
               <a:t> de  T.I. da </a:t>
             </a:r>
             <a:r>
-              <a:rPr lang="en-US" sz="2800" dirty="0" err="1">
+              <a:rPr lang="en-US" sz="2950" dirty="0" err="1">
                 <a:solidFill>
                   <a:srgbClr val="272727"/>
                 </a:solidFill>
@@ -8150,7 +7417,7 @@
               </a:rPr>
               <a:t>faculdade</a:t>
             </a:r>
-            <a:endParaRPr lang="en-US" sz="2800" dirty="0">
+            <a:endParaRPr lang="en-US" sz="2950" dirty="0">
               <a:solidFill>
                 <a:srgbClr val="272727"/>
               </a:solidFill>
@@ -8164,7 +7431,7 @@
                 <a:spcPts val="3833"/>
               </a:lnSpc>
             </a:pPr>
-            <a:endParaRPr lang="en-US" sz="2800" dirty="0">
+            <a:endParaRPr lang="en-US" sz="2950" dirty="0">
               <a:solidFill>
                 <a:srgbClr val="272727"/>
               </a:solidFill>
@@ -8181,7 +7448,7 @@
               <a:buChar char="•"/>
             </a:pPr>
             <a:r>
-              <a:rPr lang="en-US" sz="2800" dirty="0">
+              <a:rPr lang="en-US" sz="2950" dirty="0">
                 <a:solidFill>
                   <a:srgbClr val="272727"/>
                 </a:solidFill>
@@ -8191,7 +7458,7 @@
               <a:t>A </a:t>
             </a:r>
             <a:r>
-              <a:rPr lang="en-US" sz="2800" dirty="0" err="1">
+              <a:rPr lang="en-US" sz="2950" dirty="0" err="1">
                 <a:solidFill>
                   <a:srgbClr val="272727"/>
                 </a:solidFill>
@@ -8201,7 +7468,7 @@
               <a:t>equipe</a:t>
             </a:r>
             <a:r>
-              <a:rPr lang="en-US" sz="2800" dirty="0">
+              <a:rPr lang="en-US" sz="2950" dirty="0">
                 <a:solidFill>
                   <a:srgbClr val="272727"/>
                 </a:solidFill>
@@ -8211,7 +7478,7 @@
               <a:t> de T.I da </a:t>
             </a:r>
             <a:r>
-              <a:rPr lang="en-US" sz="2800" dirty="0" err="1">
+              <a:rPr lang="en-US" sz="2950" dirty="0" err="1">
                 <a:solidFill>
                   <a:srgbClr val="272727"/>
                 </a:solidFill>
@@ -8221,7 +7488,7 @@
               <a:t>faculdade</a:t>
             </a:r>
             <a:r>
-              <a:rPr lang="en-US" sz="2800" dirty="0">
+              <a:rPr lang="en-US" sz="2950" dirty="0">
                 <a:solidFill>
                   <a:srgbClr val="272727"/>
                 </a:solidFill>
@@ -8231,7 +7498,7 @@
               <a:t> </a:t>
             </a:r>
             <a:r>
-              <a:rPr lang="en-US" sz="2800" dirty="0" err="1">
+              <a:rPr lang="en-US" sz="2950" dirty="0" err="1">
                 <a:solidFill>
                   <a:srgbClr val="272727"/>
                 </a:solidFill>
@@ -8241,7 +7508,7 @@
               <a:t>dará</a:t>
             </a:r>
             <a:r>
-              <a:rPr lang="en-US" sz="2800" dirty="0">
+              <a:rPr lang="en-US" sz="2950" dirty="0">
                 <a:solidFill>
                   <a:srgbClr val="272727"/>
                 </a:solidFill>
@@ -8251,7 +7518,7 @@
               <a:t> o </a:t>
             </a:r>
             <a:r>
-              <a:rPr lang="en-US" sz="2800" dirty="0" err="1">
+              <a:rPr lang="en-US" sz="2950" dirty="0" err="1">
                 <a:solidFill>
                   <a:srgbClr val="272727"/>
                 </a:solidFill>
@@ -8261,7 +7528,7 @@
               <a:t>suporte</a:t>
             </a:r>
             <a:r>
-              <a:rPr lang="en-US" sz="2800" dirty="0">
+              <a:rPr lang="en-US" sz="2950" dirty="0">
                 <a:solidFill>
                   <a:srgbClr val="272727"/>
                 </a:solidFill>
@@ -8271,7 +7538,7 @@
               <a:t> </a:t>
             </a:r>
             <a:r>
-              <a:rPr lang="en-US" sz="2800" dirty="0" err="1">
+              <a:rPr lang="en-US" sz="2950" dirty="0" err="1">
                 <a:solidFill>
                   <a:srgbClr val="272727"/>
                 </a:solidFill>
@@ -8281,7 +7548,7 @@
               <a:t>aos</a:t>
             </a:r>
             <a:r>
-              <a:rPr lang="en-US" sz="2800" dirty="0">
+              <a:rPr lang="en-US" sz="2950" dirty="0">
                 <a:solidFill>
                   <a:srgbClr val="272727"/>
                 </a:solidFill>
@@ -8291,7 +7558,7 @@
               <a:t> </a:t>
             </a:r>
             <a:r>
-              <a:rPr lang="en-US" sz="2800" dirty="0" err="1">
+              <a:rPr lang="en-US" sz="2950" dirty="0" err="1">
                 <a:solidFill>
                   <a:srgbClr val="272727"/>
                 </a:solidFill>
@@ -8301,7 +7568,7 @@
               <a:t>professores</a:t>
             </a:r>
             <a:r>
-              <a:rPr lang="en-US" sz="2800" dirty="0">
+              <a:rPr lang="en-US" sz="2950" dirty="0">
                 <a:solidFill>
                   <a:srgbClr val="272727"/>
                 </a:solidFill>
@@ -8311,7 +7578,7 @@
               <a:t>  que </a:t>
             </a:r>
             <a:r>
-              <a:rPr lang="en-US" sz="2800" dirty="0" err="1">
+              <a:rPr lang="en-US" sz="2950" dirty="0" err="1">
                 <a:solidFill>
                   <a:srgbClr val="272727"/>
                 </a:solidFill>
@@ -8321,7 +7588,7 @@
               <a:t>farão</a:t>
             </a:r>
             <a:r>
-              <a:rPr lang="en-US" sz="2800" dirty="0">
+              <a:rPr lang="en-US" sz="2950" dirty="0">
                 <a:solidFill>
                   <a:srgbClr val="272727"/>
                 </a:solidFill>
@@ -8331,7 +7598,7 @@
               <a:t> </a:t>
             </a:r>
             <a:r>
-              <a:rPr lang="en-US" sz="2800" dirty="0">
+              <a:rPr lang="en-US" sz="2950" dirty="0">
                 <a:solidFill>
                   <a:srgbClr val="000000"/>
                 </a:solidFill>
@@ -8341,7 +7608,7 @@
               <a:t>a </a:t>
             </a:r>
             <a:r>
-              <a:rPr lang="en-US" sz="2800" dirty="0" err="1">
+              <a:rPr lang="en-US" sz="2950" dirty="0" err="1">
                 <a:solidFill>
                   <a:srgbClr val="000000"/>
                 </a:solidFill>
@@ -8351,7 +7618,7 @@
               <a:t>solicitação</a:t>
             </a:r>
             <a:r>
-              <a:rPr lang="en-US" sz="2800" dirty="0">
+              <a:rPr lang="en-US" sz="2950" dirty="0">
                 <a:solidFill>
                   <a:srgbClr val="000000"/>
                 </a:solidFill>
@@ -8361,7 +7628,7 @@
               <a:t> de </a:t>
             </a:r>
             <a:r>
-              <a:rPr lang="en-US" sz="2800" dirty="0" err="1">
+              <a:rPr lang="en-US" sz="2950" dirty="0" err="1">
                 <a:solidFill>
                   <a:srgbClr val="000000"/>
                 </a:solidFill>
@@ -8371,7 +7638,7 @@
               <a:t>atendimento</a:t>
             </a:r>
             <a:r>
-              <a:rPr lang="en-US" sz="2800" dirty="0">
+              <a:rPr lang="en-US" sz="2950" dirty="0">
                 <a:solidFill>
                   <a:srgbClr val="000000"/>
                 </a:solidFill>
@@ -8387,7 +7654,7 @@
                 <a:spcPts val="3833"/>
               </a:lnSpc>
             </a:pPr>
-            <a:endParaRPr lang="en-US" sz="2800" dirty="0">
+            <a:endParaRPr lang="en-US" sz="2950" dirty="0">
               <a:solidFill>
                 <a:srgbClr val="000000"/>
               </a:solidFill>
@@ -8404,7 +7671,7 @@
               <a:buChar char="•"/>
             </a:pPr>
             <a:r>
-              <a:rPr lang="en-US" sz="2800" dirty="0">
+              <a:rPr lang="en-US" sz="2950" dirty="0">
                 <a:solidFill>
                   <a:srgbClr val="272727"/>
                 </a:solidFill>
@@ -8414,7 +7681,7 @@
               <a:t> As </a:t>
             </a:r>
             <a:r>
-              <a:rPr lang="en-US" sz="2800" dirty="0" err="1">
+              <a:rPr lang="en-US" sz="2950" dirty="0" err="1">
                 <a:solidFill>
                   <a:srgbClr val="272727"/>
                 </a:solidFill>
@@ -8424,7 +7691,7 @@
               <a:t>informações</a:t>
             </a:r>
             <a:r>
-              <a:rPr lang="en-US" sz="2800" dirty="0">
+              <a:rPr lang="en-US" sz="2950" dirty="0">
                 <a:solidFill>
                   <a:srgbClr val="272727"/>
                 </a:solidFill>
@@ -8434,7 +7701,7 @@
               <a:t> da </a:t>
             </a:r>
             <a:r>
-              <a:rPr lang="en-US" sz="2800" dirty="0" err="1">
+              <a:rPr lang="en-US" sz="2950" dirty="0" err="1">
                 <a:solidFill>
                   <a:srgbClr val="272727"/>
                 </a:solidFill>
@@ -8444,7 +7711,7 @@
               <a:t>ocorrência</a:t>
             </a:r>
             <a:r>
-              <a:rPr lang="en-US" sz="2800" dirty="0">
+              <a:rPr lang="en-US" sz="2950" dirty="0">
                 <a:solidFill>
                   <a:srgbClr val="272727"/>
                 </a:solidFill>
@@ -8454,7 +7721,7 @@
               <a:t> </a:t>
             </a:r>
             <a:r>
-              <a:rPr lang="en-US" sz="2800" dirty="0" err="1">
+              <a:rPr lang="en-US" sz="2950" dirty="0" err="1">
                 <a:solidFill>
                   <a:srgbClr val="272727"/>
                 </a:solidFill>
@@ -8464,7 +7731,7 @@
               <a:t>estarão</a:t>
             </a:r>
             <a:r>
-              <a:rPr lang="en-US" sz="2800" dirty="0">
+              <a:rPr lang="en-US" sz="2950" dirty="0">
                 <a:solidFill>
                   <a:srgbClr val="272727"/>
                 </a:solidFill>
@@ -8474,7 +7741,7 @@
               <a:t> </a:t>
             </a:r>
             <a:r>
-              <a:rPr lang="en-US" sz="2800" dirty="0" err="1">
+              <a:rPr lang="en-US" sz="2950" dirty="0" err="1">
                 <a:solidFill>
                   <a:srgbClr val="272727"/>
                 </a:solidFill>
@@ -8484,7 +7751,7 @@
               <a:t>em</a:t>
             </a:r>
             <a:r>
-              <a:rPr lang="en-US" sz="2800" dirty="0">
+              <a:rPr lang="en-US" sz="2950" dirty="0">
                 <a:solidFill>
                   <a:srgbClr val="272727"/>
                 </a:solidFill>
@@ -8494,7 +7761,7 @@
               <a:t> um banco de dados que </a:t>
             </a:r>
             <a:r>
-              <a:rPr lang="en-US" sz="2800" dirty="0" err="1">
+              <a:rPr lang="en-US" sz="2950" dirty="0" err="1">
                 <a:solidFill>
                   <a:srgbClr val="272727"/>
                 </a:solidFill>
@@ -8504,7 +7771,7 @@
               <a:t>ajudará</a:t>
             </a:r>
             <a:r>
-              <a:rPr lang="en-US" sz="2800" dirty="0">
+              <a:rPr lang="en-US" sz="2950" dirty="0">
                 <a:solidFill>
                   <a:srgbClr val="272727"/>
                 </a:solidFill>
@@ -8514,7 +7781,7 @@
               <a:t> </a:t>
             </a:r>
             <a:r>
-              <a:rPr lang="en-US" sz="2800" dirty="0" err="1">
+              <a:rPr lang="en-US" sz="2950" dirty="0" err="1">
                 <a:solidFill>
                   <a:srgbClr val="272727"/>
                 </a:solidFill>
@@ -8524,7 +7791,7 @@
               <a:t>na</a:t>
             </a:r>
             <a:r>
-              <a:rPr lang="en-US" sz="2800" dirty="0">
+              <a:rPr lang="en-US" sz="2950" dirty="0">
                 <a:solidFill>
                   <a:srgbClr val="272727"/>
                 </a:solidFill>
@@ -8534,7 +7801,7 @@
               <a:t> </a:t>
             </a:r>
             <a:r>
-              <a:rPr lang="en-US" sz="2800" dirty="0" err="1">
+              <a:rPr lang="en-US" sz="2950" dirty="0" err="1">
                 <a:solidFill>
                   <a:srgbClr val="272727"/>
                 </a:solidFill>
@@ -8544,7 +7811,7 @@
               <a:t>avaliação</a:t>
             </a:r>
             <a:r>
-              <a:rPr lang="en-US" sz="2800" dirty="0">
+              <a:rPr lang="en-US" sz="2950" dirty="0">
                 <a:solidFill>
                   <a:srgbClr val="272727"/>
                 </a:solidFill>
@@ -8554,7 +7821,7 @@
               <a:t> de </a:t>
             </a:r>
             <a:r>
-              <a:rPr lang="en-US" sz="2800" dirty="0" err="1">
+              <a:rPr lang="en-US" sz="2950" dirty="0" err="1">
                 <a:solidFill>
                   <a:srgbClr val="272727"/>
                 </a:solidFill>
@@ -8564,7 +7831,7 @@
               <a:t>incidências</a:t>
             </a:r>
             <a:r>
-              <a:rPr lang="en-US" sz="2800" dirty="0">
+              <a:rPr lang="en-US" sz="2950" dirty="0">
                 <a:solidFill>
                   <a:srgbClr val="272727"/>
                 </a:solidFill>
@@ -13000,6 +12267,49 @@
           </a:solidFill>
         </p:spPr>
       </p:sp>
+      <p:sp>
+        <p:nvSpPr>
+          <p:cNvPr id="15" name="CaixaDeTexto 14">
+            <a:extLst>
+              <a:ext uri="{FF2B5EF4-FFF2-40B4-BE49-F238E27FC236}">
+                <a16:creationId xmlns:a16="http://schemas.microsoft.com/office/drawing/2014/main" id="{C87BBC89-051B-459D-84DF-489BE2CB965D}"/>
+              </a:ext>
+            </a:extLst>
+          </p:cNvPr>
+          <p:cNvSpPr txBox="1"/>
+          <p:nvPr/>
+        </p:nvSpPr>
+        <p:spPr>
+          <a:xfrm>
+            <a:off x="14020800" y="9836727"/>
+            <a:ext cx="4114800" cy="369332"/>
+          </a:xfrm>
+          <a:prstGeom prst="rect">
+            <a:avLst/>
+          </a:prstGeom>
+          <a:noFill/>
+        </p:spPr>
+        <p:txBody>
+          <a:bodyPr wrap="square">
+            <a:spAutoFit/>
+          </a:bodyPr>
+          <a:lstStyle/>
+          <a:p>
+            <a:r>
+              <a:rPr lang="pt-BR" dirty="0"/>
+              <a:t>https://app.heflo.com/</a:t>
+            </a:r>
+            <a:r>
+              <a:rPr lang="pt-BR" dirty="0" err="1"/>
+              <a:t>Process</a:t>
+            </a:r>
+            <a:r>
+              <a:rPr lang="pt-BR" dirty="0"/>
+              <a:t>/Editor#&amp;</a:t>
+            </a:r>
+          </a:p>
+        </p:txBody>
+      </p:sp>
     </p:spTree>
   </p:cSld>
   <p:clrMapOvr>
@@ -13123,6 +12433,110 @@
           </a:prstGeom>
         </p:spPr>
       </p:pic>
+      <p:sp>
+        <p:nvSpPr>
+          <p:cNvPr id="6" name="Retângulo 5">
+            <a:extLst>
+              <a:ext uri="{FF2B5EF4-FFF2-40B4-BE49-F238E27FC236}">
+                <a16:creationId xmlns:a16="http://schemas.microsoft.com/office/drawing/2014/main" id="{8F9B9FEA-B3FB-49FB-8AE5-D59715E248C8}"/>
+              </a:ext>
+            </a:extLst>
+          </p:cNvPr>
+          <p:cNvSpPr/>
+          <p:nvPr/>
+        </p:nvSpPr>
+        <p:spPr>
+          <a:xfrm>
+            <a:off x="14325600" y="6134100"/>
+            <a:ext cx="797265" cy="3847193"/>
+          </a:xfrm>
+          <a:prstGeom prst="rect">
+            <a:avLst/>
+          </a:prstGeom>
+          <a:solidFill>
+            <a:srgbClr val="FFFFFF"/>
+          </a:solidFill>
+          <a:ln>
+            <a:noFill/>
+          </a:ln>
+        </p:spPr>
+        <p:style>
+          <a:lnRef idx="2">
+            <a:schemeClr val="accent1">
+              <a:shade val="50000"/>
+            </a:schemeClr>
+          </a:lnRef>
+          <a:fillRef idx="1">
+            <a:schemeClr val="accent1"/>
+          </a:fillRef>
+          <a:effectRef idx="0">
+            <a:schemeClr val="accent1"/>
+          </a:effectRef>
+          <a:fontRef idx="minor">
+            <a:schemeClr val="lt1"/>
+          </a:fontRef>
+        </p:style>
+        <p:txBody>
+          <a:bodyPr rtlCol="0" anchor="ctr"/>
+          <a:lstStyle/>
+          <a:p>
+            <a:pPr algn="ctr"/>
+            <a:endParaRPr lang="pt-BR"/>
+          </a:p>
+        </p:txBody>
+      </p:sp>
+      <p:sp>
+        <p:nvSpPr>
+          <p:cNvPr id="8" name="Retângulo 7">
+            <a:extLst>
+              <a:ext uri="{FF2B5EF4-FFF2-40B4-BE49-F238E27FC236}">
+                <a16:creationId xmlns:a16="http://schemas.microsoft.com/office/drawing/2014/main" id="{C42DEBBC-8BF5-4CE4-957B-37477630E382}"/>
+              </a:ext>
+            </a:extLst>
+          </p:cNvPr>
+          <p:cNvSpPr/>
+          <p:nvPr/>
+        </p:nvSpPr>
+        <p:spPr>
+          <a:xfrm>
+            <a:off x="14381647" y="1485900"/>
+            <a:ext cx="797265" cy="3082096"/>
+          </a:xfrm>
+          <a:prstGeom prst="rect">
+            <a:avLst/>
+          </a:prstGeom>
+          <a:solidFill>
+            <a:srgbClr val="FFFFFF"/>
+          </a:solidFill>
+          <a:ln>
+            <a:noFill/>
+          </a:ln>
+        </p:spPr>
+        <p:style>
+          <a:lnRef idx="2">
+            <a:schemeClr val="accent1">
+              <a:shade val="50000"/>
+            </a:schemeClr>
+          </a:lnRef>
+          <a:fillRef idx="1">
+            <a:schemeClr val="accent1"/>
+          </a:fillRef>
+          <a:effectRef idx="0">
+            <a:schemeClr val="accent1"/>
+          </a:effectRef>
+          <a:fontRef idx="minor">
+            <a:schemeClr val="lt1"/>
+          </a:fontRef>
+        </p:style>
+        <p:txBody>
+          <a:bodyPr rtlCol="0" anchor="ctr"/>
+          <a:lstStyle/>
+          <a:p>
+            <a:pPr algn="ctr"/>
+            <a:endParaRPr lang="pt-BR"/>
+          </a:p>
+        </p:txBody>
+      </p:sp>
     </p:spTree>
   </p:cSld>
   <p:clrMapOvr>

</xml_diff>

<commit_message>
Subindo correções nas validações de cadastro
</commit_message>
<xml_diff>
--- a/SuperVisorPower.pptx
+++ b/SuperVisorPower.pptx
@@ -411,7 +411,7 @@
           <a:p>
             <a:fld id="{3B312FA6-4337-4BD9-AFAC-785525BE7400}" type="slidenum">
               <a:rPr lang="pt-BR" smtClean="0"/>
-              <a:t>‹nº›</a:t>
+              <a:t>‹#›</a:t>
             </a:fld>
             <a:endParaRPr lang="pt-BR"/>
           </a:p>
@@ -995,7 +995,7 @@
             <a:fld id="{B6F15528-21DE-4FAA-801E-634DDDAF4B2B}" type="slidenum">
               <a:rPr lang="en-US" smtClean="0"/>
               <a:pPr/>
-              <a:t>‹nº›</a:t>
+              <a:t>‹#›</a:t>
             </a:fld>
             <a:endParaRPr lang="en-US"/>
           </a:p>
@@ -1160,7 +1160,7 @@
             <a:fld id="{B6F15528-21DE-4FAA-801E-634DDDAF4B2B}" type="slidenum">
               <a:rPr lang="en-US" smtClean="0"/>
               <a:pPr/>
-              <a:t>‹nº›</a:t>
+              <a:t>‹#›</a:t>
             </a:fld>
             <a:endParaRPr lang="en-US"/>
           </a:p>
@@ -1335,7 +1335,7 @@
             <a:fld id="{B6F15528-21DE-4FAA-801E-634DDDAF4B2B}" type="slidenum">
               <a:rPr lang="en-US" smtClean="0"/>
               <a:pPr/>
-              <a:t>‹nº›</a:t>
+              <a:t>‹#›</a:t>
             </a:fld>
             <a:endParaRPr lang="en-US"/>
           </a:p>
@@ -1500,7 +1500,7 @@
             <a:fld id="{B6F15528-21DE-4FAA-801E-634DDDAF4B2B}" type="slidenum">
               <a:rPr lang="en-US" smtClean="0"/>
               <a:pPr/>
-              <a:t>‹nº›</a:t>
+              <a:t>‹#›</a:t>
             </a:fld>
             <a:endParaRPr lang="en-US"/>
           </a:p>
@@ -1742,7 +1742,7 @@
             <a:fld id="{B6F15528-21DE-4FAA-801E-634DDDAF4B2B}" type="slidenum">
               <a:rPr lang="en-US" smtClean="0"/>
               <a:pPr/>
-              <a:t>‹nº›</a:t>
+              <a:t>‹#›</a:t>
             </a:fld>
             <a:endParaRPr lang="en-US"/>
           </a:p>
@@ -2024,7 +2024,7 @@
             <a:fld id="{B6F15528-21DE-4FAA-801E-634DDDAF4B2B}" type="slidenum">
               <a:rPr lang="en-US" smtClean="0"/>
               <a:pPr/>
-              <a:t>‹nº›</a:t>
+              <a:t>‹#›</a:t>
             </a:fld>
             <a:endParaRPr lang="en-US"/>
           </a:p>
@@ -2440,7 +2440,7 @@
             <a:fld id="{B6F15528-21DE-4FAA-801E-634DDDAF4B2B}" type="slidenum">
               <a:rPr lang="en-US" smtClean="0"/>
               <a:pPr/>
-              <a:t>‹nº›</a:t>
+              <a:t>‹#›</a:t>
             </a:fld>
             <a:endParaRPr lang="en-US"/>
           </a:p>
@@ -2554,7 +2554,7 @@
             <a:fld id="{B6F15528-21DE-4FAA-801E-634DDDAF4B2B}" type="slidenum">
               <a:rPr lang="en-US" smtClean="0"/>
               <a:pPr/>
-              <a:t>‹nº›</a:t>
+              <a:t>‹#›</a:t>
             </a:fld>
             <a:endParaRPr lang="en-US"/>
           </a:p>
@@ -2646,7 +2646,7 @@
             <a:fld id="{B6F15528-21DE-4FAA-801E-634DDDAF4B2B}" type="slidenum">
               <a:rPr lang="en-US" smtClean="0"/>
               <a:pPr/>
-              <a:t>‹nº›</a:t>
+              <a:t>‹#›</a:t>
             </a:fld>
             <a:endParaRPr lang="en-US"/>
           </a:p>
@@ -2918,7 +2918,7 @@
             <a:fld id="{B6F15528-21DE-4FAA-801E-634DDDAF4B2B}" type="slidenum">
               <a:rPr lang="en-US" smtClean="0"/>
               <a:pPr/>
-              <a:t>‹nº›</a:t>
+              <a:t>‹#›</a:t>
             </a:fld>
             <a:endParaRPr lang="en-US"/>
           </a:p>
@@ -3167,7 +3167,7 @@
             <a:fld id="{B6F15528-21DE-4FAA-801E-634DDDAF4B2B}" type="slidenum">
               <a:rPr lang="en-US" smtClean="0"/>
               <a:pPr/>
-              <a:t>‹nº›</a:t>
+              <a:t>‹#›</a:t>
             </a:fld>
             <a:endParaRPr lang="en-US"/>
           </a:p>
@@ -3411,7 +3411,7 @@
             <a:fld id="{B6F15528-21DE-4FAA-801E-634DDDAF4B2B}" type="slidenum">
               <a:rPr lang="en-US" smtClean="0"/>
               <a:pPr/>
-              <a:t>‹nº›</a:t>
+              <a:t>‹#›</a:t>
             </a:fld>
             <a:endParaRPr lang="en-US"/>
           </a:p>
@@ -4837,7 +4837,7 @@
         </p:blipFill>
         <p:spPr>
           <a:xfrm>
-            <a:off x="3548743" y="1679054"/>
+            <a:off x="3581400" y="1632254"/>
             <a:ext cx="11125200" cy="7956782"/>
           </a:xfrm>
           <a:prstGeom prst="rect">
@@ -5114,6 +5114,53 @@
           </a:p>
         </p:txBody>
       </p:sp>
+      <p:pic>
+        <p:nvPicPr>
+          <p:cNvPr id="2052" name="Picture 4">
+            <a:extLst>
+              <a:ext uri="{FF2B5EF4-FFF2-40B4-BE49-F238E27FC236}">
+                <a16:creationId xmlns:a16="http://schemas.microsoft.com/office/drawing/2014/main" id="{F55B3A27-319F-44A8-AB87-B023E02510CA}"/>
+              </a:ext>
+            </a:extLst>
+          </p:cNvPr>
+          <p:cNvPicPr>
+            <a:picLocks noChangeAspect="1" noChangeArrowheads="1"/>
+          </p:cNvPicPr>
+          <p:nvPr/>
+        </p:nvPicPr>
+        <p:blipFill>
+          <a:blip r:embed="rId3">
+            <a:extLst>
+              <a:ext uri="{28A0092B-C50C-407E-A947-70E740481C1C}">
+                <a14:useLocalDpi xmlns:a14="http://schemas.microsoft.com/office/drawing/2010/main" val="0"/>
+              </a:ext>
+            </a:extLst>
+          </a:blip>
+          <a:srcRect/>
+          <a:stretch>
+            <a:fillRect/>
+          </a:stretch>
+        </p:blipFill>
+        <p:spPr bwMode="auto">
+          <a:xfrm>
+            <a:off x="4291012" y="1221872"/>
+            <a:ext cx="9705975" cy="8075772"/>
+          </a:xfrm>
+          <a:prstGeom prst="rect">
+            <a:avLst/>
+          </a:prstGeom>
+          <a:noFill/>
+          <a:extLst>
+            <a:ext uri="{909E8E84-426E-40DD-AFC4-6F175D3DCCD1}">
+              <a14:hiddenFill xmlns:a14="http://schemas.microsoft.com/office/drawing/2010/main">
+                <a:solidFill>
+                  <a:srgbClr val="FFFFFF"/>
+                </a:solidFill>
+              </a14:hiddenFill>
+            </a:ext>
+          </a:extLst>
+        </p:spPr>
+      </p:pic>
     </p:spTree>
     <p:extLst>
       <p:ext uri="{BB962C8B-B14F-4D97-AF65-F5344CB8AC3E}">
@@ -6145,6 +6192,153 @@
           </a:p>
           <a:p>
             <a:pPr algn="just"/>
+            <a:r>
+              <a:rPr lang="en-US" dirty="0" err="1">
+                <a:cs typeface="Calibri"/>
+              </a:rPr>
+              <a:t>Portanto</a:t>
+            </a:r>
+            <a:r>
+              <a:rPr lang="en-US" dirty="0">
+                <a:cs typeface="Calibri"/>
+              </a:rPr>
+              <a:t>, </a:t>
+            </a:r>
+            <a:r>
+              <a:rPr lang="en-US" dirty="0" err="1">
+                <a:cs typeface="Calibri"/>
+              </a:rPr>
+              <a:t>nossa</a:t>
+            </a:r>
+            <a:r>
+              <a:rPr lang="en-US" dirty="0">
+                <a:cs typeface="Calibri"/>
+              </a:rPr>
+              <a:t> </a:t>
+            </a:r>
+            <a:r>
+              <a:rPr lang="en-US" dirty="0" err="1">
+                <a:cs typeface="Calibri"/>
+              </a:rPr>
+              <a:t>solução</a:t>
+            </a:r>
+            <a:r>
+              <a:rPr lang="en-US" dirty="0">
+                <a:cs typeface="Calibri"/>
+              </a:rPr>
+              <a:t> visa, </a:t>
+            </a:r>
+            <a:r>
+              <a:rPr lang="en-US" dirty="0" err="1">
+                <a:cs typeface="Calibri"/>
+              </a:rPr>
+              <a:t>principalmente</a:t>
+            </a:r>
+            <a:r>
+              <a:rPr lang="en-US" dirty="0">
+                <a:cs typeface="Calibri"/>
+              </a:rPr>
+              <a:t>, minimizer </a:t>
+            </a:r>
+            <a:r>
+              <a:rPr lang="en-US" dirty="0" err="1">
+                <a:cs typeface="Calibri"/>
+              </a:rPr>
+              <a:t>ao</a:t>
+            </a:r>
+            <a:r>
+              <a:rPr lang="en-US" dirty="0">
+                <a:cs typeface="Calibri"/>
+              </a:rPr>
+              <a:t> </a:t>
+            </a:r>
+            <a:r>
+              <a:rPr lang="en-US" dirty="0" err="1">
+                <a:cs typeface="Calibri"/>
+              </a:rPr>
+              <a:t>máximo</a:t>
+            </a:r>
+            <a:r>
+              <a:rPr lang="en-US" dirty="0">
+                <a:cs typeface="Calibri"/>
+              </a:rPr>
+              <a:t> a </a:t>
+            </a:r>
+            <a:r>
+              <a:rPr lang="en-US" dirty="0" err="1">
+                <a:cs typeface="Calibri"/>
+              </a:rPr>
+              <a:t>perda</a:t>
+            </a:r>
+            <a:r>
+              <a:rPr lang="en-US" dirty="0">
+                <a:cs typeface="Calibri"/>
+              </a:rPr>
+              <a:t> de tempo de aula </a:t>
+            </a:r>
+            <a:r>
+              <a:rPr lang="en-US" dirty="0" err="1">
+                <a:cs typeface="Calibri"/>
+              </a:rPr>
+              <a:t>ao</a:t>
+            </a:r>
+            <a:r>
+              <a:rPr lang="en-US" dirty="0">
+                <a:cs typeface="Calibri"/>
+              </a:rPr>
+              <a:t> </a:t>
+            </a:r>
+            <a:r>
+              <a:rPr lang="en-US" dirty="0" err="1">
+                <a:cs typeface="Calibri"/>
+              </a:rPr>
+              <a:t>esperar</a:t>
+            </a:r>
+            <a:r>
+              <a:rPr lang="en-US" dirty="0">
+                <a:cs typeface="Calibri"/>
+              </a:rPr>
+              <a:t> o </a:t>
+            </a:r>
+            <a:r>
+              <a:rPr lang="en-US" dirty="0" err="1">
+                <a:cs typeface="Calibri"/>
+              </a:rPr>
+              <a:t>técnico</a:t>
+            </a:r>
+            <a:r>
+              <a:rPr lang="en-US" dirty="0">
+                <a:cs typeface="Calibri"/>
+              </a:rPr>
+              <a:t> </a:t>
+            </a:r>
+            <a:r>
+              <a:rPr lang="en-US" dirty="0" err="1">
+                <a:cs typeface="Calibri"/>
+              </a:rPr>
+              <a:t>solucionar</a:t>
+            </a:r>
+            <a:r>
+              <a:rPr lang="en-US" dirty="0">
+                <a:cs typeface="Calibri"/>
+              </a:rPr>
+              <a:t> o </a:t>
+            </a:r>
+            <a:r>
+              <a:rPr lang="en-US" dirty="0" err="1">
+                <a:cs typeface="Calibri"/>
+              </a:rPr>
+              <a:t>problema</a:t>
+            </a:r>
+            <a:r>
+              <a:rPr lang="en-US" dirty="0">
+                <a:cs typeface="Calibri"/>
+              </a:rPr>
+              <a:t>.</a:t>
+            </a:r>
+          </a:p>
+          <a:p>
+            <a:pPr algn="just"/>
             <a:endParaRPr lang="en-US" sz="2800" dirty="0"/>
           </a:p>
         </p:txBody>
@@ -6278,12 +6472,66 @@
           </a:p>
         </p:txBody>
       </p:sp>
+      <p:sp>
+        <p:nvSpPr>
+          <p:cNvPr id="28" name="AutoShape 3">
+            <a:extLst>
+              <a:ext uri="{FF2B5EF4-FFF2-40B4-BE49-F238E27FC236}">
+                <a16:creationId xmlns:a16="http://schemas.microsoft.com/office/drawing/2014/main" id="{D8658241-8236-4350-B755-B422C4803C46}"/>
+              </a:ext>
+            </a:extLst>
+          </p:cNvPr>
+          <p:cNvSpPr/>
+          <p:nvPr/>
+        </p:nvSpPr>
+        <p:spPr>
+          <a:xfrm>
+            <a:off x="0" y="9715500"/>
+            <a:ext cx="18288000" cy="571500"/>
+          </a:xfrm>
+          <a:prstGeom prst="rect">
+            <a:avLst/>
+          </a:prstGeom>
+          <a:solidFill>
+            <a:schemeClr val="tx2">
+              <a:lumMod val="75000"/>
+            </a:schemeClr>
+          </a:solidFill>
+        </p:spPr>
+      </p:sp>
+      <p:sp>
+        <p:nvSpPr>
+          <p:cNvPr id="30" name="AutoShape 3">
+            <a:extLst>
+              <a:ext uri="{FF2B5EF4-FFF2-40B4-BE49-F238E27FC236}">
+                <a16:creationId xmlns:a16="http://schemas.microsoft.com/office/drawing/2014/main" id="{071767E6-D558-49EA-826E-908E2A0A238F}"/>
+              </a:ext>
+            </a:extLst>
+          </p:cNvPr>
+          <p:cNvSpPr/>
+          <p:nvPr/>
+        </p:nvSpPr>
+        <p:spPr>
+          <a:xfrm>
+            <a:off x="0" y="9639300"/>
+            <a:ext cx="18288000" cy="152400"/>
+          </a:xfrm>
+          <a:prstGeom prst="rect">
+            <a:avLst/>
+          </a:prstGeom>
+          <a:solidFill>
+            <a:schemeClr val="tx2">
+              <a:lumMod val="50000"/>
+            </a:schemeClr>
+          </a:solidFill>
+        </p:spPr>
+      </p:sp>
       <p:grpSp>
         <p:nvGrpSpPr>
-          <p:cNvPr id="25" name="Group 5">
+          <p:cNvPr id="13" name="Group 5">
             <a:extLst>
               <a:ext uri="{FF2B5EF4-FFF2-40B4-BE49-F238E27FC236}">
-                <a16:creationId xmlns:a16="http://schemas.microsoft.com/office/drawing/2014/main" id="{E3DB7F64-7A04-47F9-B1C5-DD059C34126C}"/>
+                <a16:creationId xmlns:a16="http://schemas.microsoft.com/office/drawing/2014/main" id="{E8D53401-AB7A-406F-8D85-654ABCA2E4E6}"/>
               </a:ext>
             </a:extLst>
           </p:cNvPr>
@@ -6294,7 +6542,7 @@
         </p:nvGrpSpPr>
         <p:grpSpPr>
           <a:xfrm>
-            <a:off x="2847487" y="3086100"/>
+            <a:off x="2923687" y="5171588"/>
             <a:ext cx="200513" cy="200512"/>
             <a:chOff x="0" y="0"/>
             <a:chExt cx="6350000" cy="6349975"/>
@@ -6302,10 +6550,10 @@
         </p:grpSpPr>
         <p:sp>
           <p:nvSpPr>
-            <p:cNvPr id="26" name="Freeform 6">
+            <p:cNvPr id="18" name="Freeform 6">
               <a:extLst>
                 <a:ext uri="{FF2B5EF4-FFF2-40B4-BE49-F238E27FC236}">
-                  <a16:creationId xmlns:a16="http://schemas.microsoft.com/office/drawing/2014/main" id="{30FDD59F-33E4-40F6-AE4A-8BC04DABE642}"/>
+                  <a16:creationId xmlns:a16="http://schemas.microsoft.com/office/drawing/2014/main" id="{62BE3A0C-FF43-4233-8474-186A1576DCEF}"/>
                 </a:ext>
               </a:extLst>
             </p:cNvPr>
@@ -6361,60 +6609,89 @@
           </p:spPr>
         </p:sp>
       </p:grpSp>
-      <p:sp>
-        <p:nvSpPr>
-          <p:cNvPr id="28" name="AutoShape 3">
+      <p:grpSp>
+        <p:nvGrpSpPr>
+          <p:cNvPr id="19" name="Group 5">
             <a:extLst>
               <a:ext uri="{FF2B5EF4-FFF2-40B4-BE49-F238E27FC236}">
-                <a16:creationId xmlns:a16="http://schemas.microsoft.com/office/drawing/2014/main" id="{D8658241-8236-4350-B755-B422C4803C46}"/>
+                <a16:creationId xmlns:a16="http://schemas.microsoft.com/office/drawing/2014/main" id="{4EDC399D-4429-441A-BB57-63D09378E9F3}"/>
               </a:ext>
             </a:extLst>
           </p:cNvPr>
-          <p:cNvSpPr/>
+          <p:cNvGrpSpPr>
+            <a:grpSpLocks noChangeAspect="1"/>
+          </p:cNvGrpSpPr>
           <p:nvPr/>
-        </p:nvSpPr>
-        <p:spPr>
-          <a:xfrm>
-            <a:off x="0" y="9715500"/>
-            <a:ext cx="18288000" cy="571500"/>
-          </a:xfrm>
-          <a:prstGeom prst="rect">
-            <a:avLst/>
-          </a:prstGeom>
-          <a:solidFill>
-            <a:schemeClr val="tx2">
-              <a:lumMod val="75000"/>
-            </a:schemeClr>
-          </a:solidFill>
-        </p:spPr>
-      </p:sp>
-      <p:sp>
-        <p:nvSpPr>
-          <p:cNvPr id="30" name="AutoShape 3">
-            <a:extLst>
-              <a:ext uri="{FF2B5EF4-FFF2-40B4-BE49-F238E27FC236}">
-                <a16:creationId xmlns:a16="http://schemas.microsoft.com/office/drawing/2014/main" id="{071767E6-D558-49EA-826E-908E2A0A238F}"/>
-              </a:ext>
-            </a:extLst>
-          </p:cNvPr>
-          <p:cNvSpPr/>
-          <p:nvPr/>
-        </p:nvSpPr>
-        <p:spPr>
-          <a:xfrm>
-            <a:off x="0" y="9639300"/>
-            <a:ext cx="18288000" cy="152400"/>
-          </a:xfrm>
-          <a:prstGeom prst="rect">
-            <a:avLst/>
-          </a:prstGeom>
-          <a:solidFill>
-            <a:schemeClr val="tx2">
-              <a:lumMod val="50000"/>
-            </a:schemeClr>
-          </a:solidFill>
-        </p:spPr>
-      </p:sp>
+        </p:nvGrpSpPr>
+        <p:grpSpPr>
+          <a:xfrm>
+            <a:off x="2923687" y="3086100"/>
+            <a:ext cx="200513" cy="200512"/>
+            <a:chOff x="0" y="0"/>
+            <a:chExt cx="6350000" cy="6349975"/>
+          </a:xfrm>
+        </p:grpSpPr>
+        <p:sp>
+          <p:nvSpPr>
+            <p:cNvPr id="20" name="Freeform 6">
+              <a:extLst>
+                <a:ext uri="{FF2B5EF4-FFF2-40B4-BE49-F238E27FC236}">
+                  <a16:creationId xmlns:a16="http://schemas.microsoft.com/office/drawing/2014/main" id="{40D3353A-44AC-4BE7-AB62-AADDE5763230}"/>
+                </a:ext>
+              </a:extLst>
+            </p:cNvPr>
+            <p:cNvSpPr/>
+            <p:nvPr/>
+          </p:nvSpPr>
+          <p:spPr>
+            <a:xfrm>
+              <a:off x="0" y="0"/>
+              <a:ext cx="6350000" cy="6349974"/>
+            </a:xfrm>
+            <a:custGeom>
+              <a:avLst/>
+              <a:gdLst/>
+              <a:ahLst/>
+              <a:cxnLst/>
+              <a:rect l="l" t="t" r="r" b="b"/>
+              <a:pathLst>
+                <a:path w="6350000" h="6349974">
+                  <a:moveTo>
+                    <a:pt x="6350000" y="3175025"/>
+                  </a:moveTo>
+                  <a:cubicBezTo>
+                    <a:pt x="6350000" y="4928451"/>
+                    <a:pt x="4928476" y="6349974"/>
+                    <a:pt x="3175000" y="6349974"/>
+                  </a:cubicBezTo>
+                  <a:cubicBezTo>
+                    <a:pt x="1421498" y="6349974"/>
+                    <a:pt x="0" y="4928451"/>
+                    <a:pt x="0" y="3175025"/>
+                  </a:cubicBezTo>
+                  <a:cubicBezTo>
+                    <a:pt x="0" y="1421511"/>
+                    <a:pt x="1421498" y="0"/>
+                    <a:pt x="3175000" y="0"/>
+                  </a:cubicBezTo>
+                  <a:cubicBezTo>
+                    <a:pt x="4928501" y="0"/>
+                    <a:pt x="6350000" y="1421511"/>
+                    <a:pt x="6350000" y="3175025"/>
+                  </a:cubicBezTo>
+                  <a:close/>
+                </a:path>
+              </a:pathLst>
+            </a:custGeom>
+            <a:blipFill>
+              <a:blip r:embed="rId2"/>
+              <a:stretch>
+                <a:fillRect l="-5796" r="-5796"/>
+              </a:stretch>
+            </a:blipFill>
+          </p:spPr>
+        </p:sp>
+      </p:grpSp>
     </p:spTree>
   </p:cSld>
   <p:clrMapOvr>
@@ -9801,8 +10078,8 @@
         </p:nvSpPr>
         <p:spPr>
           <a:xfrm>
-            <a:off x="9296400" y="1333500"/>
-            <a:ext cx="7701835" cy="7761227"/>
+            <a:off x="9296400" y="2113982"/>
+            <a:ext cx="7701835" cy="5811976"/>
           </a:xfrm>
           <a:prstGeom prst="rect">
             <a:avLst/>
@@ -10295,7 +10572,7 @@
                 <a:latin typeface="Arial" panose="020B0604020202020204" pitchFamily="34" charset="0"/>
                 <a:cs typeface="Arial" panose="020B0604020202020204" pitchFamily="34" charset="0"/>
               </a:rPr>
-              <a:t> de T.I.  </a:t>
+              <a:t> de T.I. fique </a:t>
             </a:r>
             <a:r>
               <a:rPr lang="en-US" sz="2948" dirty="0" err="1">
@@ -10396,289 +10673,6 @@
                 <a:cs typeface="Arial" panose="020B0604020202020204" pitchFamily="34" charset="0"/>
               </a:rPr>
               <a:t>. </a:t>
-            </a:r>
-          </a:p>
-          <a:p>
-            <a:pPr marL="318291" lvl="1" algn="just">
-              <a:lnSpc>
-                <a:spcPts val="3833"/>
-              </a:lnSpc>
-            </a:pPr>
-            <a:endParaRPr lang="en-US" sz="2948" dirty="0">
-              <a:solidFill>
-                <a:srgbClr val="272727"/>
-              </a:solidFill>
-              <a:latin typeface="Arial" panose="020B0604020202020204" pitchFamily="34" charset="0"/>
-              <a:cs typeface="Arial" panose="020B0604020202020204" pitchFamily="34" charset="0"/>
-            </a:endParaRPr>
-          </a:p>
-          <a:p>
-            <a:pPr marL="636581" lvl="1" indent="-318290" algn="just">
-              <a:lnSpc>
-                <a:spcPts val="3833"/>
-              </a:lnSpc>
-              <a:buFont typeface="Arial"/>
-              <a:buChar char="•"/>
-            </a:pPr>
-            <a:r>
-              <a:rPr lang="en-US" sz="2948" dirty="0" err="1">
-                <a:solidFill>
-                  <a:srgbClr val="272727"/>
-                </a:solidFill>
-                <a:latin typeface="Arial" panose="020B0604020202020204" pitchFamily="34" charset="0"/>
-                <a:cs typeface="Arial" panose="020B0604020202020204" pitchFamily="34" charset="0"/>
-              </a:rPr>
-              <a:t>Terá</a:t>
-            </a:r>
-            <a:r>
-              <a:rPr lang="en-US" sz="2948" dirty="0">
-                <a:solidFill>
-                  <a:srgbClr val="272727"/>
-                </a:solidFill>
-                <a:latin typeface="Arial" panose="020B0604020202020204" pitchFamily="34" charset="0"/>
-                <a:cs typeface="Arial" panose="020B0604020202020204" pitchFamily="34" charset="0"/>
-              </a:rPr>
-              <a:t> </a:t>
-            </a:r>
-            <a:r>
-              <a:rPr lang="en-US" sz="2948" dirty="0" err="1">
-                <a:solidFill>
-                  <a:srgbClr val="272727"/>
-                </a:solidFill>
-                <a:latin typeface="Arial" panose="020B0604020202020204" pitchFamily="34" charset="0"/>
-                <a:cs typeface="Arial" panose="020B0604020202020204" pitchFamily="34" charset="0"/>
-              </a:rPr>
-              <a:t>uma</a:t>
-            </a:r>
-            <a:r>
-              <a:rPr lang="en-US" sz="2948" dirty="0">
-                <a:solidFill>
-                  <a:srgbClr val="272727"/>
-                </a:solidFill>
-                <a:latin typeface="Arial" panose="020B0604020202020204" pitchFamily="34" charset="0"/>
-                <a:cs typeface="Arial" panose="020B0604020202020204" pitchFamily="34" charset="0"/>
-              </a:rPr>
-              <a:t> </a:t>
-            </a:r>
-            <a:r>
-              <a:rPr lang="en-US" sz="2948" dirty="0" err="1">
-                <a:solidFill>
-                  <a:srgbClr val="272727"/>
-                </a:solidFill>
-                <a:latin typeface="Arial" panose="020B0604020202020204" pitchFamily="34" charset="0"/>
-                <a:cs typeface="Arial" panose="020B0604020202020204" pitchFamily="34" charset="0"/>
-              </a:rPr>
-              <a:t>avaliação</a:t>
-            </a:r>
-            <a:r>
-              <a:rPr lang="en-US" sz="2948" dirty="0">
-                <a:solidFill>
-                  <a:srgbClr val="272727"/>
-                </a:solidFill>
-                <a:latin typeface="Arial" panose="020B0604020202020204" pitchFamily="34" charset="0"/>
-                <a:cs typeface="Arial" panose="020B0604020202020204" pitchFamily="34" charset="0"/>
-              </a:rPr>
-              <a:t> </a:t>
-            </a:r>
-            <a:r>
-              <a:rPr lang="en-US" sz="2948" dirty="0" err="1">
-                <a:solidFill>
-                  <a:srgbClr val="272727"/>
-                </a:solidFill>
-                <a:latin typeface="Arial" panose="020B0604020202020204" pitchFamily="34" charset="0"/>
-                <a:cs typeface="Arial" panose="020B0604020202020204" pitchFamily="34" charset="0"/>
-              </a:rPr>
-              <a:t>por</a:t>
-            </a:r>
-            <a:r>
-              <a:rPr lang="en-US" sz="2948" dirty="0">
-                <a:solidFill>
-                  <a:srgbClr val="272727"/>
-                </a:solidFill>
-                <a:latin typeface="Arial" panose="020B0604020202020204" pitchFamily="34" charset="0"/>
-                <a:cs typeface="Arial" panose="020B0604020202020204" pitchFamily="34" charset="0"/>
-              </a:rPr>
-              <a:t> </a:t>
-            </a:r>
-            <a:r>
-              <a:rPr lang="en-US" sz="2948" dirty="0" err="1">
-                <a:solidFill>
-                  <a:srgbClr val="272727"/>
-                </a:solidFill>
-                <a:latin typeface="Arial" panose="020B0604020202020204" pitchFamily="34" charset="0"/>
-                <a:cs typeface="Arial" panose="020B0604020202020204" pitchFamily="34" charset="0"/>
-              </a:rPr>
-              <a:t>pontuação</a:t>
-            </a:r>
-            <a:r>
-              <a:rPr lang="en-US" sz="2948" dirty="0">
-                <a:solidFill>
-                  <a:srgbClr val="272727"/>
-                </a:solidFill>
-                <a:latin typeface="Arial" panose="020B0604020202020204" pitchFamily="34" charset="0"/>
-                <a:cs typeface="Arial" panose="020B0604020202020204" pitchFamily="34" charset="0"/>
-              </a:rPr>
-              <a:t> um </a:t>
-            </a:r>
-            <a:r>
-              <a:rPr lang="en-US" sz="2948" dirty="0" err="1">
-                <a:solidFill>
-                  <a:srgbClr val="272727"/>
-                </a:solidFill>
-                <a:latin typeface="Arial" panose="020B0604020202020204" pitchFamily="34" charset="0"/>
-                <a:cs typeface="Arial" panose="020B0604020202020204" pitchFamily="34" charset="0"/>
-              </a:rPr>
-              <a:t>período</a:t>
-            </a:r>
-            <a:r>
-              <a:rPr lang="en-US" sz="2948" dirty="0">
-                <a:solidFill>
-                  <a:srgbClr val="272727"/>
-                </a:solidFill>
-                <a:latin typeface="Arial" panose="020B0604020202020204" pitchFamily="34" charset="0"/>
-                <a:cs typeface="Arial" panose="020B0604020202020204" pitchFamily="34" charset="0"/>
-              </a:rPr>
-              <a:t> </a:t>
-            </a:r>
-            <a:r>
-              <a:rPr lang="en-US" sz="2948" dirty="0" err="1">
-                <a:solidFill>
-                  <a:srgbClr val="272727"/>
-                </a:solidFill>
-                <a:latin typeface="Arial" panose="020B0604020202020204" pitchFamily="34" charset="0"/>
-                <a:cs typeface="Arial" panose="020B0604020202020204" pitchFamily="34" charset="0"/>
-              </a:rPr>
-              <a:t>após</a:t>
-            </a:r>
-            <a:r>
-              <a:rPr lang="en-US" sz="2948" dirty="0">
-                <a:solidFill>
-                  <a:srgbClr val="272727"/>
-                </a:solidFill>
-                <a:latin typeface="Arial" panose="020B0604020202020204" pitchFamily="34" charset="0"/>
-                <a:cs typeface="Arial" panose="020B0604020202020204" pitchFamily="34" charset="0"/>
-              </a:rPr>
-              <a:t> o </a:t>
-            </a:r>
-            <a:r>
-              <a:rPr lang="en-US" sz="2948" dirty="0" err="1">
-                <a:solidFill>
-                  <a:srgbClr val="272727"/>
-                </a:solidFill>
-                <a:latin typeface="Arial" panose="020B0604020202020204" pitchFamily="34" charset="0"/>
-                <a:cs typeface="Arial" panose="020B0604020202020204" pitchFamily="34" charset="0"/>
-              </a:rPr>
-              <a:t>atendimento</a:t>
-            </a:r>
-            <a:r>
-              <a:rPr lang="en-US" sz="2948" dirty="0">
-                <a:solidFill>
-                  <a:srgbClr val="272727"/>
-                </a:solidFill>
-                <a:latin typeface="Arial" panose="020B0604020202020204" pitchFamily="34" charset="0"/>
-                <a:cs typeface="Arial" panose="020B0604020202020204" pitchFamily="34" charset="0"/>
-              </a:rPr>
-              <a:t> para </a:t>
-            </a:r>
-            <a:r>
-              <a:rPr lang="en-US" sz="2948" dirty="0" err="1">
-                <a:solidFill>
-                  <a:srgbClr val="272727"/>
-                </a:solidFill>
-                <a:latin typeface="Arial" panose="020B0604020202020204" pitchFamily="34" charset="0"/>
-                <a:cs typeface="Arial" panose="020B0604020202020204" pitchFamily="34" charset="0"/>
-              </a:rPr>
-              <a:t>termos</a:t>
-            </a:r>
-            <a:r>
-              <a:rPr lang="en-US" sz="2948" dirty="0">
-                <a:solidFill>
-                  <a:srgbClr val="272727"/>
-                </a:solidFill>
-                <a:latin typeface="Arial" panose="020B0604020202020204" pitchFamily="34" charset="0"/>
-                <a:cs typeface="Arial" panose="020B0604020202020204" pitchFamily="34" charset="0"/>
-              </a:rPr>
-              <a:t> </a:t>
-            </a:r>
-            <a:r>
-              <a:rPr lang="en-US" sz="2948" dirty="0" err="1">
-                <a:solidFill>
-                  <a:srgbClr val="272727"/>
-                </a:solidFill>
-                <a:latin typeface="Arial" panose="020B0604020202020204" pitchFamily="34" charset="0"/>
-                <a:cs typeface="Arial" panose="020B0604020202020204" pitchFamily="34" charset="0"/>
-              </a:rPr>
-              <a:t>uma</a:t>
-            </a:r>
-            <a:r>
-              <a:rPr lang="en-US" sz="2948" dirty="0">
-                <a:solidFill>
-                  <a:srgbClr val="272727"/>
-                </a:solidFill>
-                <a:latin typeface="Arial" panose="020B0604020202020204" pitchFamily="34" charset="0"/>
-                <a:cs typeface="Arial" panose="020B0604020202020204" pitchFamily="34" charset="0"/>
-              </a:rPr>
-              <a:t> </a:t>
-            </a:r>
-            <a:r>
-              <a:rPr lang="en-US" sz="2948" dirty="0" err="1">
-                <a:solidFill>
-                  <a:srgbClr val="272727"/>
-                </a:solidFill>
-                <a:latin typeface="Arial" panose="020B0604020202020204" pitchFamily="34" charset="0"/>
-                <a:cs typeface="Arial" panose="020B0604020202020204" pitchFamily="34" charset="0"/>
-              </a:rPr>
-              <a:t>melhoria</a:t>
-            </a:r>
-            <a:r>
-              <a:rPr lang="en-US" sz="2948" dirty="0">
-                <a:solidFill>
-                  <a:srgbClr val="272727"/>
-                </a:solidFill>
-                <a:latin typeface="Arial" panose="020B0604020202020204" pitchFamily="34" charset="0"/>
-                <a:cs typeface="Arial" panose="020B0604020202020204" pitchFamily="34" charset="0"/>
-              </a:rPr>
-              <a:t> </a:t>
-            </a:r>
-            <a:r>
-              <a:rPr lang="en-US" sz="2948" dirty="0" err="1">
-                <a:solidFill>
-                  <a:srgbClr val="272727"/>
-                </a:solidFill>
-                <a:latin typeface="Arial" panose="020B0604020202020204" pitchFamily="34" charset="0"/>
-                <a:cs typeface="Arial" panose="020B0604020202020204" pitchFamily="34" charset="0"/>
-              </a:rPr>
-              <a:t>contínua</a:t>
-            </a:r>
-            <a:r>
-              <a:rPr lang="en-US" sz="2948" dirty="0">
-                <a:solidFill>
-                  <a:srgbClr val="272727"/>
-                </a:solidFill>
-                <a:latin typeface="Arial" panose="020B0604020202020204" pitchFamily="34" charset="0"/>
-                <a:cs typeface="Arial" panose="020B0604020202020204" pitchFamily="34" charset="0"/>
-              </a:rPr>
-              <a:t> do </a:t>
-            </a:r>
-            <a:r>
-              <a:rPr lang="en-US" sz="2948" dirty="0" err="1">
-                <a:solidFill>
-                  <a:srgbClr val="272727"/>
-                </a:solidFill>
-                <a:latin typeface="Arial" panose="020B0604020202020204" pitchFamily="34" charset="0"/>
-                <a:cs typeface="Arial" panose="020B0604020202020204" pitchFamily="34" charset="0"/>
-              </a:rPr>
-              <a:t>processo</a:t>
-            </a:r>
-            <a:r>
-              <a:rPr lang="en-US" sz="2948" dirty="0">
-                <a:solidFill>
-                  <a:srgbClr val="272727"/>
-                </a:solidFill>
-                <a:latin typeface="Arial" panose="020B0604020202020204" pitchFamily="34" charset="0"/>
-                <a:cs typeface="Arial" panose="020B0604020202020204" pitchFamily="34" charset="0"/>
-              </a:rPr>
-              <a:t>.</a:t>
             </a:r>
           </a:p>
         </p:txBody>
@@ -10835,7 +10829,7 @@
         <p:spPr>
           <a:xfrm>
             <a:off x="9448800" y="1383013"/>
-            <a:ext cx="7838981" cy="7273914"/>
+            <a:ext cx="7838981" cy="7032694"/>
           </a:xfrm>
           <a:prstGeom prst="rect">
             <a:avLst/>
@@ -10847,57 +10841,109 @@
           </a:bodyPr>
           <a:lstStyle/>
           <a:p>
-            <a:pPr marL="636581" lvl="1" indent="-318290" algn="just">
-              <a:lnSpc>
-                <a:spcPts val="3833"/>
-              </a:lnSpc>
-              <a:buFont typeface="Arial"/>
+            <a:pPr algn="just">
+              <a:spcBef>
+                <a:spcPts val="0"/>
+              </a:spcBef>
+              <a:spcAft>
+                <a:spcPts val="600"/>
+              </a:spcAft>
+            </a:pPr>
+            <a:r>
+              <a:rPr lang="en-US" sz="3600" b="1" dirty="0">
+                <a:solidFill>
+                  <a:schemeClr val="tx1">
+                    <a:lumMod val="85000"/>
+                    <a:lumOff val="15000"/>
+                  </a:schemeClr>
+                </a:solidFill>
+                <a:latin typeface="Arial" panose="020B0604020202020204" pitchFamily="34" charset="0"/>
+                <a:cs typeface="Arial" panose="020B0604020202020204" pitchFamily="34" charset="0"/>
+              </a:rPr>
+              <a:t>CHAT BOT VIA DISCORD</a:t>
+            </a:r>
+          </a:p>
+          <a:p>
+            <a:pPr marL="0" indent="0" algn="just">
+              <a:spcBef>
+                <a:spcPts val="0"/>
+              </a:spcBef>
+              <a:spcAft>
+                <a:spcPts val="600"/>
+              </a:spcAft>
+              <a:buNone/>
+            </a:pPr>
+            <a:r>
+              <a:rPr lang="en-US" sz="3600" dirty="0">
+                <a:solidFill>
+                  <a:schemeClr val="tx1">
+                    <a:lumMod val="85000"/>
+                    <a:lumOff val="15000"/>
+                  </a:schemeClr>
+                </a:solidFill>
+                <a:latin typeface="Arial" panose="020B0604020202020204" pitchFamily="34" charset="0"/>
+                <a:cs typeface="Arial" panose="020B0604020202020204" pitchFamily="34" charset="0"/>
+              </a:rPr>
+              <a:t>   </a:t>
+            </a:r>
+          </a:p>
+          <a:p>
+            <a:pPr marL="571500" indent="-571500" algn="just">
+              <a:spcBef>
+                <a:spcPts val="0"/>
+              </a:spcBef>
+              <a:spcAft>
+                <a:spcPts val="600"/>
+              </a:spcAft>
+              <a:buFont typeface="Arial" panose="020B0604020202020204" pitchFamily="34" charset="0"/>
               <a:buChar char="•"/>
             </a:pPr>
             <a:r>
-              <a:rPr lang="en-US" sz="2948" dirty="0">
-                <a:solidFill>
-                  <a:srgbClr val="272727"/>
-                </a:solidFill>
-                <a:latin typeface="Arial" panose="020B0604020202020204" pitchFamily="34" charset="0"/>
-                <a:cs typeface="Arial" panose="020B0604020202020204" pitchFamily="34" charset="0"/>
-              </a:rPr>
-              <a:t>As </a:t>
-            </a:r>
-            <a:r>
-              <a:rPr lang="en-US" sz="2948" dirty="0" err="1">
-                <a:solidFill>
-                  <a:srgbClr val="272727"/>
-                </a:solidFill>
-                <a:latin typeface="Arial" panose="020B0604020202020204" pitchFamily="34" charset="0"/>
-                <a:cs typeface="Arial" panose="020B0604020202020204" pitchFamily="34" charset="0"/>
-              </a:rPr>
-              <a:t>informações</a:t>
-            </a:r>
-            <a:r>
-              <a:rPr lang="en-US" sz="2948" dirty="0">
-                <a:solidFill>
-                  <a:srgbClr val="272727"/>
-                </a:solidFill>
-                <a:latin typeface="Arial" panose="020B0604020202020204" pitchFamily="34" charset="0"/>
-                <a:cs typeface="Arial" panose="020B0604020202020204" pitchFamily="34" charset="0"/>
-              </a:rPr>
-              <a:t> da </a:t>
-            </a:r>
-            <a:r>
-              <a:rPr lang="en-US" sz="2948" dirty="0" err="1">
-                <a:solidFill>
-                  <a:srgbClr val="272727"/>
-                </a:solidFill>
-                <a:latin typeface="Arial" panose="020B0604020202020204" pitchFamily="34" charset="0"/>
-                <a:cs typeface="Arial" panose="020B0604020202020204" pitchFamily="34" charset="0"/>
-              </a:rPr>
-              <a:t>ocorrência</a:t>
-            </a:r>
-            <a:r>
-              <a:rPr lang="en-US" sz="2948" dirty="0">
-                <a:solidFill>
-                  <a:srgbClr val="272727"/>
+              <a:rPr lang="en-US" sz="3600" dirty="0" err="1">
+                <a:solidFill>
+                  <a:schemeClr val="tx1">
+                    <a:lumMod val="85000"/>
+                    <a:lumOff val="15000"/>
+                  </a:schemeClr>
+                </a:solidFill>
+                <a:latin typeface="Arial" panose="020B0604020202020204" pitchFamily="34" charset="0"/>
+                <a:cs typeface="Arial" panose="020B0604020202020204" pitchFamily="34" charset="0"/>
+              </a:rPr>
+              <a:t>Criação</a:t>
+            </a:r>
+            <a:r>
+              <a:rPr lang="en-US" sz="3600" dirty="0">
+                <a:solidFill>
+                  <a:schemeClr val="tx1">
+                    <a:lumMod val="85000"/>
+                    <a:lumOff val="15000"/>
+                  </a:schemeClr>
+                </a:solidFill>
+                <a:latin typeface="Arial" panose="020B0604020202020204" pitchFamily="34" charset="0"/>
+                <a:cs typeface="Arial" panose="020B0604020202020204" pitchFamily="34" charset="0"/>
+              </a:rPr>
+              <a:t> de um Ticket para </a:t>
+            </a:r>
+            <a:r>
+              <a:rPr lang="en-US" sz="3600" dirty="0" err="1">
+                <a:solidFill>
+                  <a:schemeClr val="tx1">
+                    <a:lumMod val="85000"/>
+                    <a:lumOff val="15000"/>
+                  </a:schemeClr>
+                </a:solidFill>
+                <a:latin typeface="Arial" panose="020B0604020202020204" pitchFamily="34" charset="0"/>
+                <a:cs typeface="Arial" panose="020B0604020202020204" pitchFamily="34" charset="0"/>
+              </a:rPr>
+              <a:t>cada</a:t>
+            </a:r>
+            <a:r>
+              <a:rPr lang="en-US" sz="3600" dirty="0">
+                <a:solidFill>
+                  <a:schemeClr val="tx1">
+                    <a:lumMod val="85000"/>
+                    <a:lumOff val="15000"/>
+                  </a:schemeClr>
                 </a:solidFill>
                 <a:latin typeface="Arial" panose="020B0604020202020204" pitchFamily="34" charset="0"/>
                 <a:cs typeface="Arial" panose="020B0604020202020204" pitchFamily="34" charset="0"/>
@@ -10905,99 +10951,25 @@
               <a:t> </a:t>
             </a:r>
             <a:r>
-              <a:rPr lang="en-US" sz="2948" dirty="0" err="1">
-                <a:solidFill>
-                  <a:srgbClr val="272727"/>
-                </a:solidFill>
-                <a:latin typeface="Arial" panose="020B0604020202020204" pitchFamily="34" charset="0"/>
-                <a:cs typeface="Arial" panose="020B0604020202020204" pitchFamily="34" charset="0"/>
-              </a:rPr>
-              <a:t>estarão</a:t>
-            </a:r>
-            <a:r>
-              <a:rPr lang="en-US" sz="2948" dirty="0">
-                <a:solidFill>
-                  <a:srgbClr val="272727"/>
-                </a:solidFill>
-                <a:latin typeface="Arial" panose="020B0604020202020204" pitchFamily="34" charset="0"/>
-                <a:cs typeface="Arial" panose="020B0604020202020204" pitchFamily="34" charset="0"/>
-              </a:rPr>
-              <a:t> </a:t>
-            </a:r>
-            <a:r>
-              <a:rPr lang="en-US" sz="2948" dirty="0" err="1">
-                <a:solidFill>
-                  <a:srgbClr val="272727"/>
-                </a:solidFill>
-                <a:latin typeface="Arial" panose="020B0604020202020204" pitchFamily="34" charset="0"/>
-                <a:cs typeface="Arial" panose="020B0604020202020204" pitchFamily="34" charset="0"/>
-              </a:rPr>
-              <a:t>em</a:t>
-            </a:r>
-            <a:r>
-              <a:rPr lang="en-US" sz="2948" dirty="0">
-                <a:solidFill>
-                  <a:srgbClr val="272727"/>
-                </a:solidFill>
-                <a:latin typeface="Arial" panose="020B0604020202020204" pitchFamily="34" charset="0"/>
-                <a:cs typeface="Arial" panose="020B0604020202020204" pitchFamily="34" charset="0"/>
-              </a:rPr>
-              <a:t> um banco de dados que </a:t>
-            </a:r>
-            <a:r>
-              <a:rPr lang="en-US" sz="2948" dirty="0" err="1">
-                <a:solidFill>
-                  <a:srgbClr val="272727"/>
-                </a:solidFill>
-                <a:latin typeface="Arial" panose="020B0604020202020204" pitchFamily="34" charset="0"/>
-                <a:cs typeface="Arial" panose="020B0604020202020204" pitchFamily="34" charset="0"/>
-              </a:rPr>
-              <a:t>ajudará</a:t>
-            </a:r>
-            <a:r>
-              <a:rPr lang="en-US" sz="2948" dirty="0">
-                <a:solidFill>
-                  <a:srgbClr val="272727"/>
-                </a:solidFill>
-                <a:latin typeface="Arial" panose="020B0604020202020204" pitchFamily="34" charset="0"/>
-                <a:cs typeface="Arial" panose="020B0604020202020204" pitchFamily="34" charset="0"/>
-              </a:rPr>
-              <a:t> </a:t>
-            </a:r>
-            <a:r>
-              <a:rPr lang="en-US" sz="2948" dirty="0" err="1">
-                <a:solidFill>
-                  <a:srgbClr val="272727"/>
-                </a:solidFill>
-                <a:latin typeface="Arial" panose="020B0604020202020204" pitchFamily="34" charset="0"/>
-                <a:cs typeface="Arial" panose="020B0604020202020204" pitchFamily="34" charset="0"/>
-              </a:rPr>
-              <a:t>na</a:t>
-            </a:r>
-            <a:r>
-              <a:rPr lang="en-US" sz="2948" dirty="0">
-                <a:solidFill>
-                  <a:srgbClr val="272727"/>
-                </a:solidFill>
-                <a:latin typeface="Arial" panose="020B0604020202020204" pitchFamily="34" charset="0"/>
-                <a:cs typeface="Arial" panose="020B0604020202020204" pitchFamily="34" charset="0"/>
-              </a:rPr>
-              <a:t> </a:t>
-            </a:r>
-            <a:r>
-              <a:rPr lang="en-US" sz="2948" dirty="0" err="1">
-                <a:solidFill>
-                  <a:srgbClr val="272727"/>
-                </a:solidFill>
-                <a:latin typeface="Arial" panose="020B0604020202020204" pitchFamily="34" charset="0"/>
-                <a:cs typeface="Arial" panose="020B0604020202020204" pitchFamily="34" charset="0"/>
-              </a:rPr>
-              <a:t>avaliação</a:t>
-            </a:r>
-            <a:r>
-              <a:rPr lang="en-US" sz="2948" dirty="0">
-                <a:solidFill>
-                  <a:srgbClr val="272727"/>
+              <a:rPr lang="en-US" sz="3600" dirty="0" err="1">
+                <a:solidFill>
+                  <a:schemeClr val="tx1">
+                    <a:lumMod val="85000"/>
+                    <a:lumOff val="15000"/>
+                  </a:schemeClr>
+                </a:solidFill>
+                <a:latin typeface="Arial" panose="020B0604020202020204" pitchFamily="34" charset="0"/>
+                <a:cs typeface="Arial" panose="020B0604020202020204" pitchFamily="34" charset="0"/>
+              </a:rPr>
+              <a:t>chamado</a:t>
+            </a:r>
+            <a:r>
+              <a:rPr lang="en-US" sz="3600" dirty="0">
+                <a:solidFill>
+                  <a:schemeClr val="tx1">
+                    <a:lumMod val="85000"/>
+                    <a:lumOff val="15000"/>
+                  </a:schemeClr>
                 </a:solidFill>
                 <a:latin typeface="Arial" panose="020B0604020202020204" pitchFamily="34" charset="0"/>
                 <a:cs typeface="Arial" panose="020B0604020202020204" pitchFamily="34" charset="0"/>
@@ -11005,54 +10977,202 @@
               <a:t> de </a:t>
             </a:r>
             <a:r>
-              <a:rPr lang="en-US" sz="2948" dirty="0" err="1">
-                <a:solidFill>
-                  <a:srgbClr val="272727"/>
-                </a:solidFill>
-                <a:latin typeface="Arial" panose="020B0604020202020204" pitchFamily="34" charset="0"/>
-                <a:cs typeface="Arial" panose="020B0604020202020204" pitchFamily="34" charset="0"/>
-              </a:rPr>
-              <a:t>incidências</a:t>
-            </a:r>
-            <a:r>
-              <a:rPr lang="en-US" sz="2948" dirty="0">
-                <a:solidFill>
-                  <a:srgbClr val="272727"/>
-                </a:solidFill>
-                <a:latin typeface="Arial" panose="020B0604020202020204" pitchFamily="34" charset="0"/>
-                <a:cs typeface="Arial" panose="020B0604020202020204" pitchFamily="34" charset="0"/>
-              </a:rPr>
-              <a:t>. </a:t>
-            </a:r>
-          </a:p>
-          <a:p>
-            <a:pPr marL="636581" lvl="1" indent="-318290" algn="just">
-              <a:lnSpc>
-                <a:spcPts val="3833"/>
-              </a:lnSpc>
-              <a:buFont typeface="Arial"/>
+              <a:rPr lang="en-US" sz="3600" dirty="0" err="1">
+                <a:solidFill>
+                  <a:schemeClr val="tx1">
+                    <a:lumMod val="85000"/>
+                    <a:lumOff val="15000"/>
+                  </a:schemeClr>
+                </a:solidFill>
+                <a:latin typeface="Arial" panose="020B0604020202020204" pitchFamily="34" charset="0"/>
+                <a:cs typeface="Arial" panose="020B0604020202020204" pitchFamily="34" charset="0"/>
+              </a:rPr>
+              <a:t>acordo</a:t>
+            </a:r>
+            <a:r>
+              <a:rPr lang="en-US" sz="3600" dirty="0">
+                <a:solidFill>
+                  <a:schemeClr val="tx1">
+                    <a:lumMod val="85000"/>
+                    <a:lumOff val="15000"/>
+                  </a:schemeClr>
+                </a:solidFill>
+                <a:latin typeface="Arial" panose="020B0604020202020204" pitchFamily="34" charset="0"/>
+                <a:cs typeface="Arial" panose="020B0604020202020204" pitchFamily="34" charset="0"/>
+              </a:rPr>
+              <a:t> com </a:t>
+            </a:r>
+            <a:r>
+              <a:rPr lang="en-US" sz="3600" dirty="0" err="1">
+                <a:solidFill>
+                  <a:schemeClr val="tx1">
+                    <a:lumMod val="85000"/>
+                    <a:lumOff val="15000"/>
+                  </a:schemeClr>
+                </a:solidFill>
+                <a:latin typeface="Arial" panose="020B0604020202020204" pitchFamily="34" charset="0"/>
+                <a:cs typeface="Arial" panose="020B0604020202020204" pitchFamily="34" charset="0"/>
+              </a:rPr>
+              <a:t>incidente</a:t>
+            </a:r>
+            <a:r>
+              <a:rPr lang="en-US" sz="3600" dirty="0">
+                <a:solidFill>
+                  <a:schemeClr val="tx1">
+                    <a:lumMod val="85000"/>
+                    <a:lumOff val="15000"/>
+                  </a:schemeClr>
+                </a:solidFill>
+                <a:latin typeface="Arial" panose="020B0604020202020204" pitchFamily="34" charset="0"/>
+                <a:cs typeface="Arial" panose="020B0604020202020204" pitchFamily="34" charset="0"/>
+              </a:rPr>
+              <a:t>, </a:t>
+            </a:r>
+            <a:r>
+              <a:rPr lang="en-US" sz="3600" dirty="0" err="1">
+                <a:solidFill>
+                  <a:schemeClr val="tx1">
+                    <a:lumMod val="85000"/>
+                    <a:lumOff val="15000"/>
+                  </a:schemeClr>
+                </a:solidFill>
+                <a:latin typeface="Arial" panose="020B0604020202020204" pitchFamily="34" charset="0"/>
+                <a:cs typeface="Arial" panose="020B0604020202020204" pitchFamily="34" charset="0"/>
+              </a:rPr>
+              <a:t>facilitando</a:t>
+            </a:r>
+            <a:r>
+              <a:rPr lang="en-US" sz="3600" dirty="0">
+                <a:solidFill>
+                  <a:schemeClr val="tx1">
+                    <a:lumMod val="85000"/>
+                    <a:lumOff val="15000"/>
+                  </a:schemeClr>
+                </a:solidFill>
+                <a:latin typeface="Arial" panose="020B0604020202020204" pitchFamily="34" charset="0"/>
+                <a:cs typeface="Arial" panose="020B0604020202020204" pitchFamily="34" charset="0"/>
+              </a:rPr>
+              <a:t> e </a:t>
+            </a:r>
+            <a:r>
+              <a:rPr lang="en-US" sz="3600" dirty="0" err="1">
+                <a:solidFill>
+                  <a:schemeClr val="tx1">
+                    <a:lumMod val="85000"/>
+                    <a:lumOff val="15000"/>
+                  </a:schemeClr>
+                </a:solidFill>
+                <a:latin typeface="Arial" panose="020B0604020202020204" pitchFamily="34" charset="0"/>
+                <a:cs typeface="Arial" panose="020B0604020202020204" pitchFamily="34" charset="0"/>
+              </a:rPr>
+              <a:t>agilizando</a:t>
+            </a:r>
+            <a:r>
+              <a:rPr lang="en-US" sz="3600" dirty="0">
+                <a:solidFill>
+                  <a:schemeClr val="tx1">
+                    <a:lumMod val="85000"/>
+                    <a:lumOff val="15000"/>
+                  </a:schemeClr>
+                </a:solidFill>
+                <a:latin typeface="Arial" panose="020B0604020202020204" pitchFamily="34" charset="0"/>
+                <a:cs typeface="Arial" panose="020B0604020202020204" pitchFamily="34" charset="0"/>
+              </a:rPr>
+              <a:t> o </a:t>
+            </a:r>
+            <a:r>
+              <a:rPr lang="en-US" sz="3600" dirty="0" err="1">
+                <a:solidFill>
+                  <a:schemeClr val="tx1">
+                    <a:lumMod val="85000"/>
+                    <a:lumOff val="15000"/>
+                  </a:schemeClr>
+                </a:solidFill>
+                <a:latin typeface="Arial" panose="020B0604020202020204" pitchFamily="34" charset="0"/>
+                <a:cs typeface="Arial" panose="020B0604020202020204" pitchFamily="34" charset="0"/>
+              </a:rPr>
+              <a:t>suporte</a:t>
+            </a:r>
+            <a:r>
+              <a:rPr lang="en-US" sz="3600" dirty="0">
+                <a:solidFill>
+                  <a:schemeClr val="tx1">
+                    <a:lumMod val="85000"/>
+                    <a:lumOff val="15000"/>
+                  </a:schemeClr>
+                </a:solidFill>
+                <a:latin typeface="Arial" panose="020B0604020202020204" pitchFamily="34" charset="0"/>
+                <a:cs typeface="Arial" panose="020B0604020202020204" pitchFamily="34" charset="0"/>
+              </a:rPr>
+              <a:t> dos </a:t>
+            </a:r>
+            <a:r>
+              <a:rPr lang="en-US" sz="3600" dirty="0" err="1">
+                <a:solidFill>
+                  <a:schemeClr val="tx1">
+                    <a:lumMod val="85000"/>
+                    <a:lumOff val="15000"/>
+                  </a:schemeClr>
+                </a:solidFill>
+                <a:latin typeface="Arial" panose="020B0604020202020204" pitchFamily="34" charset="0"/>
+                <a:cs typeface="Arial" panose="020B0604020202020204" pitchFamily="34" charset="0"/>
+              </a:rPr>
+              <a:t>envolvidos</a:t>
+            </a:r>
+            <a:r>
+              <a:rPr lang="en-US" sz="3600" dirty="0">
+                <a:solidFill>
+                  <a:schemeClr val="tx1">
+                    <a:lumMod val="85000"/>
+                    <a:lumOff val="15000"/>
+                  </a:schemeClr>
+                </a:solidFill>
+                <a:latin typeface="Arial" panose="020B0604020202020204" pitchFamily="34" charset="0"/>
+                <a:cs typeface="Arial" panose="020B0604020202020204" pitchFamily="34" charset="0"/>
+              </a:rPr>
+              <a:t>.</a:t>
+            </a:r>
+          </a:p>
+          <a:p>
+            <a:pPr marL="571500" indent="-571500" algn="just">
+              <a:spcBef>
+                <a:spcPts val="0"/>
+              </a:spcBef>
+              <a:spcAft>
+                <a:spcPts val="600"/>
+              </a:spcAft>
+              <a:buFont typeface="Arial" panose="020B0604020202020204" pitchFamily="34" charset="0"/>
               <a:buChar char="•"/>
             </a:pPr>
-            <a:endParaRPr lang="en-US" sz="2948" dirty="0">
+            <a:endParaRPr lang="en-US" sz="3600" dirty="0">
               <a:solidFill>
-                <a:srgbClr val="272727"/>
+                <a:schemeClr val="tx1">
+                  <a:lumMod val="85000"/>
+                  <a:lumOff val="15000"/>
+                </a:schemeClr>
               </a:solidFill>
               <a:latin typeface="Arial" panose="020B0604020202020204" pitchFamily="34" charset="0"/>
               <a:cs typeface="Arial" panose="020B0604020202020204" pitchFamily="34" charset="0"/>
             </a:endParaRPr>
           </a:p>
           <a:p>
-            <a:pPr marL="636581" lvl="1" indent="-318290" algn="just">
-              <a:lnSpc>
-                <a:spcPts val="3833"/>
-              </a:lnSpc>
-              <a:buFont typeface="Arial"/>
+            <a:pPr marL="571500" indent="-571500" algn="just">
+              <a:spcBef>
+                <a:spcPts val="0"/>
+              </a:spcBef>
+              <a:spcAft>
+                <a:spcPts val="600"/>
+              </a:spcAft>
+              <a:buFont typeface="Arial" panose="020B0604020202020204" pitchFamily="34" charset="0"/>
               <a:buChar char="•"/>
             </a:pPr>
             <a:r>
-              <a:rPr lang="en-US" sz="2948" dirty="0" err="1">
-                <a:solidFill>
-                  <a:srgbClr val="272727"/>
+              <a:rPr lang="en-US" sz="3600" dirty="0" err="1">
+                <a:solidFill>
+                  <a:schemeClr val="tx1">
+                    <a:lumMod val="85000"/>
+                    <a:lumOff val="15000"/>
+                  </a:schemeClr>
                 </a:solidFill>
                 <a:latin typeface="Arial" panose="020B0604020202020204" pitchFamily="34" charset="0"/>
                 <a:cs typeface="Arial" panose="020B0604020202020204" pitchFamily="34" charset="0"/>
@@ -11060,9 +11180,64 @@
               <a:t>Haverá</a:t>
             </a:r>
             <a:r>
-              <a:rPr lang="en-US" sz="2948" dirty="0">
-                <a:solidFill>
-                  <a:srgbClr val="272727"/>
+              <a:rPr lang="en-US" sz="3600" dirty="0">
+                <a:solidFill>
+                  <a:schemeClr val="tx1">
+                    <a:lumMod val="85000"/>
+                    <a:lumOff val="15000"/>
+                  </a:schemeClr>
+                </a:solidFill>
+                <a:latin typeface="Arial" panose="020B0604020202020204" pitchFamily="34" charset="0"/>
+                <a:cs typeface="Arial" panose="020B0604020202020204" pitchFamily="34" charset="0"/>
+              </a:rPr>
+              <a:t> um </a:t>
+            </a:r>
+            <a:r>
+              <a:rPr lang="en-US" sz="3600" dirty="0" err="1">
+                <a:solidFill>
+                  <a:schemeClr val="tx1">
+                    <a:lumMod val="85000"/>
+                    <a:lumOff val="15000"/>
+                  </a:schemeClr>
+                </a:solidFill>
+                <a:latin typeface="Arial" panose="020B0604020202020204" pitchFamily="34" charset="0"/>
+                <a:cs typeface="Arial" panose="020B0604020202020204" pitchFamily="34" charset="0"/>
+              </a:rPr>
+              <a:t>ícone</a:t>
+            </a:r>
+            <a:r>
+              <a:rPr lang="en-US" sz="3600" dirty="0">
+                <a:solidFill>
+                  <a:schemeClr val="tx1">
+                    <a:lumMod val="85000"/>
+                    <a:lumOff val="15000"/>
+                  </a:schemeClr>
+                </a:solidFill>
+                <a:latin typeface="Arial" panose="020B0604020202020204" pitchFamily="34" charset="0"/>
+                <a:cs typeface="Arial" panose="020B0604020202020204" pitchFamily="34" charset="0"/>
+              </a:rPr>
+              <a:t> de </a:t>
+            </a:r>
+            <a:r>
+              <a:rPr lang="en-US" sz="3600" dirty="0" err="1">
+                <a:solidFill>
+                  <a:schemeClr val="tx1">
+                    <a:lumMod val="85000"/>
+                    <a:lumOff val="15000"/>
+                  </a:schemeClr>
+                </a:solidFill>
+                <a:latin typeface="Arial" panose="020B0604020202020204" pitchFamily="34" charset="0"/>
+                <a:cs typeface="Arial" panose="020B0604020202020204" pitchFamily="34" charset="0"/>
+              </a:rPr>
+              <a:t>suporte</a:t>
+            </a:r>
+            <a:r>
+              <a:rPr lang="en-US" sz="3600" dirty="0">
+                <a:solidFill>
+                  <a:schemeClr val="tx1">
+                    <a:lumMod val="85000"/>
+                    <a:lumOff val="15000"/>
+                  </a:schemeClr>
                 </a:solidFill>
                 <a:latin typeface="Arial" panose="020B0604020202020204" pitchFamily="34" charset="0"/>
                 <a:cs typeface="Arial" panose="020B0604020202020204" pitchFamily="34" charset="0"/>
@@ -11070,89 +11245,90 @@
               <a:t> </a:t>
             </a:r>
             <a:r>
-              <a:rPr lang="en-US" sz="2948" dirty="0" err="1">
-                <a:solidFill>
-                  <a:srgbClr val="272727"/>
-                </a:solidFill>
-                <a:latin typeface="Arial" panose="020B0604020202020204" pitchFamily="34" charset="0"/>
-                <a:cs typeface="Arial" panose="020B0604020202020204" pitchFamily="34" charset="0"/>
-              </a:rPr>
-              <a:t>uma</a:t>
-            </a:r>
-            <a:r>
-              <a:rPr lang="en-US" sz="2948" dirty="0">
-                <a:solidFill>
-                  <a:srgbClr val="272727"/>
-                </a:solidFill>
-                <a:latin typeface="Arial" panose="020B0604020202020204" pitchFamily="34" charset="0"/>
-                <a:cs typeface="Arial" panose="020B0604020202020204" pitchFamily="34" charset="0"/>
-              </a:rPr>
-              <a:t> dashboard com </a:t>
-            </a:r>
-            <a:r>
-              <a:rPr lang="en-US" sz="2948" dirty="0" err="1">
-                <a:solidFill>
-                  <a:srgbClr val="272727"/>
-                </a:solidFill>
-                <a:latin typeface="Arial" panose="020B0604020202020204" pitchFamily="34" charset="0"/>
-                <a:cs typeface="Arial" panose="020B0604020202020204" pitchFamily="34" charset="0"/>
-              </a:rPr>
-              <a:t>controle</a:t>
-            </a:r>
-            <a:r>
-              <a:rPr lang="en-US" sz="2948" dirty="0">
-                <a:solidFill>
-                  <a:srgbClr val="272727"/>
-                </a:solidFill>
-                <a:latin typeface="Arial" panose="020B0604020202020204" pitchFamily="34" charset="0"/>
-                <a:cs typeface="Arial" panose="020B0604020202020204" pitchFamily="34" charset="0"/>
-              </a:rPr>
-              <a:t> de </a:t>
-            </a:r>
-            <a:r>
-              <a:rPr lang="en-US" sz="2948" dirty="0" err="1">
-                <a:solidFill>
-                  <a:srgbClr val="272727"/>
-                </a:solidFill>
-                <a:latin typeface="Arial" panose="020B0604020202020204" pitchFamily="34" charset="0"/>
-                <a:cs typeface="Arial" panose="020B0604020202020204" pitchFamily="34" charset="0"/>
-              </a:rPr>
-              <a:t>monitoramento</a:t>
-            </a:r>
-            <a:r>
-              <a:rPr lang="en-US" sz="2948" dirty="0">
-                <a:solidFill>
-                  <a:srgbClr val="272727"/>
-                </a:solidFill>
-                <a:latin typeface="Arial" panose="020B0604020202020204" pitchFamily="34" charset="0"/>
-                <a:cs typeface="Arial" panose="020B0604020202020204" pitchFamily="34" charset="0"/>
-              </a:rPr>
-              <a:t> visual </a:t>
-            </a:r>
-            <a:r>
-              <a:rPr lang="en-US" sz="2948" dirty="0" err="1">
-                <a:solidFill>
-                  <a:srgbClr val="272727"/>
-                </a:solidFill>
-                <a:latin typeface="Arial" panose="020B0604020202020204" pitchFamily="34" charset="0"/>
-                <a:cs typeface="Arial" panose="020B0604020202020204" pitchFamily="34" charset="0"/>
-              </a:rPr>
-              <a:t>onde</a:t>
-            </a:r>
-            <a:r>
-              <a:rPr lang="en-US" sz="2948" dirty="0">
-                <a:solidFill>
-                  <a:srgbClr val="272727"/>
-                </a:solidFill>
-                <a:latin typeface="Arial" panose="020B0604020202020204" pitchFamily="34" charset="0"/>
-                <a:cs typeface="Arial" panose="020B0604020202020204" pitchFamily="34" charset="0"/>
-              </a:rPr>
-              <a:t> o </a:t>
-            </a:r>
-            <a:r>
-              <a:rPr lang="en-US" sz="2948" dirty="0" err="1">
-                <a:solidFill>
-                  <a:srgbClr val="272727"/>
+              <a:rPr lang="en-US" sz="3600" dirty="0" err="1">
+                <a:solidFill>
+                  <a:schemeClr val="tx1">
+                    <a:lumMod val="85000"/>
+                    <a:lumOff val="15000"/>
+                  </a:schemeClr>
+                </a:solidFill>
+                <a:latin typeface="Arial" panose="020B0604020202020204" pitchFamily="34" charset="0"/>
+                <a:cs typeface="Arial" panose="020B0604020202020204" pitchFamily="34" charset="0"/>
+              </a:rPr>
+              <a:t>na</a:t>
+            </a:r>
+            <a:r>
+              <a:rPr lang="en-US" sz="3600" dirty="0">
+                <a:solidFill>
+                  <a:schemeClr val="tx1">
+                    <a:lumMod val="85000"/>
+                    <a:lumOff val="15000"/>
+                  </a:schemeClr>
+                </a:solidFill>
+                <a:latin typeface="Arial" panose="020B0604020202020204" pitchFamily="34" charset="0"/>
+                <a:cs typeface="Arial" panose="020B0604020202020204" pitchFamily="34" charset="0"/>
+              </a:rPr>
+              <a:t> dashboard para </a:t>
+            </a:r>
+            <a:r>
+              <a:rPr lang="en-US" sz="3600" dirty="0" err="1">
+                <a:solidFill>
+                  <a:schemeClr val="tx1">
+                    <a:lumMod val="85000"/>
+                    <a:lumOff val="15000"/>
+                  </a:schemeClr>
+                </a:solidFill>
+                <a:latin typeface="Arial" panose="020B0604020202020204" pitchFamily="34" charset="0"/>
+                <a:cs typeface="Arial" panose="020B0604020202020204" pitchFamily="34" charset="0"/>
+              </a:rPr>
+              <a:t>fácil</a:t>
+            </a:r>
+            <a:r>
+              <a:rPr lang="en-US" sz="3600" dirty="0">
+                <a:solidFill>
+                  <a:schemeClr val="tx1">
+                    <a:lumMod val="85000"/>
+                    <a:lumOff val="15000"/>
+                  </a:schemeClr>
+                </a:solidFill>
+                <a:latin typeface="Arial" panose="020B0604020202020204" pitchFamily="34" charset="0"/>
+                <a:cs typeface="Arial" panose="020B0604020202020204" pitchFamily="34" charset="0"/>
+              </a:rPr>
+              <a:t> </a:t>
+            </a:r>
+            <a:r>
+              <a:rPr lang="en-US" sz="3600" dirty="0" err="1">
+                <a:solidFill>
+                  <a:schemeClr val="tx1">
+                    <a:lumMod val="85000"/>
+                    <a:lumOff val="15000"/>
+                  </a:schemeClr>
+                </a:solidFill>
+                <a:latin typeface="Arial" panose="020B0604020202020204" pitchFamily="34" charset="0"/>
+                <a:cs typeface="Arial" panose="020B0604020202020204" pitchFamily="34" charset="0"/>
+              </a:rPr>
+              <a:t>interação</a:t>
+            </a:r>
+            <a:r>
+              <a:rPr lang="en-US" sz="3600" dirty="0">
+                <a:solidFill>
+                  <a:schemeClr val="tx1">
+                    <a:lumMod val="85000"/>
+                    <a:lumOff val="15000"/>
+                  </a:schemeClr>
+                </a:solidFill>
+                <a:latin typeface="Arial" panose="020B0604020202020204" pitchFamily="34" charset="0"/>
+                <a:cs typeface="Arial" panose="020B0604020202020204" pitchFamily="34" charset="0"/>
+              </a:rPr>
+              <a:t> do </a:t>
+            </a:r>
+            <a:r>
+              <a:rPr lang="en-US" sz="3600" dirty="0" err="1">
+                <a:solidFill>
+                  <a:schemeClr val="tx1">
+                    <a:lumMod val="85000"/>
+                    <a:lumOff val="15000"/>
+                  </a:schemeClr>
                 </a:solidFill>
                 <a:latin typeface="Arial" panose="020B0604020202020204" pitchFamily="34" charset="0"/>
                 <a:cs typeface="Arial" panose="020B0604020202020204" pitchFamily="34" charset="0"/>
@@ -11160,545 +11336,88 @@
               <a:t>suporte</a:t>
             </a:r>
             <a:r>
-              <a:rPr lang="en-US" sz="2948" dirty="0">
-                <a:solidFill>
-                  <a:srgbClr val="272727"/>
-                </a:solidFill>
-                <a:latin typeface="Arial" panose="020B0604020202020204" pitchFamily="34" charset="0"/>
-                <a:cs typeface="Arial" panose="020B0604020202020204" pitchFamily="34" charset="0"/>
-              </a:rPr>
-              <a:t> de T.I </a:t>
-            </a:r>
-            <a:r>
-              <a:rPr lang="en-US" sz="2948" dirty="0" err="1">
-                <a:solidFill>
-                  <a:srgbClr val="272727"/>
-                </a:solidFill>
-                <a:latin typeface="Arial" panose="020B0604020202020204" pitchFamily="34" charset="0"/>
-                <a:cs typeface="Arial" panose="020B0604020202020204" pitchFamily="34" charset="0"/>
-              </a:rPr>
-              <a:t>conseguirá</a:t>
-            </a:r>
-            <a:r>
-              <a:rPr lang="en-US" sz="2948" dirty="0">
-                <a:solidFill>
-                  <a:srgbClr val="272727"/>
-                </a:solidFill>
-                <a:latin typeface="Arial" panose="020B0604020202020204" pitchFamily="34" charset="0"/>
-                <a:cs typeface="Arial" panose="020B0604020202020204" pitchFamily="34" charset="0"/>
-              </a:rPr>
-              <a:t> </a:t>
-            </a:r>
-            <a:r>
-              <a:rPr lang="en-US" sz="2948" dirty="0" err="1">
-                <a:solidFill>
-                  <a:srgbClr val="272727"/>
-                </a:solidFill>
-                <a:latin typeface="Arial" panose="020B0604020202020204" pitchFamily="34" charset="0"/>
-                <a:cs typeface="Arial" panose="020B0604020202020204" pitchFamily="34" charset="0"/>
-              </a:rPr>
-              <a:t>verificar</a:t>
-            </a:r>
-            <a:r>
-              <a:rPr lang="en-US" sz="2948" dirty="0">
-                <a:solidFill>
-                  <a:srgbClr val="272727"/>
-                </a:solidFill>
-                <a:latin typeface="Arial" panose="020B0604020202020204" pitchFamily="34" charset="0"/>
-                <a:cs typeface="Arial" panose="020B0604020202020204" pitchFamily="34" charset="0"/>
-              </a:rPr>
-              <a:t> o </a:t>
-            </a:r>
-            <a:r>
-              <a:rPr lang="en-US" sz="2948" dirty="0" err="1">
-                <a:solidFill>
-                  <a:srgbClr val="272727"/>
-                </a:solidFill>
-                <a:latin typeface="Arial" panose="020B0604020202020204" pitchFamily="34" charset="0"/>
-                <a:cs typeface="Arial" panose="020B0604020202020204" pitchFamily="34" charset="0"/>
-              </a:rPr>
-              <a:t>problema</a:t>
-            </a:r>
-            <a:r>
-              <a:rPr lang="en-US" sz="2948" dirty="0">
-                <a:solidFill>
-                  <a:srgbClr val="272727"/>
-                </a:solidFill>
-                <a:latin typeface="Arial" panose="020B0604020202020204" pitchFamily="34" charset="0"/>
-                <a:cs typeface="Arial" panose="020B0604020202020204" pitchFamily="34" charset="0"/>
-              </a:rPr>
-              <a:t> do </a:t>
-            </a:r>
-            <a:r>
-              <a:rPr lang="en-US" sz="2948" dirty="0" err="1">
-                <a:solidFill>
-                  <a:srgbClr val="272727"/>
-                </a:solidFill>
-                <a:latin typeface="Arial" panose="020B0604020202020204" pitchFamily="34" charset="0"/>
-                <a:cs typeface="Arial" panose="020B0604020202020204" pitchFamily="34" charset="0"/>
-              </a:rPr>
-              <a:t>computador</a:t>
-            </a:r>
-            <a:r>
-              <a:rPr lang="en-US" sz="2948" dirty="0">
-                <a:solidFill>
-                  <a:srgbClr val="272727"/>
-                </a:solidFill>
-                <a:latin typeface="Arial" panose="020B0604020202020204" pitchFamily="34" charset="0"/>
-                <a:cs typeface="Arial" panose="020B0604020202020204" pitchFamily="34" charset="0"/>
-              </a:rPr>
-              <a:t>.</a:t>
-            </a:r>
-          </a:p>
-          <a:p>
-            <a:pPr marL="636581" lvl="1" indent="-318290" algn="just">
-              <a:lnSpc>
-                <a:spcPts val="3833"/>
-              </a:lnSpc>
-              <a:buFont typeface="Arial"/>
-              <a:buChar char="•"/>
-            </a:pPr>
-            <a:endParaRPr lang="en-US" sz="2948" dirty="0">
+              <a:rPr lang="en-US" sz="3600" dirty="0">
+                <a:solidFill>
+                  <a:schemeClr val="tx1">
+                    <a:lumMod val="85000"/>
+                    <a:lumOff val="15000"/>
+                  </a:schemeClr>
+                </a:solidFill>
+                <a:latin typeface="Arial" panose="020B0604020202020204" pitchFamily="34" charset="0"/>
+                <a:cs typeface="Arial" panose="020B0604020202020204" pitchFamily="34" charset="0"/>
+              </a:rPr>
+              <a:t> da </a:t>
+            </a:r>
+            <a:r>
+              <a:rPr lang="en-US" sz="3600" dirty="0" err="1">
+                <a:solidFill>
+                  <a:schemeClr val="tx1">
+                    <a:lumMod val="85000"/>
+                    <a:lumOff val="15000"/>
+                  </a:schemeClr>
+                </a:solidFill>
+                <a:latin typeface="Arial" panose="020B0604020202020204" pitchFamily="34" charset="0"/>
+                <a:cs typeface="Arial" panose="020B0604020202020204" pitchFamily="34" charset="0"/>
+              </a:rPr>
+              <a:t>faculdade</a:t>
+            </a:r>
+            <a:r>
+              <a:rPr lang="en-US" sz="3600" dirty="0">
+                <a:solidFill>
+                  <a:schemeClr val="tx1">
+                    <a:lumMod val="85000"/>
+                    <a:lumOff val="15000"/>
+                  </a:schemeClr>
+                </a:solidFill>
+                <a:latin typeface="Arial" panose="020B0604020202020204" pitchFamily="34" charset="0"/>
+                <a:cs typeface="Arial" panose="020B0604020202020204" pitchFamily="34" charset="0"/>
+              </a:rPr>
+              <a:t> com a </a:t>
+            </a:r>
+            <a:r>
+              <a:rPr lang="en-US" sz="3600" dirty="0" err="1">
+                <a:solidFill>
+                  <a:schemeClr val="tx1">
+                    <a:lumMod val="85000"/>
+                    <a:lumOff val="15000"/>
+                  </a:schemeClr>
+                </a:solidFill>
+                <a:latin typeface="Arial" panose="020B0604020202020204" pitchFamily="34" charset="0"/>
+                <a:cs typeface="Arial" panose="020B0604020202020204" pitchFamily="34" charset="0"/>
+              </a:rPr>
+              <a:t>SuperVisor</a:t>
+            </a:r>
+            <a:endParaRPr lang="en-US" sz="3600" dirty="0">
               <a:solidFill>
-                <a:srgbClr val="272727"/>
+                <a:schemeClr val="tx1">
+                  <a:lumMod val="85000"/>
+                  <a:lumOff val="15000"/>
+                </a:schemeClr>
               </a:solidFill>
               <a:latin typeface="Arial" panose="020B0604020202020204" pitchFamily="34" charset="0"/>
               <a:cs typeface="Arial" panose="020B0604020202020204" pitchFamily="34" charset="0"/>
             </a:endParaRPr>
           </a:p>
           <a:p>
-            <a:pPr marL="636581" lvl="1" indent="-318290" algn="just">
-              <a:lnSpc>
-                <a:spcPts val="3833"/>
-              </a:lnSpc>
-              <a:buFont typeface="Arial"/>
-              <a:buChar char="•"/>
+            <a:pPr marL="0" indent="0" algn="just">
+              <a:spcBef>
+                <a:spcPts val="0"/>
+              </a:spcBef>
+              <a:spcAft>
+                <a:spcPts val="600"/>
+              </a:spcAft>
+              <a:buNone/>
             </a:pPr>
-            <a:r>
-              <a:rPr lang="en-US" sz="2948" dirty="0" err="1">
-                <a:solidFill>
-                  <a:srgbClr val="272727"/>
-                </a:solidFill>
-                <a:latin typeface="Arial" panose="020B0604020202020204" pitchFamily="34" charset="0"/>
-                <a:cs typeface="Arial" panose="020B0604020202020204" pitchFamily="34" charset="0"/>
-              </a:rPr>
-              <a:t>Emitiremos</a:t>
-            </a:r>
-            <a:r>
-              <a:rPr lang="en-US" sz="2948" dirty="0">
-                <a:solidFill>
-                  <a:srgbClr val="272727"/>
-                </a:solidFill>
-                <a:latin typeface="Arial" panose="020B0604020202020204" pitchFamily="34" charset="0"/>
-                <a:cs typeface="Arial" panose="020B0604020202020204" pitchFamily="34" charset="0"/>
-              </a:rPr>
-              <a:t> um </a:t>
-            </a:r>
-            <a:r>
-              <a:rPr lang="en-US" sz="2948" dirty="0" err="1">
-                <a:solidFill>
-                  <a:srgbClr val="272727"/>
-                </a:solidFill>
-                <a:latin typeface="Arial" panose="020B0604020202020204" pitchFamily="34" charset="0"/>
-                <a:cs typeface="Arial" panose="020B0604020202020204" pitchFamily="34" charset="0"/>
-              </a:rPr>
-              <a:t>alerta</a:t>
-            </a:r>
-            <a:r>
-              <a:rPr lang="en-US" sz="2948" dirty="0">
-                <a:solidFill>
-                  <a:srgbClr val="272727"/>
-                </a:solidFill>
-                <a:latin typeface="Arial" panose="020B0604020202020204" pitchFamily="34" charset="0"/>
-                <a:cs typeface="Arial" panose="020B0604020202020204" pitchFamily="34" charset="0"/>
-              </a:rPr>
-              <a:t> para que a </a:t>
-            </a:r>
-            <a:r>
-              <a:rPr lang="en-US" sz="2948" dirty="0" err="1">
-                <a:solidFill>
-                  <a:srgbClr val="272727"/>
-                </a:solidFill>
-                <a:latin typeface="Arial" panose="020B0604020202020204" pitchFamily="34" charset="0"/>
-                <a:cs typeface="Arial" panose="020B0604020202020204" pitchFamily="34" charset="0"/>
-              </a:rPr>
-              <a:t>equipe</a:t>
-            </a:r>
-            <a:r>
-              <a:rPr lang="en-US" sz="2948" dirty="0">
-                <a:solidFill>
-                  <a:srgbClr val="272727"/>
-                </a:solidFill>
-                <a:latin typeface="Arial" panose="020B0604020202020204" pitchFamily="34" charset="0"/>
-                <a:cs typeface="Arial" panose="020B0604020202020204" pitchFamily="34" charset="0"/>
-              </a:rPr>
-              <a:t> de T.I.  </a:t>
-            </a:r>
-            <a:r>
-              <a:rPr lang="en-US" sz="2948" dirty="0" err="1">
-                <a:solidFill>
-                  <a:srgbClr val="272727"/>
-                </a:solidFill>
-                <a:latin typeface="Arial" panose="020B0604020202020204" pitchFamily="34" charset="0"/>
-                <a:cs typeface="Arial" panose="020B0604020202020204" pitchFamily="34" charset="0"/>
-              </a:rPr>
-              <a:t>mais</a:t>
-            </a:r>
-            <a:r>
-              <a:rPr lang="en-US" sz="2948" dirty="0">
-                <a:solidFill>
-                  <a:srgbClr val="272727"/>
-                </a:solidFill>
-                <a:latin typeface="Arial" panose="020B0604020202020204" pitchFamily="34" charset="0"/>
-                <a:cs typeface="Arial" panose="020B0604020202020204" pitchFamily="34" charset="0"/>
-              </a:rPr>
-              <a:t> </a:t>
-            </a:r>
-            <a:r>
-              <a:rPr lang="en-US" sz="2948" dirty="0" err="1">
-                <a:solidFill>
-                  <a:srgbClr val="272727"/>
-                </a:solidFill>
-                <a:latin typeface="Arial" panose="020B0604020202020204" pitchFamily="34" charset="0"/>
-                <a:cs typeface="Arial" panose="020B0604020202020204" pitchFamily="34" charset="0"/>
-              </a:rPr>
-              <a:t>atenta</a:t>
-            </a:r>
-            <a:r>
-              <a:rPr lang="en-US" sz="2948" dirty="0">
-                <a:solidFill>
-                  <a:srgbClr val="272727"/>
-                </a:solidFill>
-                <a:latin typeface="Arial" panose="020B0604020202020204" pitchFamily="34" charset="0"/>
-                <a:cs typeface="Arial" panose="020B0604020202020204" pitchFamily="34" charset="0"/>
-              </a:rPr>
-              <a:t> </a:t>
-            </a:r>
-            <a:r>
-              <a:rPr lang="en-US" sz="2948" dirty="0" err="1">
-                <a:solidFill>
-                  <a:srgbClr val="272727"/>
-                </a:solidFill>
-                <a:latin typeface="Arial" panose="020B0604020202020204" pitchFamily="34" charset="0"/>
-                <a:cs typeface="Arial" panose="020B0604020202020204" pitchFamily="34" charset="0"/>
-              </a:rPr>
-              <a:t>em</a:t>
-            </a:r>
-            <a:r>
-              <a:rPr lang="en-US" sz="2948" dirty="0">
-                <a:solidFill>
-                  <a:srgbClr val="272727"/>
-                </a:solidFill>
-                <a:latin typeface="Arial" panose="020B0604020202020204" pitchFamily="34" charset="0"/>
-                <a:cs typeface="Arial" panose="020B0604020202020204" pitchFamily="34" charset="0"/>
-              </a:rPr>
-              <a:t> </a:t>
-            </a:r>
-            <a:r>
-              <a:rPr lang="en-US" sz="2948" dirty="0" err="1">
-                <a:solidFill>
-                  <a:srgbClr val="272727"/>
-                </a:solidFill>
-                <a:latin typeface="Arial" panose="020B0604020202020204" pitchFamily="34" charset="0"/>
-                <a:cs typeface="Arial" panose="020B0604020202020204" pitchFamily="34" charset="0"/>
-              </a:rPr>
-              <a:t>determinada</a:t>
-            </a:r>
-            <a:r>
-              <a:rPr lang="en-US" sz="2948" dirty="0">
-                <a:solidFill>
-                  <a:srgbClr val="272727"/>
-                </a:solidFill>
-                <a:latin typeface="Arial" panose="020B0604020202020204" pitchFamily="34" charset="0"/>
-                <a:cs typeface="Arial" panose="020B0604020202020204" pitchFamily="34" charset="0"/>
-              </a:rPr>
-              <a:t> </a:t>
-            </a:r>
-            <a:r>
-              <a:rPr lang="en-US" sz="2948" dirty="0" err="1">
-                <a:solidFill>
-                  <a:srgbClr val="272727"/>
-                </a:solidFill>
-                <a:latin typeface="Arial" panose="020B0604020202020204" pitchFamily="34" charset="0"/>
-                <a:cs typeface="Arial" panose="020B0604020202020204" pitchFamily="34" charset="0"/>
-              </a:rPr>
-              <a:t>máquina</a:t>
-            </a:r>
-            <a:r>
-              <a:rPr lang="en-US" sz="2948" dirty="0">
-                <a:solidFill>
-                  <a:srgbClr val="272727"/>
-                </a:solidFill>
-                <a:latin typeface="Arial" panose="020B0604020202020204" pitchFamily="34" charset="0"/>
-                <a:cs typeface="Arial" panose="020B0604020202020204" pitchFamily="34" charset="0"/>
-              </a:rPr>
-              <a:t>. </a:t>
-            </a:r>
-          </a:p>
-          <a:p>
-            <a:pPr marL="636581" lvl="1" indent="-318290" algn="just">
-              <a:lnSpc>
-                <a:spcPts val="3833"/>
-              </a:lnSpc>
-              <a:buFont typeface="Arial"/>
-              <a:buChar char="•"/>
-            </a:pPr>
-            <a:endParaRPr lang="en-US" sz="2948" dirty="0">
+            <a:endParaRPr lang="en-US" sz="3600" dirty="0">
               <a:solidFill>
-                <a:srgbClr val="272727"/>
+                <a:schemeClr val="tx1">
+                  <a:lumMod val="85000"/>
+                  <a:lumOff val="15000"/>
+                </a:schemeClr>
               </a:solidFill>
               <a:latin typeface="Arial" panose="020B0604020202020204" pitchFamily="34" charset="0"/>
               <a:cs typeface="Arial" panose="020B0604020202020204" pitchFamily="34" charset="0"/>
             </a:endParaRPr>
-          </a:p>
-          <a:p>
-            <a:pPr marL="636581" lvl="1" indent="-318290" algn="just">
-              <a:lnSpc>
-                <a:spcPts val="3833"/>
-              </a:lnSpc>
-              <a:buFont typeface="Arial"/>
-              <a:buChar char="•"/>
-            </a:pPr>
-            <a:r>
-              <a:rPr lang="en-US" sz="2948" dirty="0" err="1">
-                <a:solidFill>
-                  <a:srgbClr val="272727"/>
-                </a:solidFill>
-                <a:latin typeface="Arial" panose="020B0604020202020204" pitchFamily="34" charset="0"/>
-                <a:cs typeface="Arial" panose="020B0604020202020204" pitchFamily="34" charset="0"/>
-              </a:rPr>
-              <a:t>Terá</a:t>
-            </a:r>
-            <a:r>
-              <a:rPr lang="en-US" sz="2948" dirty="0">
-                <a:solidFill>
-                  <a:srgbClr val="272727"/>
-                </a:solidFill>
-                <a:latin typeface="Arial" panose="020B0604020202020204" pitchFamily="34" charset="0"/>
-                <a:cs typeface="Arial" panose="020B0604020202020204" pitchFamily="34" charset="0"/>
-              </a:rPr>
-              <a:t> </a:t>
-            </a:r>
-            <a:r>
-              <a:rPr lang="en-US" sz="2948" dirty="0" err="1">
-                <a:solidFill>
-                  <a:srgbClr val="272727"/>
-                </a:solidFill>
-                <a:latin typeface="Arial" panose="020B0604020202020204" pitchFamily="34" charset="0"/>
-                <a:cs typeface="Arial" panose="020B0604020202020204" pitchFamily="34" charset="0"/>
-              </a:rPr>
-              <a:t>uma</a:t>
-            </a:r>
-            <a:r>
-              <a:rPr lang="en-US" sz="2948" dirty="0">
-                <a:solidFill>
-                  <a:srgbClr val="272727"/>
-                </a:solidFill>
-                <a:latin typeface="Arial" panose="020B0604020202020204" pitchFamily="34" charset="0"/>
-                <a:cs typeface="Arial" panose="020B0604020202020204" pitchFamily="34" charset="0"/>
-              </a:rPr>
-              <a:t> </a:t>
-            </a:r>
-            <a:r>
-              <a:rPr lang="en-US" sz="2948" dirty="0" err="1">
-                <a:solidFill>
-                  <a:srgbClr val="272727"/>
-                </a:solidFill>
-                <a:latin typeface="Arial" panose="020B0604020202020204" pitchFamily="34" charset="0"/>
-                <a:cs typeface="Arial" panose="020B0604020202020204" pitchFamily="34" charset="0"/>
-              </a:rPr>
-              <a:t>avaliação</a:t>
-            </a:r>
-            <a:r>
-              <a:rPr lang="en-US" sz="2948" dirty="0">
-                <a:solidFill>
-                  <a:srgbClr val="272727"/>
-                </a:solidFill>
-                <a:latin typeface="Arial" panose="020B0604020202020204" pitchFamily="34" charset="0"/>
-                <a:cs typeface="Arial" panose="020B0604020202020204" pitchFamily="34" charset="0"/>
-              </a:rPr>
-              <a:t> por </a:t>
-            </a:r>
-            <a:r>
-              <a:rPr lang="en-US" sz="2948" dirty="0" err="1">
-                <a:solidFill>
-                  <a:srgbClr val="272727"/>
-                </a:solidFill>
-                <a:latin typeface="Arial" panose="020B0604020202020204" pitchFamily="34" charset="0"/>
-                <a:cs typeface="Arial" panose="020B0604020202020204" pitchFamily="34" charset="0"/>
-              </a:rPr>
-              <a:t>pontuação</a:t>
-            </a:r>
-            <a:r>
-              <a:rPr lang="en-US" sz="2948" dirty="0">
-                <a:solidFill>
-                  <a:srgbClr val="272727"/>
-                </a:solidFill>
-                <a:latin typeface="Arial" panose="020B0604020202020204" pitchFamily="34" charset="0"/>
-                <a:cs typeface="Arial" panose="020B0604020202020204" pitchFamily="34" charset="0"/>
-              </a:rPr>
-              <a:t> um </a:t>
-            </a:r>
-            <a:r>
-              <a:rPr lang="en-US" sz="2948" dirty="0" err="1">
-                <a:solidFill>
-                  <a:srgbClr val="272727"/>
-                </a:solidFill>
-                <a:latin typeface="Arial" panose="020B0604020202020204" pitchFamily="34" charset="0"/>
-                <a:cs typeface="Arial" panose="020B0604020202020204" pitchFamily="34" charset="0"/>
-              </a:rPr>
-              <a:t>período</a:t>
-            </a:r>
-            <a:r>
-              <a:rPr lang="en-US" sz="2948" dirty="0">
-                <a:solidFill>
-                  <a:srgbClr val="272727"/>
-                </a:solidFill>
-                <a:latin typeface="Arial" panose="020B0604020202020204" pitchFamily="34" charset="0"/>
-                <a:cs typeface="Arial" panose="020B0604020202020204" pitchFamily="34" charset="0"/>
-              </a:rPr>
-              <a:t> </a:t>
-            </a:r>
-            <a:r>
-              <a:rPr lang="en-US" sz="2948" dirty="0" err="1">
-                <a:solidFill>
-                  <a:srgbClr val="272727"/>
-                </a:solidFill>
-                <a:latin typeface="Arial" panose="020B0604020202020204" pitchFamily="34" charset="0"/>
-                <a:cs typeface="Arial" panose="020B0604020202020204" pitchFamily="34" charset="0"/>
-              </a:rPr>
-              <a:t>após</a:t>
-            </a:r>
-            <a:r>
-              <a:rPr lang="en-US" sz="2948" dirty="0">
-                <a:solidFill>
-                  <a:srgbClr val="272727"/>
-                </a:solidFill>
-                <a:latin typeface="Arial" panose="020B0604020202020204" pitchFamily="34" charset="0"/>
-                <a:cs typeface="Arial" panose="020B0604020202020204" pitchFamily="34" charset="0"/>
-              </a:rPr>
-              <a:t> o </a:t>
-            </a:r>
-            <a:r>
-              <a:rPr lang="en-US" sz="2948" dirty="0" err="1">
-                <a:solidFill>
-                  <a:srgbClr val="272727"/>
-                </a:solidFill>
-                <a:latin typeface="Arial" panose="020B0604020202020204" pitchFamily="34" charset="0"/>
-                <a:cs typeface="Arial" panose="020B0604020202020204" pitchFamily="34" charset="0"/>
-              </a:rPr>
-              <a:t>atendimento</a:t>
-            </a:r>
-            <a:r>
-              <a:rPr lang="en-US" sz="2948" dirty="0">
-                <a:solidFill>
-                  <a:srgbClr val="272727"/>
-                </a:solidFill>
-                <a:latin typeface="Arial" panose="020B0604020202020204" pitchFamily="34" charset="0"/>
-                <a:cs typeface="Arial" panose="020B0604020202020204" pitchFamily="34" charset="0"/>
-              </a:rPr>
-              <a:t> para </a:t>
-            </a:r>
-            <a:r>
-              <a:rPr lang="en-US" sz="2948" dirty="0" err="1">
-                <a:solidFill>
-                  <a:srgbClr val="272727"/>
-                </a:solidFill>
-                <a:latin typeface="Arial" panose="020B0604020202020204" pitchFamily="34" charset="0"/>
-                <a:cs typeface="Arial" panose="020B0604020202020204" pitchFamily="34" charset="0"/>
-              </a:rPr>
-              <a:t>termos</a:t>
-            </a:r>
-            <a:r>
-              <a:rPr lang="en-US" sz="2948" dirty="0">
-                <a:solidFill>
-                  <a:srgbClr val="272727"/>
-                </a:solidFill>
-                <a:latin typeface="Arial" panose="020B0604020202020204" pitchFamily="34" charset="0"/>
-                <a:cs typeface="Arial" panose="020B0604020202020204" pitchFamily="34" charset="0"/>
-              </a:rPr>
-              <a:t> </a:t>
-            </a:r>
-            <a:r>
-              <a:rPr lang="en-US" sz="2948" dirty="0" err="1">
-                <a:solidFill>
-                  <a:srgbClr val="272727"/>
-                </a:solidFill>
-                <a:latin typeface="Arial" panose="020B0604020202020204" pitchFamily="34" charset="0"/>
-                <a:cs typeface="Arial" panose="020B0604020202020204" pitchFamily="34" charset="0"/>
-              </a:rPr>
-              <a:t>uma</a:t>
-            </a:r>
-            <a:r>
-              <a:rPr lang="en-US" sz="2948" dirty="0">
-                <a:solidFill>
-                  <a:srgbClr val="272727"/>
-                </a:solidFill>
-                <a:latin typeface="Arial" panose="020B0604020202020204" pitchFamily="34" charset="0"/>
-                <a:cs typeface="Arial" panose="020B0604020202020204" pitchFamily="34" charset="0"/>
-              </a:rPr>
-              <a:t> </a:t>
-            </a:r>
-            <a:r>
-              <a:rPr lang="en-US" sz="2948" dirty="0" err="1">
-                <a:solidFill>
-                  <a:srgbClr val="272727"/>
-                </a:solidFill>
-                <a:latin typeface="Arial" panose="020B0604020202020204" pitchFamily="34" charset="0"/>
-                <a:cs typeface="Arial" panose="020B0604020202020204" pitchFamily="34" charset="0"/>
-              </a:rPr>
-              <a:t>melhoria</a:t>
-            </a:r>
-            <a:r>
-              <a:rPr lang="en-US" sz="2948" dirty="0">
-                <a:solidFill>
-                  <a:srgbClr val="272727"/>
-                </a:solidFill>
-                <a:latin typeface="Arial" panose="020B0604020202020204" pitchFamily="34" charset="0"/>
-                <a:cs typeface="Arial" panose="020B0604020202020204" pitchFamily="34" charset="0"/>
-              </a:rPr>
-              <a:t> </a:t>
-            </a:r>
-            <a:r>
-              <a:rPr lang="en-US" sz="2948" dirty="0" err="1">
-                <a:solidFill>
-                  <a:srgbClr val="272727"/>
-                </a:solidFill>
-                <a:latin typeface="Arial" panose="020B0604020202020204" pitchFamily="34" charset="0"/>
-                <a:cs typeface="Arial" panose="020B0604020202020204" pitchFamily="34" charset="0"/>
-              </a:rPr>
-              <a:t>contínua</a:t>
-            </a:r>
-            <a:r>
-              <a:rPr lang="en-US" sz="2948" dirty="0">
-                <a:solidFill>
-                  <a:srgbClr val="272727"/>
-                </a:solidFill>
-                <a:latin typeface="Arial" panose="020B0604020202020204" pitchFamily="34" charset="0"/>
-                <a:cs typeface="Arial" panose="020B0604020202020204" pitchFamily="34" charset="0"/>
-              </a:rPr>
-              <a:t> do </a:t>
-            </a:r>
-            <a:r>
-              <a:rPr lang="en-US" sz="2948" dirty="0" err="1">
-                <a:solidFill>
-                  <a:srgbClr val="272727"/>
-                </a:solidFill>
-                <a:latin typeface="Arial" panose="020B0604020202020204" pitchFamily="34" charset="0"/>
-                <a:cs typeface="Arial" panose="020B0604020202020204" pitchFamily="34" charset="0"/>
-              </a:rPr>
-              <a:t>processo</a:t>
-            </a:r>
-            <a:r>
-              <a:rPr lang="en-US" sz="2948" dirty="0">
-                <a:solidFill>
-                  <a:srgbClr val="272727"/>
-                </a:solidFill>
-                <a:latin typeface="Arial" panose="020B0604020202020204" pitchFamily="34" charset="0"/>
-                <a:cs typeface="Arial" panose="020B0604020202020204" pitchFamily="34" charset="0"/>
-              </a:rPr>
-              <a:t>.</a:t>
-            </a:r>
           </a:p>
         </p:txBody>
       </p:sp>
@@ -11883,6 +11602,53 @@
           </p:txBody>
         </p:sp>
       </p:grpSp>
+      <p:pic>
+        <p:nvPicPr>
+          <p:cNvPr id="1026" name="Picture 2" descr="Discord, logos, logo icon">
+            <a:extLst>
+              <a:ext uri="{FF2B5EF4-FFF2-40B4-BE49-F238E27FC236}">
+                <a16:creationId xmlns:a16="http://schemas.microsoft.com/office/drawing/2014/main" id="{B1DFB1FF-9865-47BE-AB90-CCE2DBA9FC07}"/>
+              </a:ext>
+            </a:extLst>
+          </p:cNvPr>
+          <p:cNvPicPr>
+            <a:picLocks noChangeAspect="1" noChangeArrowheads="1"/>
+          </p:cNvPicPr>
+          <p:nvPr/>
+        </p:nvPicPr>
+        <p:blipFill>
+          <a:blip r:embed="rId2" cstate="print">
+            <a:extLst>
+              <a:ext uri="{28A0092B-C50C-407E-A947-70E740481C1C}">
+                <a14:useLocalDpi xmlns:a14="http://schemas.microsoft.com/office/drawing/2010/main" val="0"/>
+              </a:ext>
+            </a:extLst>
+          </a:blip>
+          <a:srcRect/>
+          <a:stretch>
+            <a:fillRect/>
+          </a:stretch>
+        </p:blipFill>
+        <p:spPr bwMode="auto">
+          <a:xfrm>
+            <a:off x="14935200" y="1104900"/>
+            <a:ext cx="1066800" cy="1066800"/>
+          </a:xfrm>
+          <a:prstGeom prst="rect">
+            <a:avLst/>
+          </a:prstGeom>
+          <a:noFill/>
+          <a:extLst>
+            <a:ext uri="{909E8E84-426E-40DD-AFC4-6F175D3DCCD1}">
+              <a14:hiddenFill xmlns:a14="http://schemas.microsoft.com/office/drawing/2010/main">
+                <a:solidFill>
+                  <a:srgbClr val="FFFFFF"/>
+                </a:solidFill>
+              </a14:hiddenFill>
+            </a:ext>
+          </a:extLst>
+        </p:spPr>
+      </p:pic>
     </p:spTree>
   </p:cSld>
   <p:clrMapOvr>

</xml_diff>